<commit_message>
Added example file, fleshed out the powerpoint
</commit_message>
<xml_diff>
--- a/payette_2024_closures.pptx
+++ b/payette_2024_closures.pptx
@@ -8,10 +8,10 @@
     <p:sldMasterId id="2147483684" r:id="rId7"/>
   </p:sldMasterIdLst>
   <p:notesMasterIdLst>
-    <p:notesMasterId r:id="rId22"/>
+    <p:notesMasterId r:id="rId26"/>
   </p:notesMasterIdLst>
   <p:handoutMasterIdLst>
-    <p:handoutMasterId r:id="rId23"/>
+    <p:handoutMasterId r:id="rId27"/>
   </p:handoutMasterIdLst>
   <p:sldIdLst>
     <p:sldId id="272" r:id="rId8"/>
@@ -22,12 +22,16 @@
     <p:sldId id="261" r:id="rId13"/>
     <p:sldId id="267" r:id="rId14"/>
     <p:sldId id="260" r:id="rId15"/>
-    <p:sldId id="274" r:id="rId16"/>
-    <p:sldId id="275" r:id="rId17"/>
-    <p:sldId id="276" r:id="rId18"/>
-    <p:sldId id="277" r:id="rId19"/>
-    <p:sldId id="264" r:id="rId20"/>
-    <p:sldId id="265" r:id="rId21"/>
+    <p:sldId id="278" r:id="rId16"/>
+    <p:sldId id="279" r:id="rId17"/>
+    <p:sldId id="274" r:id="rId18"/>
+    <p:sldId id="275" r:id="rId19"/>
+    <p:sldId id="276" r:id="rId20"/>
+    <p:sldId id="280" r:id="rId21"/>
+    <p:sldId id="282" r:id="rId22"/>
+    <p:sldId id="281" r:id="rId23"/>
+    <p:sldId id="283" r:id="rId24"/>
+    <p:sldId id="265" r:id="rId25"/>
   </p:sldIdLst>
   <p:sldSz cx="12192000" cy="6858000"/>
   <p:notesSz cx="6858000" cy="9144000"/>
@@ -143,11 +147,15 @@
             <p14:sldId id="261"/>
             <p14:sldId id="267"/>
             <p14:sldId id="260"/>
+            <p14:sldId id="278"/>
+            <p14:sldId id="279"/>
             <p14:sldId id="274"/>
             <p14:sldId id="275"/>
             <p14:sldId id="276"/>
-            <p14:sldId id="277"/>
-            <p14:sldId id="264"/>
+            <p14:sldId id="280"/>
+            <p14:sldId id="282"/>
+            <p14:sldId id="281"/>
+            <p14:sldId id="283"/>
             <p14:sldId id="265"/>
           </p14:sldIdLst>
         </p14:section>
@@ -265,7 +273,7 @@
           <a:p>
             <a:fld id="{69440670-43D7-400A-ABC5-B69E064DBB37}" type="datetimeFigureOut">
               <a:rPr lang="en-GB" smtClean="0"/>
-              <a:t>19/06/2024</a:t>
+              <a:t>23/06/2024</a:t>
             </a:fld>
             <a:endParaRPr lang="en-GB"/>
           </a:p>
@@ -442,7 +450,7 @@
           <a:p>
             <a:fld id="{611B03A4-75C9-4E3D-9183-2102CA9AEC33}" type="datetimeFigureOut">
               <a:rPr lang="en-GB" smtClean="0"/>
-              <a:t>19/06/2024</a:t>
+              <a:t>23/06/2024</a:t>
             </a:fld>
             <a:endParaRPr lang="en-GB"/>
           </a:p>
@@ -5356,18 +5364,6 @@
               <a:rPr lang="fr-FR" dirty="0" err="1"/>
               <a:t>cont’d</a:t>
             </a:r>
-            <a:r>
-              <a:rPr lang="fr-FR" dirty="0"/>
-              <a:t> </a:t>
-            </a:r>
-            <a:r>
-              <a:rPr lang="fr-FR" dirty="0" err="1"/>
-              <a:t>again</a:t>
-            </a:r>
-            <a:r>
-              <a:rPr lang="fr-FR" dirty="0"/>
-              <a:t>.</a:t>
-            </a:r>
             <a:endParaRPr lang="en-GB" dirty="0"/>
           </a:p>
         </p:txBody>
@@ -5391,31 +5387,53 @@
         <p:spPr/>
         <p:txBody>
           <a:bodyPr>
-            <a:normAutofit/>
+            <a:normAutofit lnSpcReduction="10000"/>
           </a:bodyPr>
           <a:lstStyle/>
           <a:p>
-            <a:pPr>
-              <a:buFont typeface="Wingdings" panose="05000000000000000000" pitchFamily="2" charset="2"/>
-              <a:buChar char="§"/>
-            </a:pPr>
             <a:r>
               <a:rPr lang="fr-FR" dirty="0"/>
-              <a:t>Lambda</a:t>
-            </a:r>
-          </a:p>
-          <a:p>
-            <a:pPr lvl="1">
-              <a:buFont typeface="Wingdings" panose="05000000000000000000" pitchFamily="2" charset="2"/>
-              <a:buChar char="§"/>
-            </a:pPr>
+              <a:t>Session</a:t>
+            </a:r>
+          </a:p>
+          <a:p>
+            <a:pPr lvl="1"/>
+            <a:r>
+              <a:rPr lang="fr-FR" sz="2400" dirty="0" err="1">
+                <a:latin typeface="Cascadia Code" panose="020B0609020000020004" pitchFamily="49" charset="0"/>
+                <a:cs typeface="Cascadia Code" panose="020B0609020000020004" pitchFamily="49" charset="0"/>
+              </a:rPr>
+              <a:t>System.Management.Automation.Runspaces.PSSession</a:t>
+            </a:r>
+            <a:endParaRPr lang="fr-FR" sz="2400" dirty="0">
+              <a:latin typeface="Cascadia Code" panose="020B0609020000020004" pitchFamily="49" charset="0"/>
+              <a:cs typeface="Cascadia Code" panose="020B0609020000020004" pitchFamily="49" charset="0"/>
+            </a:endParaRPr>
+          </a:p>
+          <a:p>
+            <a:pPr lvl="1"/>
             <a:r>
               <a:rPr lang="fr-FR" dirty="0"/>
-              <a:t> An </a:t>
+              <a:t>A </a:t>
             </a:r>
             <a:r>
               <a:rPr lang="fr-FR" dirty="0" err="1"/>
-              <a:t>anonymous</a:t>
+              <a:t>connection</a:t>
+            </a:r>
+            <a:r>
+              <a:rPr lang="fr-FR" dirty="0"/>
+              <a:t> to a Runspace</a:t>
+            </a:r>
+          </a:p>
+          <a:p>
+            <a:pPr lvl="1"/>
+            <a:r>
+              <a:rPr lang="fr-FR" dirty="0"/>
+              <a:t>Public </a:t>
+            </a:r>
+            <a:r>
+              <a:rPr lang="fr-FR" dirty="0" err="1"/>
+              <a:t>wrapper</a:t>
             </a:r>
             <a:r>
               <a:rPr lang="fr-FR" dirty="0"/>
@@ -5423,154 +5441,82 @@
             </a:r>
             <a:r>
               <a:rPr lang="fr-FR" dirty="0" err="1"/>
-              <a:t>function</a:t>
+              <a:t>around</a:t>
             </a:r>
             <a:r>
               <a:rPr lang="fr-FR" dirty="0"/>
-              <a:t> in a </a:t>
+              <a:t> Runspaces to </a:t>
             </a:r>
             <a:r>
               <a:rPr lang="fr-FR" dirty="0" err="1"/>
-              <a:t>programming</a:t>
+              <a:t>make</a:t>
             </a:r>
             <a:r>
               <a:rPr lang="fr-FR" dirty="0"/>
-              <a:t> system.</a:t>
-            </a:r>
-          </a:p>
-          <a:p>
+              <a:t> </a:t>
+            </a:r>
             <a:r>
               <a:rPr lang="fr-FR" dirty="0" err="1"/>
-              <a:t>ScriptBlock</a:t>
-            </a:r>
-            <a:endParaRPr lang="fr-FR" dirty="0"/>
+              <a:t>them</a:t>
+            </a:r>
+            <a:r>
+              <a:rPr lang="fr-FR" dirty="0"/>
+              <a:t> « </a:t>
+            </a:r>
+            <a:r>
+              <a:rPr lang="fr-FR" dirty="0" err="1"/>
+              <a:t>simpler</a:t>
+            </a:r>
+            <a:r>
+              <a:rPr lang="fr-FR" dirty="0"/>
+              <a:t> »</a:t>
+            </a:r>
+          </a:p>
+          <a:p>
+            <a:r>
+              <a:rPr lang="en-GB" dirty="0"/>
+              <a:t>SessionState</a:t>
+            </a:r>
           </a:p>
           <a:p>
             <a:pPr lvl="1"/>
             <a:r>
-              <a:rPr lang="fr-FR" dirty="0"/>
-              <a:t>A lambda in </a:t>
-            </a:r>
-            <a:r>
-              <a:rPr lang="fr-FR" dirty="0" err="1"/>
-              <a:t>in</a:t>
-            </a:r>
-            <a:r>
-              <a:rPr lang="fr-FR" dirty="0"/>
-              <a:t> the PowerShell system.</a:t>
-            </a:r>
+              <a:rPr lang="en-GB" sz="2400" dirty="0" err="1">
+                <a:latin typeface="Cascadia Code" panose="020B0609020000020004" pitchFamily="49" charset="0"/>
+                <a:cs typeface="Cascadia Code" panose="020B0609020000020004" pitchFamily="49" charset="0"/>
+              </a:rPr>
+              <a:t>System.Management.Automation.SessionState</a:t>
+            </a:r>
+            <a:endParaRPr lang="en-GB" sz="2400" dirty="0">
+              <a:latin typeface="Cascadia Code" panose="020B0609020000020004" pitchFamily="49" charset="0"/>
+              <a:cs typeface="Cascadia Code" panose="020B0609020000020004" pitchFamily="49" charset="0"/>
+            </a:endParaRPr>
           </a:p>
           <a:p>
             <a:pPr lvl="1"/>
             <a:r>
-              <a:rPr lang="fr-FR" dirty="0" err="1"/>
-              <a:t>Afinitized</a:t>
-            </a:r>
-            <a:r>
-              <a:rPr lang="fr-FR" dirty="0"/>
-              <a:t> to a </a:t>
-            </a:r>
-            <a:r>
-              <a:rPr lang="fr-FR" dirty="0" err="1"/>
-              <a:t>SessionState</a:t>
-            </a:r>
-            <a:r>
-              <a:rPr lang="fr-FR" dirty="0"/>
-              <a:t>/Module</a:t>
-            </a:r>
-          </a:p>
-          <a:p>
-            <a:r>
               <a:rPr lang="en-GB" dirty="0"/>
-              <a:t>Closure</a:t>
-            </a:r>
+              <a:t>Is part of a Runspace/</a:t>
+            </a:r>
+            <a:r>
+              <a:rPr lang="en-GB" dirty="0" err="1"/>
+              <a:t>ExecutionContext</a:t>
+            </a:r>
+            <a:endParaRPr lang="en-GB" dirty="0"/>
           </a:p>
           <a:p>
             <a:pPr lvl="1"/>
             <a:r>
-              <a:rPr lang="en-US" dirty="0">
-                <a:solidFill>
-                  <a:srgbClr val="202122"/>
-                </a:solidFill>
-                <a:highlight>
-                  <a:srgbClr val="FFFFFF"/>
-                </a:highlight>
-                <a:latin typeface="Arial" panose="020B0604020202020204" pitchFamily="34" charset="0"/>
-              </a:rPr>
-              <a:t>A</a:t>
-            </a:r>
-            <a:r>
-              <a:rPr lang="en-US" b="0" i="0" dirty="0">
-                <a:solidFill>
-                  <a:srgbClr val="202122"/>
-                </a:solidFill>
-                <a:effectLst/>
-                <a:highlight>
-                  <a:srgbClr val="FFFFFF"/>
-                </a:highlight>
-                <a:latin typeface="Arial" panose="020B0604020202020204" pitchFamily="34" charset="0"/>
-              </a:rPr>
-              <a:t> closure is a </a:t>
-            </a:r>
-            <a:r>
-              <a:rPr lang="en-US" b="0" i="0" u="none" strike="noStrike" dirty="0">
-                <a:effectLst/>
-                <a:highlight>
-                  <a:srgbClr val="FFFFFF"/>
-                </a:highlight>
-                <a:latin typeface="Arial" panose="020B0604020202020204" pitchFamily="34" charset="0"/>
-                <a:hlinkClick r:id="rId2" tooltip="Record (computer science)"/>
-              </a:rPr>
-              <a:t>record</a:t>
-            </a:r>
-            <a:r>
-              <a:rPr lang="en-US" b="0" i="0" dirty="0">
-                <a:solidFill>
-                  <a:srgbClr val="202122"/>
-                </a:solidFill>
-                <a:effectLst/>
-                <a:highlight>
-                  <a:srgbClr val="FFFFFF"/>
-                </a:highlight>
-                <a:latin typeface="Arial" panose="020B0604020202020204" pitchFamily="34" charset="0"/>
-              </a:rPr>
-              <a:t> storing an anonymous </a:t>
-            </a:r>
-            <a:r>
-              <a:rPr lang="en-US" b="0" i="0" u="none" strike="noStrike" dirty="0">
-                <a:effectLst/>
-                <a:highlight>
-                  <a:srgbClr val="FFFFFF"/>
-                </a:highlight>
-                <a:latin typeface="Arial" panose="020B0604020202020204" pitchFamily="34" charset="0"/>
-                <a:hlinkClick r:id="rId3" tooltip="Function (computer science)"/>
-              </a:rPr>
-              <a:t>function</a:t>
-            </a:r>
-            <a:r>
-              <a:rPr lang="en-US" b="0" i="0" dirty="0">
-                <a:solidFill>
-                  <a:srgbClr val="202122"/>
-                </a:solidFill>
-                <a:effectLst/>
-                <a:highlight>
-                  <a:srgbClr val="FFFFFF"/>
-                </a:highlight>
-                <a:latin typeface="Arial" panose="020B0604020202020204" pitchFamily="34" charset="0"/>
-              </a:rPr>
-              <a:t> together with an environment.</a:t>
-            </a:r>
-          </a:p>
-          <a:p>
-            <a:pPr lvl="1"/>
-            <a:endParaRPr lang="en-GB" dirty="0"/>
+              <a:rPr lang="en-GB" dirty="0"/>
+              <a:t>Represent a scoped set of bindings within a runspace</a:t>
+            </a:r>
           </a:p>
         </p:txBody>
       </p:sp>
     </p:spTree>
     <p:extLst>
       <p:ext uri="{BB962C8B-B14F-4D97-AF65-F5344CB8AC3E}">
-        <p14:creationId xmlns:p14="http://schemas.microsoft.com/office/powerpoint/2010/main" val="607119400"/>
+        <p14:creationId xmlns:p14="http://schemas.microsoft.com/office/powerpoint/2010/main" val="2450781162"/>
       </p:ext>
     </p:extLst>
   </p:cSld>
@@ -5619,6 +5565,542 @@
           <a:lstStyle/>
           <a:p>
             <a:r>
+              <a:rPr lang="fr-FR" dirty="0" err="1"/>
+              <a:t>Definitions</a:t>
+            </a:r>
+            <a:r>
+              <a:rPr lang="fr-FR" dirty="0"/>
+              <a:t> </a:t>
+            </a:r>
+            <a:r>
+              <a:rPr lang="fr-FR" dirty="0" err="1"/>
+              <a:t>cont’d</a:t>
+            </a:r>
+            <a:r>
+              <a:rPr lang="fr-FR" dirty="0"/>
+              <a:t> </a:t>
+            </a:r>
+            <a:r>
+              <a:rPr lang="fr-FR" dirty="0" err="1"/>
+              <a:t>again</a:t>
+            </a:r>
+            <a:endParaRPr lang="en-GB" dirty="0"/>
+          </a:p>
+        </p:txBody>
+      </p:sp>
+      <p:sp>
+        <p:nvSpPr>
+          <p:cNvPr id="3" name="Espace réservé du contenu 2">
+            <a:extLst>
+              <a:ext uri="{FF2B5EF4-FFF2-40B4-BE49-F238E27FC236}">
+                <a16:creationId xmlns:a16="http://schemas.microsoft.com/office/drawing/2014/main" id="{07D5023A-BA6F-B725-CF78-FD889E577EA6}"/>
+              </a:ext>
+            </a:extLst>
+          </p:cNvPr>
+          <p:cNvSpPr>
+            <a:spLocks noGrp="1"/>
+          </p:cNvSpPr>
+          <p:nvPr>
+            <p:ph idx="1"/>
+          </p:nvPr>
+        </p:nvSpPr>
+        <p:spPr/>
+        <p:txBody>
+          <a:bodyPr>
+            <a:normAutofit/>
+          </a:bodyPr>
+          <a:lstStyle/>
+          <a:p>
+            <a:r>
+              <a:rPr lang="fr-FR" dirty="0"/>
+              <a:t>Scope</a:t>
+            </a:r>
+          </a:p>
+          <a:p>
+            <a:pPr lvl="1"/>
+            <a:r>
+              <a:rPr lang="fr-FR" dirty="0" err="1"/>
+              <a:t>Linked</a:t>
+            </a:r>
+            <a:r>
+              <a:rPr lang="fr-FR" dirty="0"/>
+              <a:t> data structures </a:t>
+            </a:r>
+            <a:r>
+              <a:rPr lang="fr-FR" dirty="0" err="1"/>
+              <a:t>inside</a:t>
+            </a:r>
+            <a:r>
+              <a:rPr lang="fr-FR" dirty="0"/>
+              <a:t> a SessionState </a:t>
+            </a:r>
+            <a:r>
+              <a:rPr lang="fr-FR" dirty="0" err="1"/>
+              <a:t>object</a:t>
+            </a:r>
+            <a:endParaRPr lang="fr-FR" dirty="0"/>
+          </a:p>
+          <a:p>
+            <a:pPr lvl="1"/>
+            <a:r>
+              <a:rPr lang="fr-FR" dirty="0" err="1"/>
+              <a:t>Holds</a:t>
+            </a:r>
+            <a:r>
+              <a:rPr lang="fr-FR" dirty="0"/>
+              <a:t> the active set of bindings in a </a:t>
+            </a:r>
+            <a:r>
+              <a:rPr lang="fr-FR" dirty="0" err="1"/>
+              <a:t>function</a:t>
+            </a:r>
+            <a:r>
+              <a:rPr lang="fr-FR" dirty="0"/>
+              <a:t> call.</a:t>
+            </a:r>
+          </a:p>
+          <a:p>
+            <a:pPr>
+              <a:buFont typeface="Wingdings" panose="05000000000000000000" pitchFamily="2" charset="2"/>
+              <a:buChar char="§"/>
+            </a:pPr>
+            <a:r>
+              <a:rPr lang="fr-FR" dirty="0"/>
+              <a:t>Module</a:t>
+            </a:r>
+          </a:p>
+          <a:p>
+            <a:pPr lvl="1"/>
+            <a:r>
+              <a:rPr lang="fr-FR" sz="2400" dirty="0">
+                <a:latin typeface="Cascadia Code" panose="020B0609020000020004" pitchFamily="49" charset="0"/>
+                <a:cs typeface="Cascadia Code" panose="020B0609020000020004" pitchFamily="49" charset="0"/>
+              </a:rPr>
+              <a:t>[</a:t>
+            </a:r>
+            <a:r>
+              <a:rPr lang="fr-FR" sz="2400" dirty="0" err="1">
+                <a:latin typeface="Cascadia Code" panose="020B0609020000020004" pitchFamily="49" charset="0"/>
+                <a:cs typeface="Cascadia Code" panose="020B0609020000020004" pitchFamily="49" charset="0"/>
+              </a:rPr>
+              <a:t>System.Management.Automation.PSModuleInfo</a:t>
+            </a:r>
+            <a:r>
+              <a:rPr lang="fr-FR" sz="2400" dirty="0">
+                <a:latin typeface="Cascadia Code" panose="020B0609020000020004" pitchFamily="49" charset="0"/>
+                <a:cs typeface="Cascadia Code" panose="020B0609020000020004" pitchFamily="49" charset="0"/>
+              </a:rPr>
+              <a:t>]</a:t>
+            </a:r>
+          </a:p>
+          <a:p>
+            <a:pPr lvl="1">
+              <a:buFont typeface="Wingdings" panose="05000000000000000000" pitchFamily="2" charset="2"/>
+              <a:buChar char="§"/>
+            </a:pPr>
+            <a:r>
+              <a:rPr lang="fr-FR" dirty="0"/>
+              <a:t>A programmer-</a:t>
+            </a:r>
+            <a:r>
+              <a:rPr lang="fr-FR" dirty="0" err="1"/>
+              <a:t>focused</a:t>
+            </a:r>
+            <a:r>
+              <a:rPr lang="fr-FR" dirty="0"/>
+              <a:t> </a:t>
+            </a:r>
+            <a:r>
+              <a:rPr lang="fr-FR" dirty="0" err="1"/>
+              <a:t>wrapper</a:t>
+            </a:r>
+            <a:r>
+              <a:rPr lang="fr-FR" dirty="0"/>
+              <a:t> </a:t>
+            </a:r>
+            <a:r>
+              <a:rPr lang="fr-FR" dirty="0" err="1"/>
+              <a:t>around</a:t>
+            </a:r>
+            <a:r>
+              <a:rPr lang="fr-FR" dirty="0"/>
+              <a:t> a </a:t>
+            </a:r>
+            <a:r>
+              <a:rPr lang="fr-FR" sz="2200" dirty="0">
+                <a:latin typeface="Cascadia Code" panose="020B0609020000020004" pitchFamily="49" charset="0"/>
+                <a:cs typeface="Cascadia Code" panose="020B0609020000020004" pitchFamily="49" charset="0"/>
+              </a:rPr>
+              <a:t>[SessionState] </a:t>
+            </a:r>
+            <a:r>
+              <a:rPr lang="fr-FR" dirty="0" err="1"/>
+              <a:t>object</a:t>
+            </a:r>
+            <a:r>
+              <a:rPr lang="fr-FR" dirty="0"/>
+              <a:t> </a:t>
+            </a:r>
+            <a:r>
+              <a:rPr lang="fr-FR" dirty="0" err="1"/>
+              <a:t>that</a:t>
+            </a:r>
+            <a:r>
+              <a:rPr lang="fr-FR" dirty="0"/>
+              <a:t> </a:t>
+            </a:r>
+            <a:r>
+              <a:rPr lang="fr-FR" dirty="0" err="1"/>
+              <a:t>acts</a:t>
+            </a:r>
+            <a:r>
+              <a:rPr lang="fr-FR" dirty="0"/>
+              <a:t> like a </a:t>
+            </a:r>
+            <a:r>
+              <a:rPr lang="fr-FR" i="1" dirty="0" err="1"/>
+              <a:t>lens</a:t>
+            </a:r>
+            <a:r>
+              <a:rPr lang="fr-FR" dirty="0"/>
+              <a:t>.</a:t>
+            </a:r>
+          </a:p>
+          <a:p>
+            <a:pPr lvl="1">
+              <a:buFont typeface="Wingdings" panose="05000000000000000000" pitchFamily="2" charset="2"/>
+              <a:buChar char="§"/>
+            </a:pPr>
+            <a:r>
+              <a:rPr lang="fr-FR" dirty="0"/>
+              <a:t>Modules can </a:t>
+            </a:r>
+            <a:r>
+              <a:rPr lang="fr-FR" dirty="0" err="1"/>
+              <a:t>be</a:t>
+            </a:r>
+            <a:r>
+              <a:rPr lang="fr-FR" dirty="0"/>
+              <a:t> </a:t>
+            </a:r>
+            <a:r>
+              <a:rPr lang="fr-FR" dirty="0" err="1"/>
+              <a:t>linked</a:t>
+            </a:r>
+            <a:r>
+              <a:rPr lang="fr-FR" dirty="0"/>
+              <a:t> </a:t>
+            </a:r>
+            <a:r>
+              <a:rPr lang="fr-FR" dirty="0" err="1"/>
+              <a:t>together</a:t>
+            </a:r>
+            <a:endParaRPr lang="fr-FR" dirty="0"/>
+          </a:p>
+        </p:txBody>
+      </p:sp>
+    </p:spTree>
+    <p:extLst>
+      <p:ext uri="{BB962C8B-B14F-4D97-AF65-F5344CB8AC3E}">
+        <p14:creationId xmlns:p14="http://schemas.microsoft.com/office/powerpoint/2010/main" val="281987410"/>
+      </p:ext>
+    </p:extLst>
+  </p:cSld>
+  <p:clrMapOvr>
+    <a:masterClrMapping/>
+  </p:clrMapOvr>
+</p:sld>
+</file>
+
+<file path=ppt/slides/slide12.xml><?xml version="1.0" encoding="utf-8"?>
+<p:sld xmlns:a="http://schemas.openxmlformats.org/drawingml/2006/main" xmlns:r="http://schemas.openxmlformats.org/officeDocument/2006/relationships" xmlns:p="http://schemas.openxmlformats.org/presentationml/2006/main">
+  <p:cSld>
+    <p:spTree>
+      <p:nvGrpSpPr>
+        <p:cNvPr id="1" name=""/>
+        <p:cNvGrpSpPr/>
+        <p:nvPr/>
+      </p:nvGrpSpPr>
+      <p:grpSpPr>
+        <a:xfrm>
+          <a:off x="0" y="0"/>
+          <a:ext cx="0" cy="0"/>
+          <a:chOff x="0" y="0"/>
+          <a:chExt cx="0" cy="0"/>
+        </a:xfrm>
+      </p:grpSpPr>
+      <p:sp>
+        <p:nvSpPr>
+          <p:cNvPr id="2" name="Titre 1">
+            <a:extLst>
+              <a:ext uri="{FF2B5EF4-FFF2-40B4-BE49-F238E27FC236}">
+                <a16:creationId xmlns:a16="http://schemas.microsoft.com/office/drawing/2014/main" id="{5191E0F2-FE77-51ED-3F72-223B58926E74}"/>
+              </a:ext>
+            </a:extLst>
+          </p:cNvPr>
+          <p:cNvSpPr>
+            <a:spLocks noGrp="1"/>
+          </p:cNvSpPr>
+          <p:nvPr>
+            <p:ph type="title"/>
+          </p:nvPr>
+        </p:nvSpPr>
+        <p:spPr/>
+        <p:txBody>
+          <a:bodyPr/>
+          <a:lstStyle/>
+          <a:p>
+            <a:r>
+              <a:rPr lang="fr-FR" dirty="0" err="1"/>
+              <a:t>Definitions</a:t>
+            </a:r>
+            <a:r>
+              <a:rPr lang="fr-FR" dirty="0"/>
+              <a:t> </a:t>
+            </a:r>
+            <a:r>
+              <a:rPr lang="fr-FR" dirty="0" err="1"/>
+              <a:t>cont’d</a:t>
+            </a:r>
+            <a:r>
+              <a:rPr lang="fr-FR" dirty="0"/>
+              <a:t> last time.</a:t>
+            </a:r>
+            <a:endParaRPr lang="en-GB" dirty="0"/>
+          </a:p>
+        </p:txBody>
+      </p:sp>
+      <p:sp>
+        <p:nvSpPr>
+          <p:cNvPr id="3" name="Espace réservé du contenu 2">
+            <a:extLst>
+              <a:ext uri="{FF2B5EF4-FFF2-40B4-BE49-F238E27FC236}">
+                <a16:creationId xmlns:a16="http://schemas.microsoft.com/office/drawing/2014/main" id="{07D5023A-BA6F-B725-CF78-FD889E577EA6}"/>
+              </a:ext>
+            </a:extLst>
+          </p:cNvPr>
+          <p:cNvSpPr>
+            <a:spLocks noGrp="1"/>
+          </p:cNvSpPr>
+          <p:nvPr>
+            <p:ph idx="1"/>
+          </p:nvPr>
+        </p:nvSpPr>
+        <p:spPr>
+          <a:xfrm>
+            <a:off x="838200" y="1604167"/>
+            <a:ext cx="10515600" cy="4975225"/>
+          </a:xfrm>
+        </p:spPr>
+        <p:txBody>
+          <a:bodyPr>
+            <a:normAutofit/>
+          </a:bodyPr>
+          <a:lstStyle/>
+          <a:p>
+            <a:pPr>
+              <a:buFont typeface="Wingdings" panose="05000000000000000000" pitchFamily="2" charset="2"/>
+              <a:buChar char="§"/>
+            </a:pPr>
+            <a:r>
+              <a:rPr lang="fr-FR" dirty="0"/>
+              <a:t>Lambda</a:t>
+            </a:r>
+          </a:p>
+          <a:p>
+            <a:pPr lvl="1">
+              <a:buFont typeface="Wingdings" panose="05000000000000000000" pitchFamily="2" charset="2"/>
+              <a:buChar char="§"/>
+            </a:pPr>
+            <a:r>
+              <a:rPr lang="fr-FR" dirty="0"/>
+              <a:t> An </a:t>
+            </a:r>
+            <a:r>
+              <a:rPr lang="fr-FR" i="1" dirty="0" err="1"/>
+              <a:t>anonymous</a:t>
+            </a:r>
+            <a:r>
+              <a:rPr lang="fr-FR" i="1" dirty="0"/>
+              <a:t> </a:t>
+            </a:r>
+            <a:r>
+              <a:rPr lang="fr-FR" i="1" dirty="0" err="1"/>
+              <a:t>function</a:t>
+            </a:r>
+            <a:r>
+              <a:rPr lang="fr-FR" i="1" dirty="0"/>
+              <a:t> </a:t>
+            </a:r>
+            <a:r>
+              <a:rPr lang="fr-FR" dirty="0"/>
+              <a:t>in a </a:t>
+            </a:r>
+            <a:r>
+              <a:rPr lang="fr-FR" dirty="0" err="1"/>
+              <a:t>programming</a:t>
+            </a:r>
+            <a:r>
+              <a:rPr lang="fr-FR" dirty="0"/>
+              <a:t> system.</a:t>
+            </a:r>
+          </a:p>
+          <a:p>
+            <a:r>
+              <a:rPr lang="en-US" dirty="0"/>
+              <a:t>Closure (from Wikipedia)</a:t>
+            </a:r>
+          </a:p>
+          <a:p>
+            <a:pPr lvl="1"/>
+            <a:r>
+              <a:rPr lang="en-US" dirty="0"/>
+              <a:t>A closure is a record storing an </a:t>
+            </a:r>
+            <a:r>
+              <a:rPr lang="en-US" i="1" dirty="0"/>
+              <a:t>anonymous function </a:t>
+            </a:r>
+            <a:r>
+              <a:rPr lang="en-US" dirty="0"/>
+              <a:t>together with an </a:t>
+            </a:r>
+            <a:r>
+              <a:rPr lang="en-US" i="1" dirty="0"/>
+              <a:t>environment</a:t>
+            </a:r>
+            <a:r>
+              <a:rPr lang="en-US" dirty="0"/>
+              <a:t>.</a:t>
+            </a:r>
+          </a:p>
+          <a:p>
+            <a:r>
+              <a:rPr lang="fr-FR" dirty="0" err="1"/>
+              <a:t>ScriptBlock</a:t>
+            </a:r>
+            <a:endParaRPr lang="fr-FR" dirty="0"/>
+          </a:p>
+          <a:p>
+            <a:pPr lvl="1"/>
+            <a:r>
+              <a:rPr lang="fr-FR" dirty="0"/>
+              <a:t>A lambda in </a:t>
+            </a:r>
+            <a:r>
+              <a:rPr lang="fr-FR" dirty="0" err="1"/>
+              <a:t>in</a:t>
+            </a:r>
+            <a:r>
+              <a:rPr lang="fr-FR" dirty="0"/>
+              <a:t> the PowerShell system.</a:t>
+            </a:r>
+          </a:p>
+          <a:p>
+            <a:pPr lvl="1"/>
+            <a:r>
+              <a:rPr lang="fr-FR" dirty="0"/>
+              <a:t>Can </a:t>
+            </a:r>
+            <a:r>
+              <a:rPr lang="fr-FR" dirty="0" err="1"/>
+              <a:t>be</a:t>
+            </a:r>
+            <a:r>
+              <a:rPr lang="fr-FR" dirty="0"/>
+              <a:t> </a:t>
+            </a:r>
+            <a:r>
+              <a:rPr lang="fr-FR" dirty="0" err="1"/>
+              <a:t>afinitized</a:t>
+            </a:r>
+            <a:r>
+              <a:rPr lang="fr-FR" dirty="0"/>
+              <a:t> to a SessionState/Module in </a:t>
+            </a:r>
+            <a:r>
+              <a:rPr lang="fr-FR" dirty="0" err="1"/>
+              <a:t>which</a:t>
+            </a:r>
+            <a:r>
+              <a:rPr lang="fr-FR" dirty="0"/>
+              <a:t> case </a:t>
+            </a:r>
+            <a:r>
+              <a:rPr lang="fr-FR" dirty="0" err="1"/>
+              <a:t>it’s</a:t>
+            </a:r>
+            <a:r>
+              <a:rPr lang="fr-FR" dirty="0"/>
+              <a:t> a </a:t>
+            </a:r>
+            <a:r>
+              <a:rPr lang="fr-FR" dirty="0" err="1"/>
+              <a:t>closure</a:t>
+            </a:r>
+            <a:r>
+              <a:rPr lang="fr-FR" dirty="0"/>
+              <a:t>.</a:t>
+            </a:r>
+          </a:p>
+          <a:p>
+            <a:pPr lvl="1"/>
+            <a:endParaRPr lang="en-GB" dirty="0"/>
+          </a:p>
+        </p:txBody>
+      </p:sp>
+    </p:spTree>
+    <p:extLst>
+      <p:ext uri="{BB962C8B-B14F-4D97-AF65-F5344CB8AC3E}">
+        <p14:creationId xmlns:p14="http://schemas.microsoft.com/office/powerpoint/2010/main" val="607119400"/>
+      </p:ext>
+    </p:extLst>
+  </p:cSld>
+  <p:clrMapOvr>
+    <a:masterClrMapping/>
+  </p:clrMapOvr>
+</p:sld>
+</file>
+
+<file path=ppt/slides/slide13.xml><?xml version="1.0" encoding="utf-8"?>
+<p:sld xmlns:a="http://schemas.openxmlformats.org/drawingml/2006/main" xmlns:r="http://schemas.openxmlformats.org/officeDocument/2006/relationships" xmlns:p="http://schemas.openxmlformats.org/presentationml/2006/main">
+  <p:cSld>
+    <p:spTree>
+      <p:nvGrpSpPr>
+        <p:cNvPr id="1" name=""/>
+        <p:cNvGrpSpPr/>
+        <p:nvPr/>
+      </p:nvGrpSpPr>
+      <p:grpSpPr>
+        <a:xfrm>
+          <a:off x="0" y="0"/>
+          <a:ext cx="0" cy="0"/>
+          <a:chOff x="0" y="0"/>
+          <a:chExt cx="0" cy="0"/>
+        </a:xfrm>
+      </p:grpSpPr>
+      <p:sp>
+        <p:nvSpPr>
+          <p:cNvPr id="2" name="Titre 1">
+            <a:extLst>
+              <a:ext uri="{FF2B5EF4-FFF2-40B4-BE49-F238E27FC236}">
+                <a16:creationId xmlns:a16="http://schemas.microsoft.com/office/drawing/2014/main" id="{5191E0F2-FE77-51ED-3F72-223B58926E74}"/>
+              </a:ext>
+            </a:extLst>
+          </p:cNvPr>
+          <p:cNvSpPr>
+            <a:spLocks noGrp="1"/>
+          </p:cNvSpPr>
+          <p:nvPr>
+            <p:ph type="title"/>
+          </p:nvPr>
+        </p:nvSpPr>
+        <p:spPr/>
+        <p:txBody>
+          <a:bodyPr/>
+          <a:lstStyle/>
+          <a:p>
+            <a:r>
               <a:rPr lang="fr-FR" dirty="0"/>
               <a:t>All </a:t>
             </a:r>
@@ -5814,9 +6296,10 @@
           <a:lstStyle/>
           <a:p>
             <a:r>
-              <a:rPr lang="en-US" dirty="0"/>
-              <a:t>Session</a:t>
-            </a:r>
+              <a:rPr lang="en-US" dirty="0" err="1"/>
+              <a:t>PSSession</a:t>
+            </a:r>
+            <a:endParaRPr lang="en-US" dirty="0"/>
           </a:p>
         </p:txBody>
       </p:sp>
@@ -5834,8 +6317,8 @@
         </p:nvSpPr>
         <p:spPr>
           <a:xfrm>
-            <a:off x="1840706" y="2524970"/>
-            <a:ext cx="1543050" cy="369332"/>
+            <a:off x="1840705" y="2524970"/>
+            <a:ext cx="3011391" cy="369332"/>
           </a:xfrm>
           <a:prstGeom prst="rect">
             <a:avLst/>
@@ -5854,8 +6337,21 @@
                   <a:schemeClr val="bg1"/>
                 </a:solidFill>
               </a:rPr>
-              <a:t>Runspace</a:t>
-            </a:r>
+              <a:t>Runspace/</a:t>
+            </a:r>
+            <a:r>
+              <a:rPr lang="en-US" dirty="0" err="1">
+                <a:solidFill>
+                  <a:schemeClr val="bg1"/>
+                </a:solidFill>
+              </a:rPr>
+              <a:t>ExecutionContext</a:t>
+            </a:r>
+            <a:endParaRPr lang="en-US" dirty="0">
+              <a:solidFill>
+                <a:schemeClr val="bg1"/>
+              </a:solidFill>
+            </a:endParaRPr>
           </a:p>
         </p:txBody>
       </p:sp>
@@ -5893,7 +6389,7 @@
                   <a:schemeClr val="bg1"/>
                 </a:solidFill>
               </a:rPr>
-              <a:t>Runspace SessionState</a:t>
+              <a:t>SessionState</a:t>
             </a:r>
           </a:p>
         </p:txBody>
@@ -6232,7 +6728,7 @@
 </p:sld>
 </file>
 
-<file path=ppt/slides/slide12.xml><?xml version="1.0" encoding="utf-8"?>
+<file path=ppt/slides/slide14.xml><?xml version="1.0" encoding="utf-8"?>
 <p:sld xmlns:a="http://schemas.openxmlformats.org/drawingml/2006/main" xmlns:r="http://schemas.openxmlformats.org/officeDocument/2006/relationships" xmlns:p="http://schemas.openxmlformats.org/presentationml/2006/main">
   <p:cSld>
     <p:spTree>
@@ -6271,12 +6767,16 @@
           <a:lstStyle/>
           <a:p>
             <a:r>
-              <a:rPr lang="fr-FR" dirty="0"/>
-              <a:t>Lambda/</a:t>
-            </a:r>
-            <a:r>
               <a:rPr lang="fr-FR" dirty="0" err="1"/>
               <a:t>ScriptBlock</a:t>
+            </a:r>
+            <a:r>
+              <a:rPr lang="fr-FR" dirty="0"/>
+              <a:t> </a:t>
+            </a:r>
+            <a:r>
+              <a:rPr lang="fr-FR" dirty="0" err="1"/>
+              <a:t>Redux</a:t>
             </a:r>
             <a:r>
               <a:rPr lang="fr-FR" dirty="0"/>
@@ -6305,7 +6805,7 @@
         <p:spPr/>
         <p:txBody>
           <a:bodyPr>
-            <a:normAutofit/>
+            <a:normAutofit lnSpcReduction="10000"/>
           </a:bodyPr>
           <a:lstStyle/>
           <a:p>
@@ -6314,9 +6814,10 @@
               <a:buChar char="§"/>
             </a:pPr>
             <a:r>
-              <a:rPr lang="fr-FR" dirty="0"/>
-              <a:t>Lambda</a:t>
-            </a:r>
+              <a:rPr lang="fr-FR" dirty="0" err="1"/>
+              <a:t>ScriptBlock</a:t>
+            </a:r>
+            <a:endParaRPr lang="fr-FR" dirty="0"/>
           </a:p>
           <a:p>
             <a:pPr lvl="1">
@@ -6325,87 +6826,163 @@
             </a:pPr>
             <a:r>
               <a:rPr lang="fr-FR" dirty="0"/>
-              <a:t> An </a:t>
+              <a:t> </a:t>
+            </a:r>
+            <a:r>
+              <a:rPr lang="en-US" sz="3000" dirty="0">
+                <a:solidFill>
+                  <a:srgbClr val="202122"/>
+                </a:solidFill>
+                <a:highlight>
+                  <a:srgbClr val="FFFFFF"/>
+                </a:highlight>
+                <a:latin typeface="Cascadia Code" panose="020B0609020000020004" pitchFamily="49" charset="0"/>
+                <a:cs typeface="Cascadia Code" panose="020B0609020000020004" pitchFamily="49" charset="0"/>
+              </a:rPr>
+              <a:t>[</a:t>
+            </a:r>
+            <a:r>
+              <a:rPr lang="en-US" sz="3000" dirty="0" err="1">
+                <a:solidFill>
+                  <a:srgbClr val="202122"/>
+                </a:solidFill>
+                <a:highlight>
+                  <a:srgbClr val="FFFFFF"/>
+                </a:highlight>
+                <a:latin typeface="Cascadia Code" panose="020B0609020000020004" pitchFamily="49" charset="0"/>
+                <a:cs typeface="Cascadia Code" panose="020B0609020000020004" pitchFamily="49" charset="0"/>
+              </a:rPr>
+              <a:t>System.Management.Automation.ScriptBlock</a:t>
+            </a:r>
+            <a:r>
+              <a:rPr lang="en-US" sz="3000" dirty="0">
+                <a:solidFill>
+                  <a:srgbClr val="202122"/>
+                </a:solidFill>
+                <a:highlight>
+                  <a:srgbClr val="FFFFFF"/>
+                </a:highlight>
+                <a:latin typeface="Cascadia Code" panose="020B0609020000020004" pitchFamily="49" charset="0"/>
+                <a:cs typeface="Cascadia Code" panose="020B0609020000020004" pitchFamily="49" charset="0"/>
+              </a:rPr>
+              <a:t>]</a:t>
+            </a:r>
+            <a:endParaRPr lang="fr-FR" dirty="0">
+              <a:latin typeface="Cascadia Code" panose="020B0609020000020004" pitchFamily="49" charset="0"/>
+              <a:cs typeface="Cascadia Code" panose="020B0609020000020004" pitchFamily="49" charset="0"/>
+            </a:endParaRPr>
+          </a:p>
+          <a:p>
+            <a:pPr lvl="1">
+              <a:buFont typeface="Wingdings" panose="05000000000000000000" pitchFamily="2" charset="2"/>
+              <a:buChar char="§"/>
+            </a:pPr>
+            <a:r>
+              <a:rPr lang="fr-FR" dirty="0"/>
+              <a:t>Has an </a:t>
             </a:r>
             <a:r>
               <a:rPr lang="fr-FR" dirty="0" err="1"/>
-              <a:t>anonymous</a:t>
+              <a:t>associated</a:t>
             </a:r>
             <a:r>
               <a:rPr lang="fr-FR" dirty="0"/>
               <a:t> </a:t>
             </a:r>
             <a:r>
+              <a:rPr lang="fr-FR" sz="2400" dirty="0">
+                <a:latin typeface="Cascadia Code" panose="020B0609020000020004" pitchFamily="49" charset="0"/>
+                <a:cs typeface="Cascadia Code" panose="020B0609020000020004" pitchFamily="49" charset="0"/>
+              </a:rPr>
+              <a:t>Module</a:t>
+            </a:r>
+            <a:r>
+              <a:rPr lang="fr-FR" dirty="0"/>
+              <a:t> </a:t>
+            </a:r>
+            <a:r>
               <a:rPr lang="fr-FR" dirty="0" err="1"/>
-              <a:t>function</a:t>
+              <a:t>member</a:t>
             </a:r>
             <a:r>
               <a:rPr lang="fr-FR" dirty="0"/>
-              <a:t> in a </a:t>
+              <a:t>. If </a:t>
             </a:r>
             <a:r>
               <a:rPr lang="fr-FR" dirty="0" err="1"/>
-              <a:t>programming</a:t>
+              <a:t>this</a:t>
             </a:r>
             <a:r>
               <a:rPr lang="fr-FR" dirty="0"/>
-              <a:t> system.</a:t>
-            </a:r>
-          </a:p>
-          <a:p>
+              <a:t> </a:t>
+            </a:r>
             <a:r>
               <a:rPr lang="fr-FR" dirty="0" err="1"/>
-              <a:t>ScriptBlock</a:t>
+              <a:t>member</a:t>
+            </a:r>
+            <a:r>
+              <a:rPr lang="fr-FR" dirty="0"/>
+              <a:t> </a:t>
+            </a:r>
+            <a:r>
+              <a:rPr lang="fr-FR" dirty="0" err="1"/>
+              <a:t>is</a:t>
+            </a:r>
+            <a:r>
+              <a:rPr lang="fr-FR" dirty="0"/>
+              <a:t> not $</a:t>
+            </a:r>
+            <a:r>
+              <a:rPr lang="fr-FR" dirty="0" err="1"/>
+              <a:t>null</a:t>
+            </a:r>
+            <a:r>
+              <a:rPr lang="fr-FR" dirty="0"/>
+              <a:t>, </a:t>
+            </a:r>
+            <a:r>
+              <a:rPr lang="fr-FR" dirty="0" err="1"/>
+              <a:t>then</a:t>
+            </a:r>
+            <a:r>
+              <a:rPr lang="fr-FR" dirty="0"/>
+              <a:t> </a:t>
+            </a:r>
+            <a:r>
+              <a:rPr lang="fr-FR" dirty="0" err="1"/>
+              <a:t>you</a:t>
+            </a:r>
+            <a:r>
+              <a:rPr lang="fr-FR" dirty="0"/>
+              <a:t> have a </a:t>
+            </a:r>
+            <a:r>
+              <a:rPr lang="fr-FR" i="1" dirty="0" err="1"/>
+              <a:t>bound</a:t>
+            </a:r>
+            <a:r>
+              <a:rPr lang="fr-FR" dirty="0"/>
+              <a:t> </a:t>
+            </a:r>
+            <a:r>
+              <a:rPr lang="fr-FR" dirty="0" err="1"/>
+              <a:t>scriptblock</a:t>
+            </a:r>
+            <a:r>
+              <a:rPr lang="fr-FR" dirty="0"/>
+              <a:t> i.e. a </a:t>
+            </a:r>
+            <a:r>
+              <a:rPr lang="fr-FR" dirty="0" err="1"/>
+              <a:t>closure</a:t>
             </a:r>
             <a:endParaRPr lang="fr-FR" dirty="0"/>
           </a:p>
           <a:p>
-            <a:pPr lvl="1"/>
-            <a:r>
-              <a:rPr lang="fr-FR" dirty="0"/>
-              <a:t>A lambda in </a:t>
-            </a:r>
-            <a:r>
-              <a:rPr lang="fr-FR" dirty="0" err="1"/>
-              <a:t>in</a:t>
-            </a:r>
-            <a:r>
-              <a:rPr lang="fr-FR" dirty="0"/>
-              <a:t> the PowerShell system.</a:t>
-            </a:r>
-          </a:p>
-          <a:p>
-            <a:pPr lvl="1"/>
-            <a:r>
-              <a:rPr lang="fr-FR" dirty="0" err="1"/>
-              <a:t>Afinitized</a:t>
-            </a:r>
-            <a:r>
-              <a:rPr lang="fr-FR" dirty="0"/>
-              <a:t> to a </a:t>
-            </a:r>
-            <a:r>
-              <a:rPr lang="fr-FR" dirty="0" err="1"/>
-              <a:t>SessionState</a:t>
-            </a:r>
-            <a:r>
-              <a:rPr lang="fr-FR" dirty="0"/>
-              <a:t>/Module</a:t>
-            </a:r>
-          </a:p>
-          <a:p>
-            <a:r>
-              <a:rPr lang="en-GB" dirty="0"/>
-              <a:t>Closure (</a:t>
-            </a:r>
-            <a:r>
-              <a:rPr lang="en-GB"/>
-              <a:t>From Wikipedia)</a:t>
-            </a:r>
-            <a:endParaRPr lang="en-GB" dirty="0"/>
-          </a:p>
-          <a:p>
-            <a:pPr lvl="1"/>
+            <a:r>
+              <a:rPr lang="en-US" dirty="0"/>
+              <a:t>Active engine bindings are maintained</a:t>
+            </a:r>
             <a:r>
               <a:rPr lang="en-US" dirty="0">
                 <a:solidFill>
@@ -6416,7 +6993,7 @@
                 </a:highlight>
                 <a:latin typeface="Arial" panose="020B0604020202020204" pitchFamily="34" charset="0"/>
               </a:rPr>
-              <a:t>A</a:t>
+              <a:t> using t</a:t>
             </a:r>
             <a:r>
               <a:rPr lang="en-US" b="0" i="0" dirty="0">
@@ -6429,56 +7006,33 @@
                 </a:highlight>
                 <a:latin typeface="Arial" panose="020B0604020202020204" pitchFamily="34" charset="0"/>
               </a:rPr>
-              <a:t> closure is a </a:t>
-            </a:r>
-            <a:r>
-              <a:rPr lang="en-US" b="0" i="0" u="none" strike="noStrike" dirty="0">
-                <a:effectLst/>
-                <a:highlight>
-                  <a:srgbClr val="FFFFFF"/>
-                </a:highlight>
-                <a:latin typeface="Arial" panose="020B0604020202020204" pitchFamily="34" charset="0"/>
-                <a:hlinkClick r:id="rId2" tooltip="Record (computer science)"/>
-              </a:rPr>
-              <a:t>record</a:t>
-            </a:r>
-            <a:r>
-              <a:rPr lang="en-US" b="0" i="0" dirty="0">
+              <a:t>hread-local storage</a:t>
+            </a:r>
+          </a:p>
+          <a:p>
+            <a:pPr lvl="1"/>
+            <a:r>
+              <a:rPr lang="en-US" dirty="0">
                 <a:solidFill>
                   <a:srgbClr val="202122"/>
                 </a:solidFill>
-                <a:effectLst/>
                 <a:highlight>
                   <a:srgbClr val="FFFFFF"/>
                 </a:highlight>
                 <a:latin typeface="Arial" panose="020B0604020202020204" pitchFamily="34" charset="0"/>
               </a:rPr>
-              <a:t> storing an anonymous </a:t>
-            </a:r>
-            <a:r>
-              <a:rPr lang="en-US" b="0" i="0" u="none" strike="noStrike" dirty="0">
-                <a:effectLst/>
-                <a:highlight>
-                  <a:srgbClr val="FFFFFF"/>
-                </a:highlight>
-                <a:latin typeface="Arial" panose="020B0604020202020204" pitchFamily="34" charset="0"/>
-                <a:hlinkClick r:id="rId3" tooltip="Function (computer science)"/>
-              </a:rPr>
-              <a:t>function</a:t>
-            </a:r>
-            <a:r>
-              <a:rPr lang="en-US" b="0" i="0" dirty="0">
-                <a:solidFill>
-                  <a:srgbClr val="202122"/>
-                </a:solidFill>
-                <a:effectLst/>
-                <a:highlight>
-                  <a:srgbClr val="FFFFFF"/>
-                </a:highlight>
-                <a:latin typeface="Arial" panose="020B0604020202020204" pitchFamily="34" charset="0"/>
-              </a:rPr>
-              <a:t> together with an environment.</a:t>
-            </a:r>
+              <a:t>On entry to a function with an environment, the current environment is saved and the new environment is assigned to thread-local storage</a:t>
+            </a:r>
+            <a:endParaRPr lang="en-US" b="0" i="0" dirty="0">
+              <a:solidFill>
+                <a:srgbClr val="202122"/>
+              </a:solidFill>
+              <a:effectLst/>
+              <a:highlight>
+                <a:srgbClr val="FFFFFF"/>
+              </a:highlight>
+              <a:latin typeface="Arial" panose="020B0604020202020204" pitchFamily="34" charset="0"/>
+            </a:endParaRPr>
           </a:p>
           <a:p>
             <a:pPr lvl="1"/>
@@ -6489,7 +7043,7 @@
     </p:spTree>
     <p:extLst>
       <p:ext uri="{BB962C8B-B14F-4D97-AF65-F5344CB8AC3E}">
-        <p14:creationId xmlns:p14="http://schemas.microsoft.com/office/powerpoint/2010/main" val="66231404"/>
+        <p14:creationId xmlns:p14="http://schemas.microsoft.com/office/powerpoint/2010/main" val="1746242364"/>
       </p:ext>
     </p:extLst>
   </p:cSld>
@@ -6499,7 +7053,7 @@
 </p:sld>
 </file>
 
-<file path=ppt/slides/slide13.xml><?xml version="1.0" encoding="utf-8"?>
+<file path=ppt/slides/slide15.xml><?xml version="1.0" encoding="utf-8"?>
 <p:sld xmlns:a="http://schemas.openxmlformats.org/drawingml/2006/main" xmlns:r="http://schemas.openxmlformats.org/officeDocument/2006/relationships" xmlns:p="http://schemas.openxmlformats.org/presentationml/2006/main">
   <p:cSld>
     <p:spTree>
@@ -6518,10 +7072,10 @@
       </p:grpSpPr>
       <p:sp>
         <p:nvSpPr>
-          <p:cNvPr id="4" name="Title 3">
+          <p:cNvPr id="2" name="Titre 1">
             <a:extLst>
               <a:ext uri="{FF2B5EF4-FFF2-40B4-BE49-F238E27FC236}">
-                <a16:creationId xmlns:a16="http://schemas.microsoft.com/office/drawing/2014/main" id="{2B167248-C99C-E892-89E1-4CBB81F02F90}"/>
+                <a16:creationId xmlns:a16="http://schemas.microsoft.com/office/drawing/2014/main" id="{5191E0F2-FE77-51ED-3F72-223B58926E74}"/>
               </a:ext>
             </a:extLst>
           </p:cNvPr>
@@ -6532,29 +7086,29 @@
             <p:ph type="title"/>
           </p:nvPr>
         </p:nvSpPr>
-        <p:spPr>
-          <a:xfrm>
-            <a:off x="831850" y="529389"/>
-            <a:ext cx="10515600" cy="1004637"/>
-          </a:xfrm>
-        </p:spPr>
+        <p:spPr/>
         <p:txBody>
           <a:bodyPr/>
           <a:lstStyle/>
           <a:p>
             <a:r>
-              <a:rPr lang="en-GB"/>
-              <a:t>Demos</a:t>
-            </a:r>
+              <a:rPr lang="fr-FR" dirty="0" err="1"/>
+              <a:t>ScriptBlock</a:t>
+            </a:r>
+            <a:r>
+              <a:rPr lang="fr-FR" dirty="0"/>
+              <a:t> APIs.</a:t>
+            </a:r>
+            <a:endParaRPr lang="en-GB" dirty="0"/>
           </a:p>
         </p:txBody>
       </p:sp>
       <p:sp>
         <p:nvSpPr>
-          <p:cNvPr id="5" name="Text Placeholder 4">
+          <p:cNvPr id="3" name="Espace réservé du contenu 2">
             <a:extLst>
               <a:ext uri="{FF2B5EF4-FFF2-40B4-BE49-F238E27FC236}">
-                <a16:creationId xmlns:a16="http://schemas.microsoft.com/office/drawing/2014/main" id="{2CACAFC7-78CB-98F9-FEF3-D3E8C9FF6E6F}"/>
+                <a16:creationId xmlns:a16="http://schemas.microsoft.com/office/drawing/2014/main" id="{07D5023A-BA6F-B725-CF78-FD889E577EA6}"/>
               </a:ext>
             </a:extLst>
           </p:cNvPr>
@@ -6562,70 +7116,373 @@
             <a:spLocks noGrp="1"/>
           </p:cNvSpPr>
           <p:nvPr>
-            <p:ph type="body" idx="1"/>
+            <p:ph idx="1"/>
           </p:nvPr>
         </p:nvSpPr>
-        <p:spPr>
-          <a:xfrm>
-            <a:off x="831850" y="1653758"/>
-            <a:ext cx="10515600" cy="1500187"/>
-          </a:xfrm>
-        </p:spPr>
+        <p:spPr/>
         <p:txBody>
-          <a:bodyPr/>
+          <a:bodyPr>
+            <a:normAutofit fontScale="77500" lnSpcReduction="20000"/>
+          </a:bodyPr>
           <a:lstStyle/>
           <a:p>
-            <a:r>
-              <a:rPr lang="en-GB"/>
-              <a:t>We love Demos!</a:t>
-            </a:r>
+            <a:pPr>
+              <a:buFont typeface="Wingdings" panose="05000000000000000000" pitchFamily="2" charset="2"/>
+              <a:buChar char="§"/>
+            </a:pPr>
+            <a:r>
+              <a:rPr lang="fr-FR" dirty="0" err="1"/>
+              <a:t>PSModuleInfo.NewBoundScriptBlock</a:t>
+            </a:r>
+            <a:r>
+              <a:rPr lang="fr-FR" dirty="0"/>
+              <a:t>()</a:t>
+            </a:r>
+          </a:p>
+          <a:p>
+            <a:pPr lvl="1">
+              <a:buFont typeface="Wingdings" panose="05000000000000000000" pitchFamily="2" charset="2"/>
+              <a:buChar char="§"/>
+            </a:pPr>
+            <a:r>
+              <a:rPr lang="fr-FR" dirty="0"/>
+              <a:t> Clones a </a:t>
+            </a:r>
+            <a:r>
+              <a:rPr lang="fr-FR" dirty="0" err="1"/>
+              <a:t>ScriptBlock</a:t>
+            </a:r>
+            <a:r>
+              <a:rPr lang="fr-FR" dirty="0"/>
+              <a:t> and sets the </a:t>
+            </a:r>
+            <a:r>
+              <a:rPr lang="fr-FR" dirty="0" err="1"/>
+              <a:t>ExecutionContext</a:t>
+            </a:r>
+            <a:r>
+              <a:rPr lang="fr-FR" dirty="0"/>
+              <a:t> of the </a:t>
+            </a:r>
+            <a:r>
+              <a:rPr lang="fr-FR" dirty="0" err="1"/>
+              <a:t>ScriptBlock</a:t>
+            </a:r>
+            <a:r>
+              <a:rPr lang="fr-FR" dirty="0"/>
+              <a:t> </a:t>
+            </a:r>
+            <a:r>
+              <a:rPr lang="fr-FR" dirty="0" err="1"/>
+              <a:t>from</a:t>
+            </a:r>
+            <a:r>
+              <a:rPr lang="fr-FR" dirty="0"/>
+              <a:t> to the </a:t>
+            </a:r>
+            <a:r>
+              <a:rPr lang="fr-FR" dirty="0" err="1"/>
+              <a:t>current</a:t>
+            </a:r>
+            <a:r>
+              <a:rPr lang="fr-FR" dirty="0"/>
+              <a:t> exécution </a:t>
+            </a:r>
+            <a:r>
+              <a:rPr lang="fr-FR" dirty="0" err="1"/>
+              <a:t>context</a:t>
+            </a:r>
+            <a:r>
+              <a:rPr lang="fr-FR" dirty="0"/>
+              <a:t>.</a:t>
+            </a:r>
+          </a:p>
+          <a:p>
+            <a:pPr lvl="1">
+              <a:buFont typeface="Wingdings" panose="05000000000000000000" pitchFamily="2" charset="2"/>
+              <a:buChar char="§"/>
+            </a:pPr>
+            <a:endParaRPr lang="fr-FR" dirty="0"/>
+          </a:p>
+          <a:p>
+            <a:pPr marL="0" indent="0">
+              <a:buNone/>
+            </a:pPr>
+            <a:r>
+              <a:rPr lang="en-US" sz="2800" dirty="0">
+                <a:solidFill>
+                  <a:schemeClr val="accent2">
+                    <a:lumMod val="50000"/>
+                  </a:schemeClr>
+                </a:solidFill>
+                <a:latin typeface="Cascadia Mono" panose="020B0609020000020004" pitchFamily="49" charset="0"/>
+              </a:rPr>
+              <a:t>public </a:t>
+            </a:r>
+            <a:r>
+              <a:rPr lang="en-US" sz="2800" dirty="0" err="1">
+                <a:solidFill>
+                  <a:schemeClr val="accent2">
+                    <a:lumMod val="50000"/>
+                  </a:schemeClr>
+                </a:solidFill>
+                <a:latin typeface="Cascadia Mono" panose="020B0609020000020004" pitchFamily="49" charset="0"/>
+              </a:rPr>
+              <a:t>ScriptBlock</a:t>
+            </a:r>
+            <a:r>
+              <a:rPr lang="en-US" sz="2800" dirty="0">
+                <a:solidFill>
+                  <a:schemeClr val="accent2">
+                    <a:lumMod val="50000"/>
+                  </a:schemeClr>
+                </a:solidFill>
+                <a:latin typeface="Cascadia Mono" panose="020B0609020000020004" pitchFamily="49" charset="0"/>
+              </a:rPr>
+              <a:t> </a:t>
+            </a:r>
+            <a:r>
+              <a:rPr lang="en-US" sz="2800" dirty="0" err="1">
+                <a:solidFill>
+                  <a:schemeClr val="accent2">
+                    <a:lumMod val="50000"/>
+                  </a:schemeClr>
+                </a:solidFill>
+                <a:latin typeface="Cascadia Mono" panose="020B0609020000020004" pitchFamily="49" charset="0"/>
+              </a:rPr>
+              <a:t>NewBoundScriptBlock</a:t>
+            </a:r>
+            <a:r>
+              <a:rPr lang="en-US" sz="2800" dirty="0">
+                <a:solidFill>
+                  <a:schemeClr val="accent2">
+                    <a:lumMod val="50000"/>
+                  </a:schemeClr>
+                </a:solidFill>
+                <a:latin typeface="Cascadia Mono" panose="020B0609020000020004" pitchFamily="49" charset="0"/>
+              </a:rPr>
+              <a:t>(</a:t>
+            </a:r>
+          </a:p>
+          <a:p>
+            <a:pPr marL="0" indent="0">
+              <a:buNone/>
+            </a:pPr>
+            <a:r>
+              <a:rPr lang="en-US" sz="2800" dirty="0">
+                <a:solidFill>
+                  <a:schemeClr val="accent2">
+                    <a:lumMod val="50000"/>
+                  </a:schemeClr>
+                </a:solidFill>
+                <a:latin typeface="Cascadia Mono" panose="020B0609020000020004" pitchFamily="49" charset="0"/>
+              </a:rPr>
+              <a:t>    </a:t>
+            </a:r>
+            <a:r>
+              <a:rPr lang="en-US" sz="2800" dirty="0" err="1">
+                <a:solidFill>
+                  <a:schemeClr val="accent2">
+                    <a:lumMod val="50000"/>
+                  </a:schemeClr>
+                </a:solidFill>
+                <a:latin typeface="Cascadia Mono" panose="020B0609020000020004" pitchFamily="49" charset="0"/>
+              </a:rPr>
+              <a:t>ScriptBlock</a:t>
+            </a:r>
+            <a:r>
+              <a:rPr lang="en-US" sz="2800" dirty="0">
+                <a:solidFill>
+                  <a:schemeClr val="accent2">
+                    <a:lumMod val="50000"/>
+                  </a:schemeClr>
+                </a:solidFill>
+                <a:latin typeface="Cascadia Mono" panose="020B0609020000020004" pitchFamily="49" charset="0"/>
+              </a:rPr>
+              <a:t> </a:t>
+            </a:r>
+            <a:r>
+              <a:rPr lang="en-US" sz="2800" dirty="0" err="1">
+                <a:solidFill>
+                  <a:schemeClr val="accent2">
+                    <a:lumMod val="50000"/>
+                  </a:schemeClr>
+                </a:solidFill>
+                <a:latin typeface="Cascadia Mono" panose="020B0609020000020004" pitchFamily="49" charset="0"/>
+              </a:rPr>
+              <a:t>scriptBlockToBind</a:t>
+            </a:r>
+            <a:r>
+              <a:rPr lang="en-US" sz="2800" dirty="0">
+                <a:solidFill>
+                  <a:schemeClr val="accent2">
+                    <a:lumMod val="50000"/>
+                  </a:schemeClr>
+                </a:solidFill>
+                <a:latin typeface="Cascadia Mono" panose="020B0609020000020004" pitchFamily="49" charset="0"/>
+              </a:rPr>
+              <a:t>)</a:t>
+            </a:r>
+          </a:p>
+          <a:p>
+            <a:pPr marL="0" indent="0">
+              <a:buNone/>
+            </a:pPr>
+            <a:r>
+              <a:rPr lang="en-US" sz="2800" dirty="0">
+                <a:solidFill>
+                  <a:schemeClr val="accent2">
+                    <a:lumMod val="50000"/>
+                  </a:schemeClr>
+                </a:solidFill>
+                <a:latin typeface="Cascadia Mono" panose="020B0609020000020004" pitchFamily="49" charset="0"/>
+              </a:rPr>
+              <a:t>{</a:t>
+            </a:r>
+          </a:p>
+          <a:p>
+            <a:pPr marL="0" indent="0">
+              <a:buNone/>
+            </a:pPr>
+            <a:r>
+              <a:rPr lang="en-US" sz="2800" dirty="0">
+                <a:solidFill>
+                  <a:schemeClr val="accent2">
+                    <a:lumMod val="50000"/>
+                  </a:schemeClr>
+                </a:solidFill>
+                <a:latin typeface="Cascadia Mono" panose="020B0609020000020004" pitchFamily="49" charset="0"/>
+              </a:rPr>
+              <a:t>    var context =     			                            </a:t>
+            </a:r>
+          </a:p>
+          <a:p>
+            <a:pPr marL="0" indent="0">
+              <a:buNone/>
+            </a:pPr>
+            <a:r>
+              <a:rPr lang="en-US" sz="2800" dirty="0">
+                <a:solidFill>
+                  <a:schemeClr val="accent2">
+                    <a:lumMod val="50000"/>
+                  </a:schemeClr>
+                </a:solidFill>
+                <a:latin typeface="Cascadia Mono" panose="020B0609020000020004" pitchFamily="49" charset="0"/>
+              </a:rPr>
+              <a:t>		</a:t>
+            </a:r>
+            <a:r>
+              <a:rPr lang="en-US" sz="2800" dirty="0" err="1">
+                <a:solidFill>
+                  <a:schemeClr val="accent2">
+                    <a:lumMod val="50000"/>
+                  </a:schemeClr>
+                </a:solidFill>
+                <a:latin typeface="Cascadia Mono" panose="020B0609020000020004" pitchFamily="49" charset="0"/>
+              </a:rPr>
+              <a:t>LocalPipeline.GetExecutionContextFromTLS</a:t>
+            </a:r>
+            <a:r>
+              <a:rPr lang="en-US" sz="2800" dirty="0">
+                <a:solidFill>
+                  <a:schemeClr val="accent2">
+                    <a:lumMod val="50000"/>
+                  </a:schemeClr>
+                </a:solidFill>
+                <a:latin typeface="Cascadia Mono" panose="020B0609020000020004" pitchFamily="49" charset="0"/>
+              </a:rPr>
+              <a:t>();</a:t>
+            </a:r>
+          </a:p>
+          <a:p>
+            <a:pPr marL="0" indent="0">
+              <a:buNone/>
+            </a:pPr>
+            <a:r>
+              <a:rPr lang="en-US" sz="2800" dirty="0">
+                <a:solidFill>
+                  <a:schemeClr val="accent2">
+                    <a:lumMod val="50000"/>
+                  </a:schemeClr>
+                </a:solidFill>
+                <a:latin typeface="Cascadia Mono" panose="020B0609020000020004" pitchFamily="49" charset="0"/>
+              </a:rPr>
+              <a:t>    return </a:t>
+            </a:r>
+            <a:r>
+              <a:rPr lang="en-US" sz="2800" dirty="0" err="1">
+                <a:solidFill>
+                  <a:schemeClr val="accent2">
+                    <a:lumMod val="50000"/>
+                  </a:schemeClr>
+                </a:solidFill>
+                <a:latin typeface="Cascadia Mono" panose="020B0609020000020004" pitchFamily="49" charset="0"/>
+              </a:rPr>
+              <a:t>NewBoundScriptBlock</a:t>
+            </a:r>
+            <a:r>
+              <a:rPr lang="en-US" sz="2800" dirty="0">
+                <a:solidFill>
+                  <a:schemeClr val="accent2">
+                    <a:lumMod val="50000"/>
+                  </a:schemeClr>
+                </a:solidFill>
+                <a:latin typeface="Cascadia Mono" panose="020B0609020000020004" pitchFamily="49" charset="0"/>
+              </a:rPr>
+              <a:t>(</a:t>
+            </a:r>
+            <a:r>
+              <a:rPr lang="en-US" sz="2800" dirty="0" err="1">
+                <a:solidFill>
+                  <a:schemeClr val="accent2">
+                    <a:lumMod val="50000"/>
+                  </a:schemeClr>
+                </a:solidFill>
+                <a:latin typeface="Cascadia Mono" panose="020B0609020000020004" pitchFamily="49" charset="0"/>
+              </a:rPr>
+              <a:t>scriptBlockToBind</a:t>
+            </a:r>
+            <a:r>
+              <a:rPr lang="en-US" sz="2800" dirty="0">
+                <a:solidFill>
+                  <a:schemeClr val="accent2">
+                    <a:lumMod val="50000"/>
+                  </a:schemeClr>
+                </a:solidFill>
+                <a:latin typeface="Cascadia Mono" panose="020B0609020000020004" pitchFamily="49" charset="0"/>
+              </a:rPr>
+              <a:t>, context);</a:t>
+            </a:r>
+          </a:p>
+          <a:p>
+            <a:pPr marL="0" indent="0">
+              <a:buNone/>
+            </a:pPr>
+            <a:r>
+              <a:rPr lang="en-US" sz="2800" dirty="0">
+                <a:solidFill>
+                  <a:schemeClr val="accent2">
+                    <a:lumMod val="50000"/>
+                  </a:schemeClr>
+                </a:solidFill>
+                <a:latin typeface="Cascadia Mono" panose="020B0609020000020004" pitchFamily="49" charset="0"/>
+              </a:rPr>
+              <a:t>}</a:t>
+            </a:r>
+            <a:endParaRPr lang="en-GB" dirty="0">
+              <a:solidFill>
+                <a:schemeClr val="accent2">
+                  <a:lumMod val="50000"/>
+                </a:schemeClr>
+              </a:solidFill>
+            </a:endParaRPr>
           </a:p>
         </p:txBody>
       </p:sp>
-      <p:pic>
-        <p:nvPicPr>
-          <p:cNvPr id="9" name="Picture 9">
-            <a:extLst>
-              <a:ext uri="{FF2B5EF4-FFF2-40B4-BE49-F238E27FC236}">
-                <a16:creationId xmlns:a16="http://schemas.microsoft.com/office/drawing/2014/main" id="{776AC288-703A-8014-23CA-E040CDD7E976}"/>
-              </a:ext>
-            </a:extLst>
-          </p:cNvPr>
-          <p:cNvPicPr>
-            <a:picLocks noChangeAspect="1"/>
-          </p:cNvPicPr>
-          <p:nvPr/>
-        </p:nvPicPr>
-        <p:blipFill>
-          <a:blip r:embed="rId2"/>
-          <a:stretch>
-            <a:fillRect/>
-          </a:stretch>
-        </p:blipFill>
-        <p:spPr>
-          <a:xfrm>
-            <a:off x="3404191" y="615392"/>
-            <a:ext cx="6127897" cy="5060147"/>
-          </a:xfrm>
-          <a:prstGeom prst="rect">
-            <a:avLst/>
-          </a:prstGeom>
-          <a:ln>
-            <a:noFill/>
-          </a:ln>
-          <a:effectLst>
-            <a:outerShdw blurRad="292100" dist="139700" dir="2700000" algn="tl" rotWithShape="0">
-              <a:srgbClr val="333333">
-                <a:alpha val="65000"/>
-              </a:srgbClr>
-            </a:outerShdw>
-          </a:effectLst>
-        </p:spPr>
-      </p:pic>
     </p:spTree>
     <p:extLst>
       <p:ext uri="{BB962C8B-B14F-4D97-AF65-F5344CB8AC3E}">
-        <p14:creationId xmlns:p14="http://schemas.microsoft.com/office/powerpoint/2010/main" val="3317259441"/>
+        <p14:creationId xmlns:p14="http://schemas.microsoft.com/office/powerpoint/2010/main" val="485703449"/>
       </p:ext>
     </p:extLst>
   </p:cSld>
@@ -6635,7 +7492,963 @@
 </p:sld>
 </file>
 
-<file path=ppt/slides/slide14.xml><?xml version="1.0" encoding="utf-8"?>
+<file path=ppt/slides/slide16.xml><?xml version="1.0" encoding="utf-8"?>
+<p:sld xmlns:a="http://schemas.openxmlformats.org/drawingml/2006/main" xmlns:r="http://schemas.openxmlformats.org/officeDocument/2006/relationships" xmlns:p="http://schemas.openxmlformats.org/presentationml/2006/main">
+  <p:cSld>
+    <p:spTree>
+      <p:nvGrpSpPr>
+        <p:cNvPr id="1" name=""/>
+        <p:cNvGrpSpPr/>
+        <p:nvPr/>
+      </p:nvGrpSpPr>
+      <p:grpSpPr>
+        <a:xfrm>
+          <a:off x="0" y="0"/>
+          <a:ext cx="0" cy="0"/>
+          <a:chOff x="0" y="0"/>
+          <a:chExt cx="0" cy="0"/>
+        </a:xfrm>
+      </p:grpSpPr>
+      <p:sp>
+        <p:nvSpPr>
+          <p:cNvPr id="2" name="Titre 1">
+            <a:extLst>
+              <a:ext uri="{FF2B5EF4-FFF2-40B4-BE49-F238E27FC236}">
+                <a16:creationId xmlns:a16="http://schemas.microsoft.com/office/drawing/2014/main" id="{5191E0F2-FE77-51ED-3F72-223B58926E74}"/>
+              </a:ext>
+            </a:extLst>
+          </p:cNvPr>
+          <p:cNvSpPr>
+            <a:spLocks noGrp="1"/>
+          </p:cNvSpPr>
+          <p:nvPr>
+            <p:ph type="title"/>
+          </p:nvPr>
+        </p:nvSpPr>
+        <p:spPr/>
+        <p:txBody>
+          <a:bodyPr/>
+          <a:lstStyle/>
+          <a:p>
+            <a:r>
+              <a:rPr lang="fr-FR" dirty="0" err="1"/>
+              <a:t>ScriptBlock</a:t>
+            </a:r>
+            <a:r>
+              <a:rPr lang="fr-FR" dirty="0"/>
+              <a:t> APIs.</a:t>
+            </a:r>
+            <a:endParaRPr lang="en-GB" dirty="0"/>
+          </a:p>
+        </p:txBody>
+      </p:sp>
+      <p:sp>
+        <p:nvSpPr>
+          <p:cNvPr id="3" name="Espace réservé du contenu 2">
+            <a:extLst>
+              <a:ext uri="{FF2B5EF4-FFF2-40B4-BE49-F238E27FC236}">
+                <a16:creationId xmlns:a16="http://schemas.microsoft.com/office/drawing/2014/main" id="{07D5023A-BA6F-B725-CF78-FD889E577EA6}"/>
+              </a:ext>
+            </a:extLst>
+          </p:cNvPr>
+          <p:cNvSpPr>
+            <a:spLocks noGrp="1"/>
+          </p:cNvSpPr>
+          <p:nvPr>
+            <p:ph idx="1"/>
+          </p:nvPr>
+        </p:nvSpPr>
+        <p:spPr/>
+        <p:txBody>
+          <a:bodyPr>
+            <a:normAutofit fontScale="92500" lnSpcReduction="10000"/>
+          </a:bodyPr>
+          <a:lstStyle/>
+          <a:p>
+            <a:pPr>
+              <a:buFont typeface="Wingdings" panose="05000000000000000000" pitchFamily="2" charset="2"/>
+              <a:buChar char="§"/>
+            </a:pPr>
+            <a:r>
+              <a:rPr lang="fr-FR" dirty="0" err="1"/>
+              <a:t>GetNewClosure</a:t>
+            </a:r>
+            <a:r>
+              <a:rPr lang="fr-FR" dirty="0"/>
+              <a:t>()</a:t>
+            </a:r>
+          </a:p>
+          <a:p>
+            <a:pPr lvl="1">
+              <a:buFont typeface="Wingdings" panose="05000000000000000000" pitchFamily="2" charset="2"/>
+              <a:buChar char="§"/>
+            </a:pPr>
+            <a:r>
+              <a:rPr lang="fr-FR" dirty="0"/>
+              <a:t> </a:t>
+            </a:r>
+            <a:r>
+              <a:rPr lang="fr-FR" dirty="0" err="1"/>
+              <a:t>Creates</a:t>
+            </a:r>
+            <a:r>
+              <a:rPr lang="fr-FR" dirty="0"/>
+              <a:t> a new </a:t>
+            </a:r>
+            <a:r>
+              <a:rPr lang="fr-FR" dirty="0" err="1"/>
+              <a:t>bound</a:t>
+            </a:r>
+            <a:r>
+              <a:rPr lang="fr-FR" dirty="0"/>
+              <a:t> </a:t>
+            </a:r>
+            <a:r>
+              <a:rPr lang="fr-FR" dirty="0" err="1"/>
+              <a:t>ScriptBlock</a:t>
+            </a:r>
+            <a:r>
+              <a:rPr lang="fr-FR" dirty="0"/>
+              <a:t> </a:t>
+            </a:r>
+            <a:r>
+              <a:rPr lang="fr-FR" dirty="0" err="1"/>
+              <a:t>copying</a:t>
+            </a:r>
+            <a:r>
+              <a:rPr lang="fr-FR" dirty="0"/>
+              <a:t> the variables </a:t>
+            </a:r>
+            <a:r>
+              <a:rPr lang="fr-FR" dirty="0" err="1"/>
+              <a:t>from</a:t>
+            </a:r>
+            <a:r>
+              <a:rPr lang="fr-FR" dirty="0"/>
+              <a:t> the </a:t>
+            </a:r>
+            <a:r>
+              <a:rPr lang="fr-FR" dirty="0" err="1"/>
+              <a:t>current</a:t>
+            </a:r>
+            <a:r>
+              <a:rPr lang="fr-FR" dirty="0"/>
+              <a:t> scope </a:t>
+            </a:r>
+            <a:r>
+              <a:rPr lang="fr-FR" dirty="0" err="1"/>
+              <a:t>into</a:t>
+            </a:r>
+            <a:r>
+              <a:rPr lang="fr-FR" dirty="0"/>
+              <a:t> the session state </a:t>
+            </a:r>
+            <a:r>
+              <a:rPr lang="fr-FR" dirty="0" err="1"/>
+              <a:t>associated</a:t>
+            </a:r>
+            <a:r>
+              <a:rPr lang="fr-FR" dirty="0"/>
+              <a:t> </a:t>
+            </a:r>
+            <a:r>
+              <a:rPr lang="fr-FR" dirty="0" err="1"/>
+              <a:t>with</a:t>
+            </a:r>
+            <a:r>
+              <a:rPr lang="fr-FR" dirty="0"/>
+              <a:t> the </a:t>
+            </a:r>
+            <a:r>
+              <a:rPr lang="fr-FR" dirty="0" err="1"/>
+              <a:t>ScriptBlock</a:t>
+            </a:r>
+            <a:endParaRPr lang="fr-FR" dirty="0"/>
+          </a:p>
+          <a:p>
+            <a:pPr marL="0" indent="0">
+              <a:buNone/>
+            </a:pPr>
+            <a:r>
+              <a:rPr lang="en-US" sz="2600" dirty="0">
+                <a:solidFill>
+                  <a:schemeClr val="accent2">
+                    <a:lumMod val="50000"/>
+                  </a:schemeClr>
+                </a:solidFill>
+                <a:latin typeface="Cascadia Mono" panose="020B0609020000020004" pitchFamily="49" charset="0"/>
+              </a:rPr>
+              <a:t>	public </a:t>
+            </a:r>
+            <a:r>
+              <a:rPr lang="en-US" sz="2600" dirty="0" err="1">
+                <a:solidFill>
+                  <a:schemeClr val="accent2">
+                    <a:lumMod val="50000"/>
+                  </a:schemeClr>
+                </a:solidFill>
+                <a:latin typeface="Cascadia Mono" panose="020B0609020000020004" pitchFamily="49" charset="0"/>
+              </a:rPr>
+              <a:t>ScriptBlock</a:t>
+            </a:r>
+            <a:r>
+              <a:rPr lang="en-US" sz="2600" dirty="0">
+                <a:solidFill>
+                  <a:schemeClr val="accent2">
+                    <a:lumMod val="50000"/>
+                  </a:schemeClr>
+                </a:solidFill>
+                <a:latin typeface="Cascadia Mono" panose="020B0609020000020004" pitchFamily="49" charset="0"/>
+              </a:rPr>
+              <a:t> </a:t>
+            </a:r>
+            <a:r>
+              <a:rPr lang="en-US" sz="2600" dirty="0" err="1">
+                <a:solidFill>
+                  <a:schemeClr val="accent2">
+                    <a:lumMod val="50000"/>
+                  </a:schemeClr>
+                </a:solidFill>
+                <a:latin typeface="Cascadia Mono" panose="020B0609020000020004" pitchFamily="49" charset="0"/>
+              </a:rPr>
+              <a:t>GetNewClosure</a:t>
+            </a:r>
+            <a:r>
+              <a:rPr lang="en-US" sz="2600" dirty="0">
+                <a:solidFill>
+                  <a:schemeClr val="accent2">
+                    <a:lumMod val="50000"/>
+                  </a:schemeClr>
+                </a:solidFill>
+                <a:latin typeface="Cascadia Mono" panose="020B0609020000020004" pitchFamily="49" charset="0"/>
+              </a:rPr>
+              <a:t>()</a:t>
+            </a:r>
+          </a:p>
+          <a:p>
+            <a:pPr marL="0" indent="0">
+              <a:buNone/>
+            </a:pPr>
+            <a:r>
+              <a:rPr lang="en-US" sz="2600" dirty="0">
+                <a:solidFill>
+                  <a:schemeClr val="accent2">
+                    <a:lumMod val="50000"/>
+                  </a:schemeClr>
+                </a:solidFill>
+                <a:latin typeface="Cascadia Mono" panose="020B0609020000020004" pitchFamily="49" charset="0"/>
+              </a:rPr>
+              <a:t>     {</a:t>
+            </a:r>
+          </a:p>
+          <a:p>
+            <a:pPr marL="0" indent="0">
+              <a:buNone/>
+            </a:pPr>
+            <a:r>
+              <a:rPr lang="en-US" sz="2600" dirty="0">
+                <a:solidFill>
+                  <a:schemeClr val="accent2">
+                    <a:lumMod val="50000"/>
+                  </a:schemeClr>
+                </a:solidFill>
+                <a:latin typeface="Cascadia Mono" panose="020B0609020000020004" pitchFamily="49" charset="0"/>
+              </a:rPr>
+              <a:t>        </a:t>
+            </a:r>
+            <a:r>
+              <a:rPr lang="en-US" sz="2600" dirty="0" err="1">
+                <a:solidFill>
+                  <a:schemeClr val="accent2">
+                    <a:lumMod val="50000"/>
+                  </a:schemeClr>
+                </a:solidFill>
+                <a:latin typeface="Cascadia Mono" panose="020B0609020000020004" pitchFamily="49" charset="0"/>
+              </a:rPr>
+              <a:t>PSModuleInfo</a:t>
+            </a:r>
+            <a:r>
+              <a:rPr lang="en-US" sz="2600" dirty="0">
+                <a:solidFill>
+                  <a:schemeClr val="accent2">
+                    <a:lumMod val="50000"/>
+                  </a:schemeClr>
+                </a:solidFill>
+                <a:latin typeface="Cascadia Mono" panose="020B0609020000020004" pitchFamily="49" charset="0"/>
+              </a:rPr>
+              <a:t> m = new </a:t>
+            </a:r>
+            <a:r>
+              <a:rPr lang="en-US" sz="2600" dirty="0" err="1">
+                <a:solidFill>
+                  <a:schemeClr val="accent2">
+                    <a:lumMod val="50000"/>
+                  </a:schemeClr>
+                </a:solidFill>
+                <a:latin typeface="Cascadia Mono" panose="020B0609020000020004" pitchFamily="49" charset="0"/>
+              </a:rPr>
+              <a:t>PSModuleInfo</a:t>
+            </a:r>
+            <a:r>
+              <a:rPr lang="en-US" sz="2600" dirty="0">
+                <a:solidFill>
+                  <a:schemeClr val="accent2">
+                    <a:lumMod val="50000"/>
+                  </a:schemeClr>
+                </a:solidFill>
+                <a:latin typeface="Cascadia Mono" panose="020B0609020000020004" pitchFamily="49" charset="0"/>
+              </a:rPr>
+              <a:t>(true);</a:t>
+            </a:r>
+          </a:p>
+          <a:p>
+            <a:pPr marL="0" indent="0">
+              <a:buNone/>
+            </a:pPr>
+            <a:r>
+              <a:rPr lang="en-US" sz="2600" dirty="0">
+                <a:solidFill>
+                  <a:schemeClr val="accent2">
+                    <a:lumMod val="50000"/>
+                  </a:schemeClr>
+                </a:solidFill>
+                <a:latin typeface="Cascadia Mono" panose="020B0609020000020004" pitchFamily="49" charset="0"/>
+              </a:rPr>
+              <a:t>        </a:t>
+            </a:r>
+            <a:r>
+              <a:rPr lang="en-US" sz="2600" dirty="0" err="1">
+                <a:solidFill>
+                  <a:schemeClr val="accent2">
+                    <a:lumMod val="50000"/>
+                  </a:schemeClr>
+                </a:solidFill>
+                <a:latin typeface="Cascadia Mono" panose="020B0609020000020004" pitchFamily="49" charset="0"/>
+              </a:rPr>
+              <a:t>m.CaptureLocals</a:t>
+            </a:r>
+            <a:r>
+              <a:rPr lang="en-US" sz="2600" dirty="0">
+                <a:solidFill>
+                  <a:schemeClr val="accent2">
+                    <a:lumMod val="50000"/>
+                  </a:schemeClr>
+                </a:solidFill>
+                <a:latin typeface="Cascadia Mono" panose="020B0609020000020004" pitchFamily="49" charset="0"/>
+              </a:rPr>
+              <a:t>();</a:t>
+            </a:r>
+          </a:p>
+          <a:p>
+            <a:pPr marL="0" indent="0">
+              <a:buNone/>
+            </a:pPr>
+            <a:r>
+              <a:rPr lang="en-US" sz="2600" dirty="0">
+                <a:solidFill>
+                  <a:schemeClr val="accent2">
+                    <a:lumMod val="50000"/>
+                  </a:schemeClr>
+                </a:solidFill>
+                <a:latin typeface="Cascadia Mono" panose="020B0609020000020004" pitchFamily="49" charset="0"/>
+              </a:rPr>
+              <a:t>        return </a:t>
+            </a:r>
+            <a:r>
+              <a:rPr lang="en-US" sz="2600" dirty="0" err="1">
+                <a:solidFill>
+                  <a:schemeClr val="accent2">
+                    <a:lumMod val="50000"/>
+                  </a:schemeClr>
+                </a:solidFill>
+                <a:latin typeface="Cascadia Mono" panose="020B0609020000020004" pitchFamily="49" charset="0"/>
+              </a:rPr>
+              <a:t>m.NewBoundScriptBlock</a:t>
+            </a:r>
+            <a:r>
+              <a:rPr lang="en-US" sz="2600" dirty="0">
+                <a:solidFill>
+                  <a:schemeClr val="accent2">
+                    <a:lumMod val="50000"/>
+                  </a:schemeClr>
+                </a:solidFill>
+                <a:latin typeface="Cascadia Mono" panose="020B0609020000020004" pitchFamily="49" charset="0"/>
+              </a:rPr>
+              <a:t>(this);</a:t>
+            </a:r>
+          </a:p>
+          <a:p>
+            <a:pPr marL="0" indent="0">
+              <a:buNone/>
+            </a:pPr>
+            <a:r>
+              <a:rPr lang="en-US" sz="2600" dirty="0">
+                <a:solidFill>
+                  <a:schemeClr val="accent2">
+                    <a:lumMod val="50000"/>
+                  </a:schemeClr>
+                </a:solidFill>
+                <a:latin typeface="Cascadia Mono" panose="020B0609020000020004" pitchFamily="49" charset="0"/>
+              </a:rPr>
+              <a:t>     }</a:t>
+            </a:r>
+            <a:endParaRPr lang="en-GB" sz="3000" dirty="0">
+              <a:solidFill>
+                <a:schemeClr val="accent2">
+                  <a:lumMod val="50000"/>
+                </a:schemeClr>
+              </a:solidFill>
+            </a:endParaRPr>
+          </a:p>
+        </p:txBody>
+      </p:sp>
+    </p:spTree>
+    <p:extLst>
+      <p:ext uri="{BB962C8B-B14F-4D97-AF65-F5344CB8AC3E}">
+        <p14:creationId xmlns:p14="http://schemas.microsoft.com/office/powerpoint/2010/main" val="2635219457"/>
+      </p:ext>
+    </p:extLst>
+  </p:cSld>
+  <p:clrMapOvr>
+    <a:masterClrMapping/>
+  </p:clrMapOvr>
+</p:sld>
+</file>
+
+<file path=ppt/slides/slide17.xml><?xml version="1.0" encoding="utf-8"?>
+<p:sld xmlns:a="http://schemas.openxmlformats.org/drawingml/2006/main" xmlns:r="http://schemas.openxmlformats.org/officeDocument/2006/relationships" xmlns:p="http://schemas.openxmlformats.org/presentationml/2006/main">
+  <p:cSld>
+    <p:spTree>
+      <p:nvGrpSpPr>
+        <p:cNvPr id="1" name=""/>
+        <p:cNvGrpSpPr/>
+        <p:nvPr/>
+      </p:nvGrpSpPr>
+      <p:grpSpPr>
+        <a:xfrm>
+          <a:off x="0" y="0"/>
+          <a:ext cx="0" cy="0"/>
+          <a:chOff x="0" y="0"/>
+          <a:chExt cx="0" cy="0"/>
+        </a:xfrm>
+      </p:grpSpPr>
+      <p:sp>
+        <p:nvSpPr>
+          <p:cNvPr id="2" name="Titre 1">
+            <a:extLst>
+              <a:ext uri="{FF2B5EF4-FFF2-40B4-BE49-F238E27FC236}">
+                <a16:creationId xmlns:a16="http://schemas.microsoft.com/office/drawing/2014/main" id="{5191E0F2-FE77-51ED-3F72-223B58926E74}"/>
+              </a:ext>
+            </a:extLst>
+          </p:cNvPr>
+          <p:cNvSpPr>
+            <a:spLocks noGrp="1"/>
+          </p:cNvSpPr>
+          <p:nvPr>
+            <p:ph type="title"/>
+          </p:nvPr>
+        </p:nvSpPr>
+        <p:spPr/>
+        <p:txBody>
+          <a:bodyPr/>
+          <a:lstStyle/>
+          <a:p>
+            <a:r>
+              <a:rPr lang="fr-FR" dirty="0" err="1"/>
+              <a:t>What</a:t>
+            </a:r>
+            <a:r>
+              <a:rPr lang="fr-FR" dirty="0"/>
+              <a:t> are </a:t>
+            </a:r>
+            <a:r>
+              <a:rPr lang="fr-FR" dirty="0" err="1"/>
+              <a:t>closures</a:t>
+            </a:r>
+            <a:r>
+              <a:rPr lang="fr-FR" dirty="0"/>
+              <a:t> good for?</a:t>
+            </a:r>
+            <a:endParaRPr lang="en-GB" dirty="0"/>
+          </a:p>
+        </p:txBody>
+      </p:sp>
+      <p:sp>
+        <p:nvSpPr>
+          <p:cNvPr id="3" name="Espace réservé du contenu 2">
+            <a:extLst>
+              <a:ext uri="{FF2B5EF4-FFF2-40B4-BE49-F238E27FC236}">
+                <a16:creationId xmlns:a16="http://schemas.microsoft.com/office/drawing/2014/main" id="{07D5023A-BA6F-B725-CF78-FD889E577EA6}"/>
+              </a:ext>
+            </a:extLst>
+          </p:cNvPr>
+          <p:cNvSpPr>
+            <a:spLocks noGrp="1"/>
+          </p:cNvSpPr>
+          <p:nvPr>
+            <p:ph idx="1"/>
+          </p:nvPr>
+        </p:nvSpPr>
+        <p:spPr/>
+        <p:txBody>
+          <a:bodyPr>
+            <a:normAutofit fontScale="92500" lnSpcReduction="20000"/>
+          </a:bodyPr>
+          <a:lstStyle/>
+          <a:p>
+            <a:pPr>
+              <a:buFont typeface="Wingdings" panose="05000000000000000000" pitchFamily="2" charset="2"/>
+              <a:buChar char="§"/>
+            </a:pPr>
+            <a:r>
+              <a:rPr lang="fr-FR" dirty="0" err="1"/>
+              <a:t>Stateful</a:t>
+            </a:r>
+            <a:r>
+              <a:rPr lang="fr-FR" dirty="0"/>
+              <a:t> </a:t>
+            </a:r>
+            <a:r>
+              <a:rPr lang="fr-FR" dirty="0" err="1"/>
+              <a:t>functions</a:t>
+            </a:r>
+            <a:endParaRPr lang="fr-FR" dirty="0"/>
+          </a:p>
+          <a:p>
+            <a:pPr lvl="1"/>
+            <a:r>
+              <a:rPr lang="fr-FR" dirty="0" err="1"/>
+              <a:t>Encapsulate</a:t>
+            </a:r>
+            <a:r>
+              <a:rPr lang="fr-FR" dirty="0"/>
+              <a:t> </a:t>
+            </a:r>
+            <a:r>
+              <a:rPr lang="fr-FR" dirty="0" err="1"/>
+              <a:t>private</a:t>
+            </a:r>
+            <a:r>
+              <a:rPr lang="fr-FR" dirty="0"/>
+              <a:t> state in a </a:t>
+            </a:r>
+            <a:r>
+              <a:rPr lang="fr-FR" dirty="0" err="1"/>
+              <a:t>function</a:t>
+            </a:r>
+            <a:r>
+              <a:rPr lang="fr-FR" dirty="0"/>
+              <a:t>: </a:t>
+            </a:r>
+            <a:r>
+              <a:rPr lang="fr-FR" dirty="0" err="1"/>
+              <a:t>function</a:t>
+            </a:r>
+            <a:r>
+              <a:rPr lang="fr-FR" dirty="0"/>
+              <a:t> </a:t>
+            </a:r>
+            <a:r>
+              <a:rPr lang="fr-FR" dirty="0" err="1"/>
+              <a:t>generators</a:t>
+            </a:r>
+            <a:endParaRPr lang="fr-FR" dirty="0"/>
+          </a:p>
+          <a:p>
+            <a:pPr lvl="1">
+              <a:buFont typeface="Wingdings" panose="05000000000000000000" pitchFamily="2" charset="2"/>
+              <a:buChar char="§"/>
+            </a:pPr>
+            <a:r>
+              <a:rPr lang="fr-FR"/>
+              <a:t>New-Counter </a:t>
+            </a:r>
+            <a:r>
+              <a:rPr lang="fr-FR" dirty="0" err="1"/>
+              <a:t>example</a:t>
+            </a:r>
+            <a:r>
+              <a:rPr lang="fr-FR" dirty="0"/>
+              <a:t>.</a:t>
+            </a:r>
+          </a:p>
+          <a:p>
+            <a:r>
+              <a:rPr lang="fr-FR" dirty="0" err="1"/>
+              <a:t>Simplified</a:t>
+            </a:r>
+            <a:r>
+              <a:rPr lang="fr-FR" dirty="0"/>
+              <a:t> </a:t>
+            </a:r>
+            <a:r>
+              <a:rPr lang="fr-FR" dirty="0" err="1"/>
+              <a:t>concurrency</a:t>
+            </a:r>
+            <a:endParaRPr lang="fr-FR" dirty="0"/>
+          </a:p>
+          <a:p>
+            <a:pPr lvl="1"/>
+            <a:r>
+              <a:rPr lang="fr-FR" dirty="0" err="1"/>
+              <a:t>Instead</a:t>
+            </a:r>
+            <a:r>
+              <a:rPr lang="fr-FR" dirty="0"/>
+              <a:t> of </a:t>
+            </a:r>
+            <a:r>
+              <a:rPr lang="fr-FR" sz="2400" dirty="0">
+                <a:latin typeface="Cascadia Code" panose="020B0609020000020004" pitchFamily="49" charset="0"/>
+                <a:cs typeface="Cascadia Code" panose="020B0609020000020004" pitchFamily="49" charset="0"/>
+              </a:rPr>
+              <a:t>$</a:t>
+            </a:r>
+            <a:r>
+              <a:rPr lang="fr-FR" sz="2400" dirty="0" err="1">
+                <a:latin typeface="Cascadia Code" panose="020B0609020000020004" pitchFamily="49" charset="0"/>
+                <a:cs typeface="Cascadia Code" panose="020B0609020000020004" pitchFamily="49" charset="0"/>
+              </a:rPr>
+              <a:t>using:foo</a:t>
+            </a:r>
+            <a:r>
+              <a:rPr lang="fr-FR" sz="2400" dirty="0">
+                <a:latin typeface="Cascadia Code" panose="020B0609020000020004" pitchFamily="49" charset="0"/>
+                <a:cs typeface="Cascadia Code" panose="020B0609020000020004" pitchFamily="49" charset="0"/>
+              </a:rPr>
+              <a:t> </a:t>
+            </a:r>
+            <a:r>
+              <a:rPr lang="fr-FR" dirty="0" err="1"/>
+              <a:t>just</a:t>
+            </a:r>
+            <a:r>
+              <a:rPr lang="fr-FR" dirty="0"/>
+              <a:t> use a </a:t>
+            </a:r>
+            <a:r>
+              <a:rPr lang="fr-FR" dirty="0" err="1"/>
+              <a:t>closure</a:t>
+            </a:r>
+            <a:r>
+              <a:rPr lang="fr-FR" dirty="0"/>
+              <a:t>:</a:t>
+            </a:r>
+          </a:p>
+          <a:p>
+            <a:pPr marL="914400" lvl="2" indent="0">
+              <a:buNone/>
+            </a:pPr>
+            <a:r>
+              <a:rPr lang="fr-FR" sz="2400" dirty="0">
+                <a:solidFill>
+                  <a:schemeClr val="accent2">
+                    <a:lumMod val="50000"/>
+                  </a:schemeClr>
+                </a:solidFill>
+                <a:latin typeface="Cascadia Code" panose="020B0609020000020004" pitchFamily="49" charset="0"/>
+                <a:cs typeface="Cascadia Code" panose="020B0609020000020004" pitchFamily="49" charset="0"/>
+              </a:rPr>
+              <a:t>$</a:t>
+            </a:r>
+            <a:r>
+              <a:rPr lang="fr-FR" sz="2400" dirty="0" err="1">
+                <a:solidFill>
+                  <a:schemeClr val="accent2">
+                    <a:lumMod val="50000"/>
+                  </a:schemeClr>
+                </a:solidFill>
+                <a:latin typeface="Cascadia Code" panose="020B0609020000020004" pitchFamily="49" charset="0"/>
+                <a:cs typeface="Cascadia Code" panose="020B0609020000020004" pitchFamily="49" charset="0"/>
+              </a:rPr>
+              <a:t>foo</a:t>
+            </a:r>
+            <a:r>
+              <a:rPr lang="fr-FR" sz="2400" dirty="0">
+                <a:solidFill>
+                  <a:schemeClr val="accent2">
+                    <a:lumMod val="50000"/>
+                  </a:schemeClr>
+                </a:solidFill>
+                <a:latin typeface="Cascadia Code" panose="020B0609020000020004" pitchFamily="49" charset="0"/>
+                <a:cs typeface="Cascadia Code" panose="020B0609020000020004" pitchFamily="49" charset="0"/>
+              </a:rPr>
+              <a:t> = "Hi </a:t>
+            </a:r>
+            <a:r>
+              <a:rPr lang="fr-FR" sz="2400" dirty="0" err="1">
+                <a:solidFill>
+                  <a:schemeClr val="accent2">
+                    <a:lumMod val="50000"/>
+                  </a:schemeClr>
+                </a:solidFill>
+                <a:latin typeface="Cascadia Code" panose="020B0609020000020004" pitchFamily="49" charset="0"/>
+                <a:cs typeface="Cascadia Code" panose="020B0609020000020004" pitchFamily="49" charset="0"/>
+              </a:rPr>
+              <a:t>there</a:t>
+            </a:r>
+            <a:r>
+              <a:rPr lang="fr-FR" sz="2400" dirty="0">
+                <a:solidFill>
+                  <a:schemeClr val="accent2">
+                    <a:lumMod val="50000"/>
+                  </a:schemeClr>
+                </a:solidFill>
+                <a:latin typeface="Cascadia Code" panose="020B0609020000020004" pitchFamily="49" charset="0"/>
+                <a:cs typeface="Cascadia Code" panose="020B0609020000020004" pitchFamily="49" charset="0"/>
+              </a:rPr>
+              <a:t>"</a:t>
+            </a:r>
+          </a:p>
+          <a:p>
+            <a:pPr marL="914400" lvl="2" indent="0">
+              <a:buNone/>
+            </a:pPr>
+            <a:r>
+              <a:rPr lang="fr-FR" sz="2400" dirty="0">
+                <a:solidFill>
+                  <a:schemeClr val="accent2">
+                    <a:lumMod val="50000"/>
+                  </a:schemeClr>
+                </a:solidFill>
+                <a:latin typeface="Cascadia Code" panose="020B0609020000020004" pitchFamily="49" charset="0"/>
+                <a:cs typeface="Cascadia Code" panose="020B0609020000020004" pitchFamily="49" charset="0"/>
+              </a:rPr>
+              <a:t>Start-</a:t>
+            </a:r>
+            <a:r>
+              <a:rPr lang="fr-FR" sz="2400" dirty="0" err="1">
+                <a:solidFill>
+                  <a:schemeClr val="accent2">
+                    <a:lumMod val="50000"/>
+                  </a:schemeClr>
+                </a:solidFill>
+                <a:latin typeface="Cascadia Code" panose="020B0609020000020004" pitchFamily="49" charset="0"/>
+                <a:cs typeface="Cascadia Code" panose="020B0609020000020004" pitchFamily="49" charset="0"/>
+              </a:rPr>
+              <a:t>ThreadJob</a:t>
+            </a:r>
+            <a:r>
+              <a:rPr lang="fr-FR" sz="2400" dirty="0">
+                <a:solidFill>
+                  <a:schemeClr val="accent2">
+                    <a:lumMod val="50000"/>
+                  </a:schemeClr>
+                </a:solidFill>
+                <a:latin typeface="Cascadia Code" panose="020B0609020000020004" pitchFamily="49" charset="0"/>
+                <a:cs typeface="Cascadia Code" panose="020B0609020000020004" pitchFamily="49" charset="0"/>
+              </a:rPr>
+              <a:t> {</a:t>
+            </a:r>
+          </a:p>
+          <a:p>
+            <a:pPr marL="914400" lvl="2" indent="0">
+              <a:buNone/>
+            </a:pPr>
+            <a:r>
+              <a:rPr lang="fr-FR" sz="2400" dirty="0">
+                <a:solidFill>
+                  <a:schemeClr val="accent2">
+                    <a:lumMod val="50000"/>
+                  </a:schemeClr>
+                </a:solidFill>
+                <a:latin typeface="Cascadia Code" panose="020B0609020000020004" pitchFamily="49" charset="0"/>
+                <a:cs typeface="Cascadia Code" panose="020B0609020000020004" pitchFamily="49" charset="0"/>
+              </a:rPr>
+              <a:t>	start-</a:t>
+            </a:r>
+            <a:r>
+              <a:rPr lang="fr-FR" sz="2400" dirty="0" err="1">
+                <a:solidFill>
+                  <a:schemeClr val="accent2">
+                    <a:lumMod val="50000"/>
+                  </a:schemeClr>
+                </a:solidFill>
+                <a:latin typeface="Cascadia Code" panose="020B0609020000020004" pitchFamily="49" charset="0"/>
+                <a:cs typeface="Cascadia Code" panose="020B0609020000020004" pitchFamily="49" charset="0"/>
+              </a:rPr>
+              <a:t>sleep</a:t>
+            </a:r>
+            <a:r>
+              <a:rPr lang="fr-FR" sz="2400" dirty="0">
+                <a:solidFill>
+                  <a:schemeClr val="accent2">
+                    <a:lumMod val="50000"/>
+                  </a:schemeClr>
+                </a:solidFill>
+                <a:latin typeface="Cascadia Code" panose="020B0609020000020004" pitchFamily="49" charset="0"/>
+                <a:cs typeface="Cascadia Code" panose="020B0609020000020004" pitchFamily="49" charset="0"/>
+              </a:rPr>
+              <a:t> 1;</a:t>
+            </a:r>
+          </a:p>
+          <a:p>
+            <a:pPr marL="914400" lvl="2" indent="0">
+              <a:buNone/>
+            </a:pPr>
+            <a:r>
+              <a:rPr lang="fr-FR" sz="2400" dirty="0">
+                <a:solidFill>
+                  <a:schemeClr val="accent2">
+                    <a:lumMod val="50000"/>
+                  </a:schemeClr>
+                </a:solidFill>
+                <a:latin typeface="Cascadia Code" panose="020B0609020000020004" pitchFamily="49" charset="0"/>
+                <a:cs typeface="Cascadia Code" panose="020B0609020000020004" pitchFamily="49" charset="0"/>
+              </a:rPr>
+              <a:t>	[console]::</a:t>
+            </a:r>
+            <a:r>
+              <a:rPr lang="fr-FR" dirty="0" err="1">
+                <a:solidFill>
+                  <a:schemeClr val="accent2">
+                    <a:lumMod val="50000"/>
+                  </a:schemeClr>
+                </a:solidFill>
+              </a:rPr>
+              <a:t>writeline</a:t>
+            </a:r>
+            <a:r>
+              <a:rPr lang="fr-FR" dirty="0">
+                <a:solidFill>
+                  <a:schemeClr val="accent2">
+                    <a:lumMod val="50000"/>
+                  </a:schemeClr>
+                </a:solidFill>
+              </a:rPr>
+              <a:t>("</a:t>
+            </a:r>
+            <a:r>
+              <a:rPr lang="fr-FR" dirty="0" err="1">
+                <a:solidFill>
+                  <a:schemeClr val="accent2">
+                    <a:lumMod val="50000"/>
+                  </a:schemeClr>
+                </a:solidFill>
+              </a:rPr>
+              <a:t>foo</a:t>
+            </a:r>
+            <a:r>
+              <a:rPr lang="fr-FR" dirty="0">
+                <a:solidFill>
+                  <a:schemeClr val="accent2">
+                    <a:lumMod val="50000"/>
+                  </a:schemeClr>
+                </a:solidFill>
+              </a:rPr>
+              <a:t>: $</a:t>
+            </a:r>
+            <a:r>
+              <a:rPr lang="fr-FR" dirty="0" err="1">
+                <a:solidFill>
+                  <a:schemeClr val="accent2">
+                    <a:lumMod val="50000"/>
+                  </a:schemeClr>
+                </a:solidFill>
+              </a:rPr>
+              <a:t>foo</a:t>
+            </a:r>
+            <a:r>
+              <a:rPr lang="fr-FR" dirty="0">
+                <a:solidFill>
+                  <a:schemeClr val="accent2">
+                    <a:lumMod val="50000"/>
+                  </a:schemeClr>
+                </a:solidFill>
+              </a:rPr>
+              <a:t>")</a:t>
+            </a:r>
+          </a:p>
+          <a:p>
+            <a:pPr marL="914400" lvl="2" indent="0">
+              <a:buNone/>
+            </a:pPr>
+            <a:r>
+              <a:rPr lang="fr-FR" dirty="0">
+                <a:solidFill>
+                  <a:schemeClr val="accent2">
+                    <a:lumMod val="50000"/>
+                  </a:schemeClr>
+                </a:solidFill>
+              </a:rPr>
+              <a:t>}.</a:t>
+            </a:r>
+            <a:r>
+              <a:rPr lang="fr-FR" dirty="0" err="1">
+                <a:solidFill>
+                  <a:schemeClr val="accent2">
+                    <a:lumMod val="50000"/>
+                  </a:schemeClr>
+                </a:solidFill>
+              </a:rPr>
+              <a:t>GetNewClosure</a:t>
+            </a:r>
+            <a:r>
+              <a:rPr lang="fr-FR" dirty="0">
+                <a:solidFill>
+                  <a:schemeClr val="accent2">
+                    <a:lumMod val="50000"/>
+                  </a:schemeClr>
+                </a:solidFill>
+              </a:rPr>
+              <a:t>()</a:t>
+            </a:r>
+          </a:p>
+          <a:p>
+            <a:pPr lvl="1"/>
+            <a:r>
+              <a:rPr lang="fr-FR" i="1" dirty="0"/>
+              <a:t>But </a:t>
+            </a:r>
+            <a:r>
+              <a:rPr lang="fr-FR" i="1" dirty="0" err="1"/>
+              <a:t>unfortunately</a:t>
+            </a:r>
+            <a:r>
+              <a:rPr lang="fr-FR" i="1" dirty="0"/>
+              <a:t> </a:t>
+            </a:r>
+            <a:r>
+              <a:rPr lang="fr-FR" i="1" dirty="0" err="1"/>
+              <a:t>this</a:t>
+            </a:r>
+            <a:r>
+              <a:rPr lang="fr-FR" i="1" dirty="0"/>
+              <a:t> </a:t>
+            </a:r>
+            <a:r>
+              <a:rPr lang="fr-FR" i="1" dirty="0" err="1"/>
+              <a:t>doesn’t</a:t>
+            </a:r>
+            <a:r>
+              <a:rPr lang="fr-FR" i="1" dirty="0"/>
+              <a:t> </a:t>
+            </a:r>
+            <a:r>
+              <a:rPr lang="fr-FR" i="1" dirty="0" err="1"/>
+              <a:t>work</a:t>
+            </a:r>
+            <a:r>
+              <a:rPr lang="fr-FR" i="1" dirty="0"/>
+              <a:t>…</a:t>
+            </a:r>
+          </a:p>
+        </p:txBody>
+      </p:sp>
+    </p:spTree>
+    <p:extLst>
+      <p:ext uri="{BB962C8B-B14F-4D97-AF65-F5344CB8AC3E}">
+        <p14:creationId xmlns:p14="http://schemas.microsoft.com/office/powerpoint/2010/main" val="207227458"/>
+      </p:ext>
+    </p:extLst>
+  </p:cSld>
+  <p:clrMapOvr>
+    <a:masterClrMapping/>
+  </p:clrMapOvr>
+</p:sld>
+</file>
+
+<file path=ppt/slides/slide18.xml><?xml version="1.0" encoding="utf-8"?>
 <p:sld xmlns:a="http://schemas.openxmlformats.org/drawingml/2006/main" xmlns:r="http://schemas.openxmlformats.org/officeDocument/2006/relationships" xmlns:p="http://schemas.openxmlformats.org/presentationml/2006/main">
   <p:cSld>
     <p:spTree>
@@ -7931,14 +9744,14 @@
             <a:pPr lvl="1"/>
             <a:r>
               <a:rPr lang="en-US" dirty="0"/>
-              <a:t>Invented PowerShell DSC</a:t>
+              <a:t>Inventor of PowerShell DSC</a:t>
             </a:r>
           </a:p>
           <a:p>
             <a:pPr lvl="1"/>
             <a:r>
               <a:rPr lang="en-US" dirty="0"/>
-              <a:t>Wrote a book</a:t>
+              <a:t>Wrote some books</a:t>
             </a:r>
           </a:p>
           <a:p>
@@ -7958,14 +9771,14 @@
             <a:pPr lvl="1"/>
             <a:r>
               <a:rPr lang="en-US" dirty="0"/>
-              <a:t>Principal Software at AWS</a:t>
+              <a:t>Principal Software Engineer at Amazon AWS</a:t>
             </a:r>
           </a:p>
           <a:p>
             <a:pPr lvl="2"/>
             <a:r>
               <a:rPr lang="en-US" dirty="0"/>
-              <a:t>Also worked on PowerShell</a:t>
+              <a:t>Where I also worked on PowerShell</a:t>
             </a:r>
           </a:p>
           <a:p>
@@ -8162,8 +9975,8 @@
           <a:lstStyle/>
           <a:p>
             <a:r>
-              <a:rPr lang="fr-FR" dirty="0" err="1"/>
-              <a:t>Definitions</a:t>
+              <a:rPr lang="fr-FR" dirty="0"/>
+              <a:t>Goals…</a:t>
             </a:r>
             <a:endParaRPr lang="en-GB" dirty="0"/>
           </a:p>
@@ -8188,7 +10001,7 @@
         <p:spPr/>
         <p:txBody>
           <a:bodyPr>
-            <a:normAutofit fontScale="92500" lnSpcReduction="10000"/>
+            <a:normAutofit/>
           </a:bodyPr>
           <a:lstStyle/>
           <a:p>
@@ -8197,163 +10010,51 @@
               <a:buChar char="§"/>
             </a:pPr>
             <a:r>
-              <a:rPr lang="fr-FR" dirty="0"/>
-              <a:t>Runspace</a:t>
-            </a:r>
-          </a:p>
-          <a:p>
-            <a:pPr lvl="1">
+              <a:rPr lang="en-US" dirty="0"/>
+              <a:t>Definitions : what are we talking about anyway?</a:t>
+            </a:r>
+          </a:p>
+          <a:p>
+            <a:pPr>
               <a:buFont typeface="Wingdings" panose="05000000000000000000" pitchFamily="2" charset="2"/>
               <a:buChar char="§"/>
             </a:pPr>
             <a:r>
-              <a:rPr lang="fr-FR" dirty="0"/>
-              <a:t>A place to run PowerShell code, local or </a:t>
-            </a:r>
-            <a:r>
-              <a:rPr lang="fr-FR" dirty="0" err="1"/>
-              <a:t>remote</a:t>
-            </a:r>
-            <a:endParaRPr lang="fr-FR" dirty="0"/>
-          </a:p>
-          <a:p>
-            <a:pPr lvl="1">
+              <a:rPr lang="en-US" dirty="0"/>
+              <a:t>Examine how script state is managed/implemented/exposed in PowerShell</a:t>
+            </a:r>
+          </a:p>
+          <a:p>
+            <a:pPr lvl="1"/>
+            <a:r>
+              <a:rPr lang="en-US" dirty="0"/>
+              <a:t>Look at the types used</a:t>
+            </a:r>
+          </a:p>
+          <a:p>
+            <a:pPr lvl="1"/>
+            <a:r>
+              <a:rPr lang="en-US" dirty="0"/>
+              <a:t>Look at how things fit together</a:t>
+            </a:r>
+          </a:p>
+          <a:p>
+            <a:pPr lvl="1"/>
+            <a:r>
+              <a:rPr lang="en-US" dirty="0"/>
+              <a:t>Look at some of the APIs</a:t>
+            </a:r>
+          </a:p>
+          <a:p>
+            <a:pPr>
               <a:buFont typeface="Wingdings" panose="05000000000000000000" pitchFamily="2" charset="2"/>
               <a:buChar char="§"/>
             </a:pPr>
             <a:r>
-              <a:rPr lang="fr-FR" dirty="0"/>
-              <a:t>Runspaces </a:t>
-            </a:r>
-            <a:r>
-              <a:rPr lang="fr-FR" dirty="0" err="1"/>
-              <a:t>contain</a:t>
-            </a:r>
-            <a:r>
-              <a:rPr lang="fr-FR" dirty="0"/>
-              <a:t> Modules</a:t>
-            </a:r>
-          </a:p>
-          <a:p>
-            <a:pPr lvl="1">
-              <a:buFont typeface="Wingdings" panose="05000000000000000000" pitchFamily="2" charset="2"/>
-              <a:buChar char="§"/>
-            </a:pPr>
-            <a:r>
-              <a:rPr lang="fr-FR" dirty="0" err="1"/>
-              <a:t>Created</a:t>
-            </a:r>
-            <a:r>
-              <a:rPr lang="fr-FR" dirty="0"/>
-              <a:t> </a:t>
-            </a:r>
-            <a:r>
-              <a:rPr lang="fr-FR" dirty="0" err="1"/>
-              <a:t>with</a:t>
-            </a:r>
-            <a:r>
-              <a:rPr lang="fr-FR" dirty="0"/>
-              <a:t> </a:t>
-            </a:r>
-            <a:r>
-              <a:rPr lang="fr-FR" sz="2600" dirty="0">
-                <a:latin typeface="Cascadia Code" panose="020B0609020000020004" pitchFamily="49" charset="0"/>
-                <a:cs typeface="Cascadia Code" panose="020B0609020000020004" pitchFamily="49" charset="0"/>
-              </a:rPr>
-              <a:t>[</a:t>
-            </a:r>
-            <a:r>
-              <a:rPr lang="fr-FR" sz="2600" dirty="0" err="1">
-                <a:latin typeface="Cascadia Code" panose="020B0609020000020004" pitchFamily="49" charset="0"/>
-                <a:cs typeface="Cascadia Code" panose="020B0609020000020004" pitchFamily="49" charset="0"/>
-              </a:rPr>
-              <a:t>RunspaceFactory</a:t>
-            </a:r>
-            <a:r>
-              <a:rPr lang="fr-FR" sz="2600" dirty="0">
-                <a:latin typeface="Cascadia Code" panose="020B0609020000020004" pitchFamily="49" charset="0"/>
-                <a:cs typeface="Cascadia Code" panose="020B0609020000020004" pitchFamily="49" charset="0"/>
-              </a:rPr>
-              <a:t>] </a:t>
-            </a:r>
-            <a:r>
-              <a:rPr lang="fr-FR" dirty="0"/>
-              <a:t>class.</a:t>
-            </a:r>
-          </a:p>
-          <a:p>
-            <a:r>
-              <a:rPr lang="fr-FR" dirty="0"/>
-              <a:t>Session</a:t>
-            </a:r>
-          </a:p>
-          <a:p>
-            <a:pPr lvl="1"/>
-            <a:r>
-              <a:rPr lang="fr-FR" dirty="0"/>
-              <a:t>Public </a:t>
-            </a:r>
-            <a:r>
-              <a:rPr lang="fr-FR" dirty="0" err="1"/>
-              <a:t>wrapper</a:t>
-            </a:r>
-            <a:r>
-              <a:rPr lang="fr-FR" dirty="0"/>
-              <a:t> </a:t>
-            </a:r>
-            <a:r>
-              <a:rPr lang="fr-FR" dirty="0" err="1"/>
-              <a:t>around</a:t>
-            </a:r>
-            <a:r>
-              <a:rPr lang="fr-FR" dirty="0"/>
-              <a:t> Runspaces to </a:t>
-            </a:r>
-            <a:r>
-              <a:rPr lang="fr-FR" dirty="0" err="1"/>
-              <a:t>make</a:t>
-            </a:r>
-            <a:r>
-              <a:rPr lang="fr-FR" dirty="0"/>
-              <a:t> </a:t>
-            </a:r>
-            <a:r>
-              <a:rPr lang="fr-FR" dirty="0" err="1"/>
-              <a:t>them</a:t>
-            </a:r>
-            <a:r>
-              <a:rPr lang="fr-FR" dirty="0"/>
-              <a:t> « </a:t>
-            </a:r>
-            <a:r>
-              <a:rPr lang="fr-FR" dirty="0" err="1"/>
-              <a:t>simpler</a:t>
-            </a:r>
-            <a:r>
-              <a:rPr lang="fr-FR" dirty="0"/>
-              <a:t> »</a:t>
-            </a:r>
-          </a:p>
-          <a:p>
-            <a:r>
-              <a:rPr lang="en-GB" dirty="0" err="1"/>
-              <a:t>SessionState</a:t>
+              <a:rPr lang="en-US" dirty="0"/>
+              <a:t>What can you do with closures…</a:t>
             </a:r>
             <a:endParaRPr lang="en-GB" dirty="0"/>
-          </a:p>
-          <a:p>
-            <a:pPr lvl="1"/>
-            <a:r>
-              <a:rPr lang="en-GB" dirty="0"/>
-              <a:t>Part of a Runspace</a:t>
-            </a:r>
-          </a:p>
-          <a:p>
-            <a:pPr lvl="1"/>
-            <a:r>
-              <a:rPr lang="en-GB" dirty="0"/>
-              <a:t>Represent a scoped set of bindings within a runspace</a:t>
-            </a:r>
           </a:p>
         </p:txBody>
       </p:sp>
@@ -8412,14 +10113,6 @@
               <a:rPr lang="fr-FR" dirty="0" err="1"/>
               <a:t>Definitions</a:t>
             </a:r>
-            <a:r>
-              <a:rPr lang="fr-FR" dirty="0"/>
-              <a:t> </a:t>
-            </a:r>
-            <a:r>
-              <a:rPr lang="fr-FR" dirty="0" err="1"/>
-              <a:t>cont’d</a:t>
-            </a:r>
             <a:endParaRPr lang="en-GB" dirty="0"/>
           </a:p>
         </p:txBody>
@@ -8440,7 +10133,12 @@
             <p:ph idx="1"/>
           </p:nvPr>
         </p:nvSpPr>
-        <p:spPr/>
+        <p:spPr>
+          <a:xfrm>
+            <a:off x="838200" y="1578769"/>
+            <a:ext cx="10515600" cy="4598194"/>
+          </a:xfrm>
+        </p:spPr>
         <p:txBody>
           <a:bodyPr>
             <a:normAutofit fontScale="92500" lnSpcReduction="20000"/>
@@ -8453,7 +10151,21 @@
             </a:pPr>
             <a:r>
               <a:rPr lang="fr-FR" dirty="0"/>
-              <a:t>Module</a:t>
+              <a:t>Runspace</a:t>
+            </a:r>
+          </a:p>
+          <a:p>
+            <a:pPr lvl="1"/>
+            <a:r>
+              <a:rPr lang="fr-FR" sz="2600" dirty="0" err="1">
+                <a:latin typeface="Cascadia Code" panose="020B0609020000020004" pitchFamily="49" charset="0"/>
+                <a:cs typeface="Cascadia Code" panose="020B0609020000020004" pitchFamily="49" charset="0"/>
+              </a:rPr>
+              <a:t>System.Management.Automation.Runspaces.Runspace</a:t>
+            </a:r>
+            <a:r>
+              <a:rPr lang="fr-FR" dirty="0"/>
+              <a:t>	</a:t>
             </a:r>
           </a:p>
           <a:p>
@@ -8463,11 +10175,22 @@
             </a:pPr>
             <a:r>
               <a:rPr lang="fr-FR" dirty="0"/>
-              <a:t>A programmer-</a:t>
+              <a:t>A place to run PowerShell code, local or </a:t>
             </a:r>
             <a:r>
               <a:rPr lang="fr-FR" dirty="0" err="1"/>
-              <a:t>focused</a:t>
+              <a:t>remote</a:t>
+            </a:r>
+            <a:endParaRPr lang="fr-FR" dirty="0"/>
+          </a:p>
+          <a:p>
+            <a:pPr lvl="1">
+              <a:buFont typeface="Wingdings" panose="05000000000000000000" pitchFamily="2" charset="2"/>
+              <a:buChar char="§"/>
+            </a:pPr>
+            <a:r>
+              <a:rPr lang="fr-FR" dirty="0" err="1"/>
+              <a:t>Created</a:t>
             </a:r>
             <a:r>
               <a:rPr lang="fr-FR" dirty="0"/>
@@ -8475,19 +10198,11 @@
             </a:r>
             <a:r>
               <a:rPr lang="fr-FR" dirty="0" err="1"/>
-              <a:t>wrapper</a:t>
+              <a:t>with</a:t>
             </a:r>
             <a:r>
               <a:rPr lang="fr-FR" dirty="0"/>
               <a:t> </a:t>
-            </a:r>
-            <a:r>
-              <a:rPr lang="fr-FR" dirty="0" err="1"/>
-              <a:t>around</a:t>
-            </a:r>
-            <a:r>
-              <a:rPr lang="fr-FR" dirty="0"/>
-              <a:t> a </a:t>
             </a:r>
             <a:r>
               <a:rPr lang="fr-FR" sz="2600" dirty="0">
@@ -8501,7 +10216,7 @@
                 <a:latin typeface="Cascadia Code" panose="020B0609020000020004" pitchFamily="49" charset="0"/>
                 <a:cs typeface="Cascadia Code" panose="020B0609020000020004" pitchFamily="49" charset="0"/>
               </a:rPr>
-              <a:t>SessionState</a:t>
+              <a:t>RunspaceFactory</a:t>
             </a:r>
             <a:r>
               <a:rPr lang="fr-FR" sz="2600" dirty="0">
@@ -8511,8 +10226,130 @@
               <a:t>] </a:t>
             </a:r>
             <a:r>
+              <a:rPr lang="fr-FR" dirty="0"/>
+              <a:t>class.</a:t>
+            </a:r>
+          </a:p>
+          <a:p>
+            <a:r>
               <a:rPr lang="fr-FR" dirty="0" err="1"/>
-              <a:t>object</a:t>
+              <a:t>ICommandRuntime</a:t>
+            </a:r>
+            <a:endParaRPr lang="fr-FR" dirty="0"/>
+          </a:p>
+          <a:p>
+            <a:pPr marL="685800" marR="0" lvl="1" indent="-228600" algn="l" defTabSz="914400" rtl="0" eaLnBrk="1" fontAlgn="auto" latinLnBrk="0" hangingPunct="1">
+              <a:lnSpc>
+                <a:spcPct val="90000"/>
+              </a:lnSpc>
+              <a:spcBef>
+                <a:spcPts val="500"/>
+              </a:spcBef>
+              <a:spcAft>
+                <a:spcPts val="0"/>
+              </a:spcAft>
+              <a:buClrTx/>
+              <a:buSzTx/>
+              <a:buFont typeface="Wingdings" panose="05000000000000000000" pitchFamily="2" charset="2"/>
+              <a:buChar char="§"/>
+              <a:tabLst/>
+              <a:defRPr/>
+            </a:pPr>
+            <a:r>
+              <a:rPr kumimoji="0" lang="fr-FR" sz="2600" b="0" i="0" u="none" strike="noStrike" kern="1200" cap="none" spc="0" normalizeH="0" baseline="0" noProof="0" dirty="0" err="1">
+                <a:ln>
+                  <a:noFill/>
+                </a:ln>
+                <a:solidFill>
+                  <a:srgbClr val="346297"/>
+                </a:solidFill>
+                <a:effectLst/>
+                <a:uLnTx/>
+                <a:uFillTx/>
+                <a:latin typeface="Cascadia Code" panose="020B0609020000020004" pitchFamily="49" charset="0"/>
+                <a:ea typeface="+mn-ea"/>
+                <a:cs typeface="Cascadia Code" panose="020B0609020000020004" pitchFamily="49" charset="0"/>
+              </a:rPr>
+              <a:t>System.Management.Automation.ICommandRuntime</a:t>
+            </a:r>
+            <a:endParaRPr lang="fr-FR" dirty="0"/>
+          </a:p>
+          <a:p>
+            <a:pPr lvl="1"/>
+            <a:r>
+              <a:rPr lang="fr-FR" dirty="0"/>
+              <a:t>A </a:t>
+            </a:r>
+            <a:r>
+              <a:rPr lang="fr-FR" i="1" dirty="0" err="1"/>
+              <a:t>shim</a:t>
+            </a:r>
+            <a:r>
+              <a:rPr lang="fr-FR" dirty="0"/>
+              <a:t> layer </a:t>
+            </a:r>
+            <a:r>
+              <a:rPr lang="fr-FR" dirty="0" err="1"/>
+              <a:t>that</a:t>
+            </a:r>
+            <a:r>
+              <a:rPr lang="fr-FR" dirty="0"/>
+              <a:t> directs how output </a:t>
+            </a:r>
+            <a:r>
+              <a:rPr lang="fr-FR" dirty="0" err="1"/>
+              <a:t>is</a:t>
+            </a:r>
+            <a:r>
+              <a:rPr lang="fr-FR" dirty="0"/>
+              <a:t> </a:t>
+            </a:r>
+            <a:r>
+              <a:rPr lang="fr-FR" dirty="0" err="1"/>
+              <a:t>streamed</a:t>
+            </a:r>
+            <a:endParaRPr lang="fr-FR" dirty="0"/>
+          </a:p>
+          <a:p>
+            <a:pPr lvl="1"/>
+            <a:r>
+              <a:rPr lang="fr-FR" dirty="0" err="1"/>
+              <a:t>Needed</a:t>
+            </a:r>
+            <a:r>
+              <a:rPr lang="fr-FR" dirty="0"/>
+              <a:t> to </a:t>
+            </a:r>
+            <a:r>
+              <a:rPr lang="fr-FR" dirty="0" err="1"/>
+              <a:t>make</a:t>
+            </a:r>
+            <a:r>
+              <a:rPr lang="fr-FR" dirty="0"/>
+              <a:t> standalone </a:t>
+            </a:r>
+            <a:r>
+              <a:rPr lang="fr-FR" sz="2600" dirty="0" err="1">
+                <a:latin typeface="Cascadia Code" panose="020B0609020000020004" pitchFamily="49" charset="0"/>
+                <a:cs typeface="Cascadia Code" panose="020B0609020000020004" pitchFamily="49" charset="0"/>
+              </a:rPr>
+              <a:t>Cmdlet</a:t>
+            </a:r>
+            <a:r>
+              <a:rPr lang="fr-FR" dirty="0"/>
+              <a:t> </a:t>
+            </a:r>
+            <a:r>
+              <a:rPr lang="fr-FR" dirty="0" err="1"/>
+              <a:t>cmdlets</a:t>
+            </a:r>
+            <a:r>
+              <a:rPr lang="fr-FR" dirty="0"/>
+              <a:t> </a:t>
+            </a:r>
+            <a:r>
+              <a:rPr lang="fr-FR" dirty="0" err="1"/>
+              <a:t>work</a:t>
             </a:r>
             <a:r>
               <a:rPr lang="fr-FR" dirty="0"/>
@@ -8520,112 +10357,68 @@
             </a:r>
           </a:p>
           <a:p>
-            <a:pPr lvl="1">
-              <a:buFont typeface="Wingdings" panose="05000000000000000000" pitchFamily="2" charset="2"/>
-              <a:buChar char="§"/>
-            </a:pPr>
+            <a:pPr lvl="1"/>
             <a:r>
               <a:rPr lang="fr-FR" dirty="0"/>
-              <a:t>Modules can </a:t>
+              <a:t>An API </a:t>
             </a:r>
             <a:r>
               <a:rPr lang="fr-FR" dirty="0" err="1"/>
-              <a:t>be</a:t>
+              <a:t>from</a:t>
             </a:r>
             <a:r>
               <a:rPr lang="fr-FR" dirty="0"/>
-              <a:t> </a:t>
+              <a:t> the </a:t>
             </a:r>
             <a:r>
               <a:rPr lang="fr-FR" dirty="0" err="1"/>
-              <a:t>linked</a:t>
+              <a:t>Political</a:t>
             </a:r>
             <a:r>
               <a:rPr lang="fr-FR" dirty="0"/>
-              <a:t> </a:t>
-            </a:r>
+              <a:t> Layer</a:t>
+            </a:r>
+          </a:p>
+          <a:p>
             <a:r>
               <a:rPr lang="fr-FR" dirty="0" err="1"/>
-              <a:t>together</a:t>
+              <a:t>ExecutionContext</a:t>
+            </a:r>
+            <a:r>
+              <a:rPr lang="fr-FR" dirty="0"/>
+              <a:t> (not public)</a:t>
+            </a:r>
+          </a:p>
+          <a:p>
+            <a:pPr lvl="1"/>
+            <a:r>
+              <a:rPr lang="fr-FR" dirty="0" err="1"/>
+              <a:t>Inner</a:t>
+            </a:r>
+            <a:r>
+              <a:rPr lang="fr-FR" dirty="0"/>
+              <a:t> class </a:t>
+            </a:r>
+            <a:r>
+              <a:rPr lang="fr-FR" dirty="0" err="1"/>
+              <a:t>wrapped</a:t>
+            </a:r>
+            <a:r>
+              <a:rPr lang="fr-FR" dirty="0"/>
+              <a:t> by </a:t>
+            </a:r>
+            <a:r>
+              <a:rPr lang="fr-FR" dirty="0" err="1"/>
+              <a:t>RunSpace</a:t>
             </a:r>
             <a:endParaRPr lang="fr-FR" dirty="0"/>
-          </a:p>
-          <a:p>
-            <a:r>
-              <a:rPr lang="fr-FR" dirty="0"/>
-              <a:t>Scope</a:t>
-            </a:r>
-          </a:p>
-          <a:p>
-            <a:pPr lvl="1"/>
-            <a:r>
-              <a:rPr lang="fr-FR" dirty="0" err="1"/>
-              <a:t>Linked</a:t>
-            </a:r>
-            <a:r>
-              <a:rPr lang="fr-FR" dirty="0"/>
-              <a:t> data structures </a:t>
-            </a:r>
-            <a:r>
-              <a:rPr lang="fr-FR" dirty="0" err="1"/>
-              <a:t>inside</a:t>
-            </a:r>
-            <a:r>
-              <a:rPr lang="fr-FR" dirty="0"/>
-              <a:t> a </a:t>
-            </a:r>
-            <a:r>
-              <a:rPr lang="fr-FR" dirty="0" err="1"/>
-              <a:t>SessionState</a:t>
-            </a:r>
-            <a:r>
-              <a:rPr lang="fr-FR" dirty="0"/>
-              <a:t> </a:t>
-            </a:r>
-            <a:r>
-              <a:rPr lang="fr-FR" dirty="0" err="1"/>
-              <a:t>object</a:t>
-            </a:r>
-            <a:endParaRPr lang="fr-FR" dirty="0"/>
-          </a:p>
-          <a:p>
-            <a:pPr lvl="1"/>
-            <a:r>
-              <a:rPr lang="fr-FR" dirty="0" err="1"/>
-              <a:t>Holds</a:t>
-            </a:r>
-            <a:r>
-              <a:rPr lang="fr-FR" dirty="0"/>
-              <a:t> the active set of bindings</a:t>
-            </a:r>
-          </a:p>
-          <a:p>
-            <a:r>
-              <a:rPr lang="en-GB" dirty="0" err="1"/>
-              <a:t>SessionState</a:t>
-            </a:r>
-            <a:endParaRPr lang="en-GB" dirty="0"/>
-          </a:p>
-          <a:p>
-            <a:pPr lvl="1"/>
-            <a:r>
-              <a:rPr lang="en-GB" dirty="0"/>
-              <a:t>Part of a runspace</a:t>
-            </a:r>
-          </a:p>
-          <a:p>
-            <a:pPr lvl="1"/>
-            <a:r>
-              <a:rPr lang="en-GB" dirty="0"/>
-              <a:t>Scoped set of bindings within a runspace</a:t>
-            </a:r>
           </a:p>
         </p:txBody>
       </p:sp>
     </p:spTree>
     <p:extLst>
       <p:ext uri="{BB962C8B-B14F-4D97-AF65-F5344CB8AC3E}">
-        <p14:creationId xmlns:p14="http://schemas.microsoft.com/office/powerpoint/2010/main" val="281987410"/>
+        <p14:creationId xmlns:p14="http://schemas.microsoft.com/office/powerpoint/2010/main" val="3279249537"/>
       </p:ext>
     </p:extLst>
   </p:cSld>
@@ -10332,15 +12125,6 @@
 </file>
 
 <file path=customXml/item1.xml><?xml version="1.0" encoding="utf-8"?>
-<?mso-contentType ?>
-<FormTemplates xmlns="http://schemas.microsoft.com/sharepoint/v3/contenttype/forms">
-  <Display>DocumentLibraryForm</Display>
-  <Edit>DocumentLibraryForm</Edit>
-  <New>DocumentLibraryForm</New>
-</FormTemplates>
-</file>
-
-<file path=customXml/item2.xml><?xml version="1.0" encoding="utf-8"?>
 <ct:contentTypeSchema xmlns:ct="http://schemas.microsoft.com/office/2006/metadata/contentType" xmlns:ma="http://schemas.microsoft.com/office/2006/metadata/properties/metaAttributes" ct:_="" ma:_="" ma:contentTypeName="Document" ma:contentTypeID="0x010100465209AEF8DBB7418260C2A216A09DE4" ma:contentTypeVersion="13" ma:contentTypeDescription="Crée un document." ma:contentTypeScope="" ma:versionID="aacbea182e442c081ba3c266ed8afaf1">
   <xsd:schema xmlns:xsd="http://www.w3.org/2001/XMLSchema" xmlns:xs="http://www.w3.org/2001/XMLSchema" xmlns:p="http://schemas.microsoft.com/office/2006/metadata/properties" xmlns:ns2="2347cc20-e10c-452d-848a-c18e83138525" xmlns:ns3="85c0ce47-fe9c-4809-bf88-519c39a738e6" targetNamespace="http://schemas.microsoft.com/office/2006/metadata/properties" ma:root="true" ma:fieldsID="fe2d8c2794f7059c45f035c586269f9a" ns2:_="" ns3:_="">
     <xsd:import namespace="2347cc20-e10c-452d-848a-c18e83138525"/>
@@ -10547,6 +12331,15 @@
 </ct:contentTypeSchema>
 </file>
 
+<file path=customXml/item2.xml><?xml version="1.0" encoding="utf-8"?>
+<?mso-contentType ?>
+<FormTemplates xmlns="http://schemas.microsoft.com/sharepoint/v3/contenttype/forms">
+  <Display>DocumentLibraryForm</Display>
+  <Edit>DocumentLibraryForm</Edit>
+  <New>DocumentLibraryForm</New>
+</FormTemplates>
+</file>
+
 <file path=customXml/item3.xml><?xml version="1.0" encoding="utf-8"?>
 <p:properties xmlns:p="http://schemas.microsoft.com/office/2006/metadata/properties" xmlns:xsi="http://www.w3.org/2001/XMLSchema-instance" xmlns:pc="http://schemas.microsoft.com/office/infopath/2007/PartnerControls">
   <documentManagement>
@@ -10559,14 +12352,6 @@
 </file>
 
 <file path=customXml/itemProps1.xml><?xml version="1.0" encoding="utf-8"?>
-<ds:datastoreItem xmlns:ds="http://schemas.openxmlformats.org/officeDocument/2006/customXml" ds:itemID="{57D9B22B-F436-4FE5-B6C0-65AB2260F593}">
-  <ds:schemaRefs>
-    <ds:schemaRef ds:uri="http://schemas.microsoft.com/sharepoint/v3/contenttype/forms"/>
-  </ds:schemaRefs>
-</ds:datastoreItem>
-</file>
-
-<file path=customXml/itemProps2.xml><?xml version="1.0" encoding="utf-8"?>
 <ds:datastoreItem xmlns:ds="http://schemas.openxmlformats.org/officeDocument/2006/customXml" ds:itemID="{2D49AF2C-D145-4497-874A-78CB33723463}">
   <ds:schemaRefs>
     <ds:schemaRef ds:uri="http://schemas.microsoft.com/office/2006/metadata/contentType"/>
@@ -10585,6 +12370,14 @@
 </ds:datastoreItem>
 </file>
 
+<file path=customXml/itemProps2.xml><?xml version="1.0" encoding="utf-8"?>
+<ds:datastoreItem xmlns:ds="http://schemas.openxmlformats.org/officeDocument/2006/customXml" ds:itemID="{57D9B22B-F436-4FE5-B6C0-65AB2260F593}">
+  <ds:schemaRefs>
+    <ds:schemaRef ds:uri="http://schemas.microsoft.com/sharepoint/v3/contenttype/forms"/>
+  </ds:schemaRefs>
+</ds:datastoreItem>
+</file>
+
 <file path=customXml/itemProps3.xml><?xml version="1.0" encoding="utf-8"?>
 <ds:datastoreItem xmlns:ds="http://schemas.openxmlformats.org/officeDocument/2006/customXml" ds:itemID="{AA9C06E3-346E-408E-B352-32E922A070CE}">
   <ds:schemaRefs>

</xml_diff>

<commit_message>
Updated with the final changes for the talk.
</commit_message>
<xml_diff>
--- a/payette_2024_closures.pptx
+++ b/payette_2024_closures.pptx
@@ -8,10 +8,10 @@
     <p:sldMasterId id="2147483684" r:id="rId7"/>
   </p:sldMasterIdLst>
   <p:notesMasterIdLst>
-    <p:notesMasterId r:id="rId26"/>
+    <p:notesMasterId r:id="rId29"/>
   </p:notesMasterIdLst>
   <p:handoutMasterIdLst>
-    <p:handoutMasterId r:id="rId27"/>
+    <p:handoutMasterId r:id="rId30"/>
   </p:handoutMasterIdLst>
   <p:sldIdLst>
     <p:sldId id="272" r:id="rId8"/>
@@ -30,8 +30,11 @@
     <p:sldId id="280" r:id="rId21"/>
     <p:sldId id="282" r:id="rId22"/>
     <p:sldId id="281" r:id="rId23"/>
-    <p:sldId id="283" r:id="rId24"/>
-    <p:sldId id="265" r:id="rId25"/>
+    <p:sldId id="285" r:id="rId24"/>
+    <p:sldId id="283" r:id="rId25"/>
+    <p:sldId id="264" r:id="rId26"/>
+    <p:sldId id="284" r:id="rId27"/>
+    <p:sldId id="265" r:id="rId28"/>
   </p:sldIdLst>
   <p:sldSz cx="12192000" cy="6858000"/>
   <p:notesSz cx="6858000" cy="9144000"/>
@@ -155,7 +158,10 @@
             <p14:sldId id="280"/>
             <p14:sldId id="282"/>
             <p14:sldId id="281"/>
+            <p14:sldId id="285"/>
             <p14:sldId id="283"/>
+            <p14:sldId id="264"/>
+            <p14:sldId id="284"/>
             <p14:sldId id="265"/>
           </p14:sldIdLst>
         </p14:section>
@@ -273,7 +279,7 @@
           <a:p>
             <a:fld id="{69440670-43D7-400A-ABC5-B69E064DBB37}" type="datetimeFigureOut">
               <a:rPr lang="en-GB" smtClean="0"/>
-              <a:t>23/06/2024</a:t>
+              <a:t>24/06/2024</a:t>
             </a:fld>
             <a:endParaRPr lang="en-GB"/>
           </a:p>
@@ -450,7 +456,7 @@
           <a:p>
             <a:fld id="{611B03A4-75C9-4E3D-9183-2102CA9AEC33}" type="datetimeFigureOut">
               <a:rPr lang="en-GB" smtClean="0"/>
-              <a:t>23/06/2024</a:t>
+              <a:t>24/06/2024</a:t>
             </a:fld>
             <a:endParaRPr lang="en-GB"/>
           </a:p>
@@ -5399,16 +5405,26 @@
           <a:p>
             <a:pPr lvl="1"/>
             <a:r>
+              <a:rPr lang="fr-FR" sz="2400" dirty="0">
+                <a:latin typeface="Cascadia Code" panose="020B0609020000020004" pitchFamily="49" charset="0"/>
+                <a:cs typeface="Cascadia Code" panose="020B0609020000020004" pitchFamily="49" charset="0"/>
+              </a:rPr>
+              <a:t>[</a:t>
+            </a:r>
+            <a:r>
               <a:rPr lang="fr-FR" sz="2400" dirty="0" err="1">
                 <a:latin typeface="Cascadia Code" panose="020B0609020000020004" pitchFamily="49" charset="0"/>
                 <a:cs typeface="Cascadia Code" panose="020B0609020000020004" pitchFamily="49" charset="0"/>
               </a:rPr>
               <a:t>System.Management.Automation.Runspaces.PSSession</a:t>
             </a:r>
-            <a:endParaRPr lang="fr-FR" sz="2400" dirty="0">
-              <a:latin typeface="Cascadia Code" panose="020B0609020000020004" pitchFamily="49" charset="0"/>
-              <a:cs typeface="Cascadia Code" panose="020B0609020000020004" pitchFamily="49" charset="0"/>
-            </a:endParaRPr>
+            <a:r>
+              <a:rPr lang="fr-FR" sz="2400" dirty="0">
+                <a:latin typeface="Cascadia Code" panose="020B0609020000020004" pitchFamily="49" charset="0"/>
+                <a:cs typeface="Cascadia Code" panose="020B0609020000020004" pitchFamily="49" charset="0"/>
+              </a:rPr>
+              <a:t>]</a:t>
+            </a:r>
           </a:p>
           <a:p>
             <a:pPr lvl="1"/>
@@ -5480,6 +5496,13 @@
           </a:p>
           <a:p>
             <a:pPr lvl="1"/>
+            <a:r>
+              <a:rPr lang="en-GB" sz="2400" dirty="0">
+                <a:latin typeface="Cascadia Code" panose="020B0609020000020004" pitchFamily="49" charset="0"/>
+                <a:cs typeface="Cascadia Code" panose="020B0609020000020004" pitchFamily="49" charset="0"/>
+              </a:rPr>
+              <a:t>[</a:t>
+            </a:r>
             <a:r>
               <a:rPr lang="en-GB" sz="2400" dirty="0" err="1">
                 <a:latin typeface="Cascadia Code" panose="020B0609020000020004" pitchFamily="49" charset="0"/>
@@ -5487,10 +5510,13 @@
               </a:rPr>
               <a:t>System.Management.Automation.SessionState</a:t>
             </a:r>
-            <a:endParaRPr lang="en-GB" sz="2400" dirty="0">
-              <a:latin typeface="Cascadia Code" panose="020B0609020000020004" pitchFamily="49" charset="0"/>
-              <a:cs typeface="Cascadia Code" panose="020B0609020000020004" pitchFamily="49" charset="0"/>
-            </a:endParaRPr>
+            <a:r>
+              <a:rPr lang="en-GB" sz="2400" dirty="0">
+                <a:latin typeface="Cascadia Code" panose="020B0609020000020004" pitchFamily="49" charset="0"/>
+                <a:cs typeface="Cascadia Code" panose="020B0609020000020004" pitchFamily="49" charset="0"/>
+              </a:rPr>
+              <a:t>]</a:t>
+            </a:r>
           </a:p>
           <a:p>
             <a:pPr lvl="1"/>
@@ -7934,10 +7960,10 @@
       </p:grpSpPr>
       <p:sp>
         <p:nvSpPr>
-          <p:cNvPr id="2" name="Titre 1">
+          <p:cNvPr id="4" name="Title 3">
             <a:extLst>
               <a:ext uri="{FF2B5EF4-FFF2-40B4-BE49-F238E27FC236}">
-                <a16:creationId xmlns:a16="http://schemas.microsoft.com/office/drawing/2014/main" id="{5191E0F2-FE77-51ED-3F72-223B58926E74}"/>
+                <a16:creationId xmlns:a16="http://schemas.microsoft.com/office/drawing/2014/main" id="{2B167248-C99C-E892-89E1-4CBB81F02F90}"/>
               </a:ext>
             </a:extLst>
           </p:cNvPr>
@@ -7948,37 +7974,29 @@
             <p:ph type="title"/>
           </p:nvPr>
         </p:nvSpPr>
-        <p:spPr/>
+        <p:spPr>
+          <a:xfrm>
+            <a:off x="831850" y="529389"/>
+            <a:ext cx="10515600" cy="1004637"/>
+          </a:xfrm>
+        </p:spPr>
         <p:txBody>
           <a:bodyPr/>
           <a:lstStyle/>
           <a:p>
             <a:r>
-              <a:rPr lang="fr-FR" dirty="0" err="1"/>
-              <a:t>What</a:t>
-            </a:r>
-            <a:r>
-              <a:rPr lang="fr-FR" dirty="0"/>
-              <a:t> are </a:t>
-            </a:r>
-            <a:r>
-              <a:rPr lang="fr-FR" dirty="0" err="1"/>
-              <a:t>closures</a:t>
-            </a:r>
-            <a:r>
-              <a:rPr lang="fr-FR" dirty="0"/>
-              <a:t> good for?</a:t>
-            </a:r>
-            <a:endParaRPr lang="en-GB" dirty="0"/>
+              <a:rPr lang="en-GB"/>
+              <a:t>Demos</a:t>
+            </a:r>
           </a:p>
         </p:txBody>
       </p:sp>
       <p:sp>
         <p:nvSpPr>
-          <p:cNvPr id="3" name="Espace réservé du contenu 2">
+          <p:cNvPr id="5" name="Text Placeholder 4">
             <a:extLst>
               <a:ext uri="{FF2B5EF4-FFF2-40B4-BE49-F238E27FC236}">
-                <a16:creationId xmlns:a16="http://schemas.microsoft.com/office/drawing/2014/main" id="{07D5023A-BA6F-B725-CF78-FD889E577EA6}"/>
+                <a16:creationId xmlns:a16="http://schemas.microsoft.com/office/drawing/2014/main" id="{2CACAFC7-78CB-98F9-FEF3-D3E8C9FF6E6F}"/>
               </a:ext>
             </a:extLst>
           </p:cNvPr>
@@ -7986,459 +8004,70 @@
             <a:spLocks noGrp="1"/>
           </p:cNvSpPr>
           <p:nvPr>
-            <p:ph idx="1"/>
+            <p:ph type="body" idx="1"/>
           </p:nvPr>
         </p:nvSpPr>
-        <p:spPr/>
+        <p:spPr>
+          <a:xfrm>
+            <a:off x="831850" y="1653758"/>
+            <a:ext cx="10515600" cy="1500187"/>
+          </a:xfrm>
+        </p:spPr>
         <p:txBody>
-          <a:bodyPr>
-            <a:normAutofit fontScale="92500" lnSpcReduction="20000"/>
-          </a:bodyPr>
+          <a:bodyPr/>
           <a:lstStyle/>
           <a:p>
-            <a:pPr>
-              <a:buFont typeface="Wingdings" panose="05000000000000000000" pitchFamily="2" charset="2"/>
-              <a:buChar char="§"/>
-            </a:pPr>
-            <a:r>
-              <a:rPr lang="fr-FR" dirty="0" err="1"/>
-              <a:t>Stateful</a:t>
-            </a:r>
-            <a:r>
-              <a:rPr lang="fr-FR" dirty="0"/>
-              <a:t> </a:t>
-            </a:r>
-            <a:r>
-              <a:rPr lang="fr-FR" dirty="0" err="1"/>
-              <a:t>functions</a:t>
-            </a:r>
-            <a:endParaRPr lang="fr-FR" dirty="0"/>
-          </a:p>
-          <a:p>
-            <a:pPr lvl="1"/>
-            <a:r>
-              <a:rPr lang="fr-FR" dirty="0" err="1"/>
-              <a:t>Encapsulate</a:t>
-            </a:r>
-            <a:r>
-              <a:rPr lang="fr-FR" dirty="0"/>
-              <a:t> </a:t>
-            </a:r>
-            <a:r>
-              <a:rPr lang="fr-FR" dirty="0" err="1"/>
-              <a:t>private</a:t>
-            </a:r>
-            <a:r>
-              <a:rPr lang="fr-FR" dirty="0"/>
-              <a:t> state in a </a:t>
-            </a:r>
-            <a:r>
-              <a:rPr lang="fr-FR" dirty="0" err="1"/>
-              <a:t>function</a:t>
-            </a:r>
-            <a:r>
-              <a:rPr lang="fr-FR" dirty="0"/>
-              <a:t>: </a:t>
-            </a:r>
-            <a:r>
-              <a:rPr lang="fr-FR" dirty="0" err="1"/>
-              <a:t>function</a:t>
-            </a:r>
-            <a:r>
-              <a:rPr lang="fr-FR" dirty="0"/>
-              <a:t> </a:t>
-            </a:r>
-            <a:r>
-              <a:rPr lang="fr-FR" dirty="0" err="1"/>
-              <a:t>generators</a:t>
-            </a:r>
-            <a:endParaRPr lang="fr-FR" dirty="0"/>
-          </a:p>
-          <a:p>
-            <a:pPr lvl="1">
-              <a:buFont typeface="Wingdings" panose="05000000000000000000" pitchFamily="2" charset="2"/>
-              <a:buChar char="§"/>
-            </a:pPr>
-            <a:r>
-              <a:rPr lang="fr-FR"/>
-              <a:t>New-Counter </a:t>
-            </a:r>
-            <a:r>
-              <a:rPr lang="fr-FR" dirty="0" err="1"/>
-              <a:t>example</a:t>
-            </a:r>
-            <a:r>
-              <a:rPr lang="fr-FR" dirty="0"/>
-              <a:t>.</a:t>
-            </a:r>
-          </a:p>
-          <a:p>
-            <a:r>
-              <a:rPr lang="fr-FR" dirty="0" err="1"/>
-              <a:t>Simplified</a:t>
-            </a:r>
-            <a:r>
-              <a:rPr lang="fr-FR" dirty="0"/>
-              <a:t> </a:t>
-            </a:r>
-            <a:r>
-              <a:rPr lang="fr-FR" dirty="0" err="1"/>
-              <a:t>concurrency</a:t>
-            </a:r>
-            <a:endParaRPr lang="fr-FR" dirty="0"/>
-          </a:p>
-          <a:p>
-            <a:pPr lvl="1"/>
-            <a:r>
-              <a:rPr lang="fr-FR" dirty="0" err="1"/>
-              <a:t>Instead</a:t>
-            </a:r>
-            <a:r>
-              <a:rPr lang="fr-FR" dirty="0"/>
-              <a:t> of </a:t>
-            </a:r>
-            <a:r>
-              <a:rPr lang="fr-FR" sz="2400" dirty="0">
-                <a:latin typeface="Cascadia Code" panose="020B0609020000020004" pitchFamily="49" charset="0"/>
-                <a:cs typeface="Cascadia Code" panose="020B0609020000020004" pitchFamily="49" charset="0"/>
-              </a:rPr>
-              <a:t>$</a:t>
-            </a:r>
-            <a:r>
-              <a:rPr lang="fr-FR" sz="2400" dirty="0" err="1">
-                <a:latin typeface="Cascadia Code" panose="020B0609020000020004" pitchFamily="49" charset="0"/>
-                <a:cs typeface="Cascadia Code" panose="020B0609020000020004" pitchFamily="49" charset="0"/>
-              </a:rPr>
-              <a:t>using:foo</a:t>
-            </a:r>
-            <a:r>
-              <a:rPr lang="fr-FR" sz="2400" dirty="0">
-                <a:latin typeface="Cascadia Code" panose="020B0609020000020004" pitchFamily="49" charset="0"/>
-                <a:cs typeface="Cascadia Code" panose="020B0609020000020004" pitchFamily="49" charset="0"/>
-              </a:rPr>
-              <a:t> </a:t>
-            </a:r>
-            <a:r>
-              <a:rPr lang="fr-FR" dirty="0" err="1"/>
-              <a:t>just</a:t>
-            </a:r>
-            <a:r>
-              <a:rPr lang="fr-FR" dirty="0"/>
-              <a:t> use a </a:t>
-            </a:r>
-            <a:r>
-              <a:rPr lang="fr-FR" dirty="0" err="1"/>
-              <a:t>closure</a:t>
-            </a:r>
-            <a:r>
-              <a:rPr lang="fr-FR" dirty="0"/>
-              <a:t>:</a:t>
-            </a:r>
-          </a:p>
-          <a:p>
-            <a:pPr marL="914400" lvl="2" indent="0">
-              <a:buNone/>
-            </a:pPr>
-            <a:r>
-              <a:rPr lang="fr-FR" sz="2400" dirty="0">
-                <a:solidFill>
-                  <a:schemeClr val="accent2">
-                    <a:lumMod val="50000"/>
-                  </a:schemeClr>
-                </a:solidFill>
-                <a:latin typeface="Cascadia Code" panose="020B0609020000020004" pitchFamily="49" charset="0"/>
-                <a:cs typeface="Cascadia Code" panose="020B0609020000020004" pitchFamily="49" charset="0"/>
-              </a:rPr>
-              <a:t>$</a:t>
-            </a:r>
-            <a:r>
-              <a:rPr lang="fr-FR" sz="2400" dirty="0" err="1">
-                <a:solidFill>
-                  <a:schemeClr val="accent2">
-                    <a:lumMod val="50000"/>
-                  </a:schemeClr>
-                </a:solidFill>
-                <a:latin typeface="Cascadia Code" panose="020B0609020000020004" pitchFamily="49" charset="0"/>
-                <a:cs typeface="Cascadia Code" panose="020B0609020000020004" pitchFamily="49" charset="0"/>
-              </a:rPr>
-              <a:t>foo</a:t>
-            </a:r>
-            <a:r>
-              <a:rPr lang="fr-FR" sz="2400" dirty="0">
-                <a:solidFill>
-                  <a:schemeClr val="accent2">
-                    <a:lumMod val="50000"/>
-                  </a:schemeClr>
-                </a:solidFill>
-                <a:latin typeface="Cascadia Code" panose="020B0609020000020004" pitchFamily="49" charset="0"/>
-                <a:cs typeface="Cascadia Code" panose="020B0609020000020004" pitchFamily="49" charset="0"/>
-              </a:rPr>
-              <a:t> = "Hi </a:t>
-            </a:r>
-            <a:r>
-              <a:rPr lang="fr-FR" sz="2400" dirty="0" err="1">
-                <a:solidFill>
-                  <a:schemeClr val="accent2">
-                    <a:lumMod val="50000"/>
-                  </a:schemeClr>
-                </a:solidFill>
-                <a:latin typeface="Cascadia Code" panose="020B0609020000020004" pitchFamily="49" charset="0"/>
-                <a:cs typeface="Cascadia Code" panose="020B0609020000020004" pitchFamily="49" charset="0"/>
-              </a:rPr>
-              <a:t>there</a:t>
-            </a:r>
-            <a:r>
-              <a:rPr lang="fr-FR" sz="2400" dirty="0">
-                <a:solidFill>
-                  <a:schemeClr val="accent2">
-                    <a:lumMod val="50000"/>
-                  </a:schemeClr>
-                </a:solidFill>
-                <a:latin typeface="Cascadia Code" panose="020B0609020000020004" pitchFamily="49" charset="0"/>
-                <a:cs typeface="Cascadia Code" panose="020B0609020000020004" pitchFamily="49" charset="0"/>
-              </a:rPr>
-              <a:t>"</a:t>
-            </a:r>
-          </a:p>
-          <a:p>
-            <a:pPr marL="914400" lvl="2" indent="0">
-              <a:buNone/>
-            </a:pPr>
-            <a:r>
-              <a:rPr lang="fr-FR" sz="2400" dirty="0">
-                <a:solidFill>
-                  <a:schemeClr val="accent2">
-                    <a:lumMod val="50000"/>
-                  </a:schemeClr>
-                </a:solidFill>
-                <a:latin typeface="Cascadia Code" panose="020B0609020000020004" pitchFamily="49" charset="0"/>
-                <a:cs typeface="Cascadia Code" panose="020B0609020000020004" pitchFamily="49" charset="0"/>
-              </a:rPr>
-              <a:t>Start-</a:t>
-            </a:r>
-            <a:r>
-              <a:rPr lang="fr-FR" sz="2400" dirty="0" err="1">
-                <a:solidFill>
-                  <a:schemeClr val="accent2">
-                    <a:lumMod val="50000"/>
-                  </a:schemeClr>
-                </a:solidFill>
-                <a:latin typeface="Cascadia Code" panose="020B0609020000020004" pitchFamily="49" charset="0"/>
-                <a:cs typeface="Cascadia Code" panose="020B0609020000020004" pitchFamily="49" charset="0"/>
-              </a:rPr>
-              <a:t>ThreadJob</a:t>
-            </a:r>
-            <a:r>
-              <a:rPr lang="fr-FR" sz="2400" dirty="0">
-                <a:solidFill>
-                  <a:schemeClr val="accent2">
-                    <a:lumMod val="50000"/>
-                  </a:schemeClr>
-                </a:solidFill>
-                <a:latin typeface="Cascadia Code" panose="020B0609020000020004" pitchFamily="49" charset="0"/>
-                <a:cs typeface="Cascadia Code" panose="020B0609020000020004" pitchFamily="49" charset="0"/>
-              </a:rPr>
-              <a:t> {</a:t>
-            </a:r>
-          </a:p>
-          <a:p>
-            <a:pPr marL="914400" lvl="2" indent="0">
-              <a:buNone/>
-            </a:pPr>
-            <a:r>
-              <a:rPr lang="fr-FR" sz="2400" dirty="0">
-                <a:solidFill>
-                  <a:schemeClr val="accent2">
-                    <a:lumMod val="50000"/>
-                  </a:schemeClr>
-                </a:solidFill>
-                <a:latin typeface="Cascadia Code" panose="020B0609020000020004" pitchFamily="49" charset="0"/>
-                <a:cs typeface="Cascadia Code" panose="020B0609020000020004" pitchFamily="49" charset="0"/>
-              </a:rPr>
-              <a:t>	start-</a:t>
-            </a:r>
-            <a:r>
-              <a:rPr lang="fr-FR" sz="2400" dirty="0" err="1">
-                <a:solidFill>
-                  <a:schemeClr val="accent2">
-                    <a:lumMod val="50000"/>
-                  </a:schemeClr>
-                </a:solidFill>
-                <a:latin typeface="Cascadia Code" panose="020B0609020000020004" pitchFamily="49" charset="0"/>
-                <a:cs typeface="Cascadia Code" panose="020B0609020000020004" pitchFamily="49" charset="0"/>
-              </a:rPr>
-              <a:t>sleep</a:t>
-            </a:r>
-            <a:r>
-              <a:rPr lang="fr-FR" sz="2400" dirty="0">
-                <a:solidFill>
-                  <a:schemeClr val="accent2">
-                    <a:lumMod val="50000"/>
-                  </a:schemeClr>
-                </a:solidFill>
-                <a:latin typeface="Cascadia Code" panose="020B0609020000020004" pitchFamily="49" charset="0"/>
-                <a:cs typeface="Cascadia Code" panose="020B0609020000020004" pitchFamily="49" charset="0"/>
-              </a:rPr>
-              <a:t> 1;</a:t>
-            </a:r>
-          </a:p>
-          <a:p>
-            <a:pPr marL="914400" lvl="2" indent="0">
-              <a:buNone/>
-            </a:pPr>
-            <a:r>
-              <a:rPr lang="fr-FR" sz="2400" dirty="0">
-                <a:solidFill>
-                  <a:schemeClr val="accent2">
-                    <a:lumMod val="50000"/>
-                  </a:schemeClr>
-                </a:solidFill>
-                <a:latin typeface="Cascadia Code" panose="020B0609020000020004" pitchFamily="49" charset="0"/>
-                <a:cs typeface="Cascadia Code" panose="020B0609020000020004" pitchFamily="49" charset="0"/>
-              </a:rPr>
-              <a:t>	[console]::</a:t>
-            </a:r>
-            <a:r>
-              <a:rPr lang="fr-FR" dirty="0" err="1">
-                <a:solidFill>
-                  <a:schemeClr val="accent2">
-                    <a:lumMod val="50000"/>
-                  </a:schemeClr>
-                </a:solidFill>
-              </a:rPr>
-              <a:t>writeline</a:t>
-            </a:r>
-            <a:r>
-              <a:rPr lang="fr-FR" dirty="0">
-                <a:solidFill>
-                  <a:schemeClr val="accent2">
-                    <a:lumMod val="50000"/>
-                  </a:schemeClr>
-                </a:solidFill>
-              </a:rPr>
-              <a:t>("</a:t>
-            </a:r>
-            <a:r>
-              <a:rPr lang="fr-FR" dirty="0" err="1">
-                <a:solidFill>
-                  <a:schemeClr val="accent2">
-                    <a:lumMod val="50000"/>
-                  </a:schemeClr>
-                </a:solidFill>
-              </a:rPr>
-              <a:t>foo</a:t>
-            </a:r>
-            <a:r>
-              <a:rPr lang="fr-FR" dirty="0">
-                <a:solidFill>
-                  <a:schemeClr val="accent2">
-                    <a:lumMod val="50000"/>
-                  </a:schemeClr>
-                </a:solidFill>
-              </a:rPr>
-              <a:t>: $</a:t>
-            </a:r>
-            <a:r>
-              <a:rPr lang="fr-FR" dirty="0" err="1">
-                <a:solidFill>
-                  <a:schemeClr val="accent2">
-                    <a:lumMod val="50000"/>
-                  </a:schemeClr>
-                </a:solidFill>
-              </a:rPr>
-              <a:t>foo</a:t>
-            </a:r>
-            <a:r>
-              <a:rPr lang="fr-FR" dirty="0">
-                <a:solidFill>
-                  <a:schemeClr val="accent2">
-                    <a:lumMod val="50000"/>
-                  </a:schemeClr>
-                </a:solidFill>
-              </a:rPr>
-              <a:t>")</a:t>
-            </a:r>
-          </a:p>
-          <a:p>
-            <a:pPr marL="914400" lvl="2" indent="0">
-              <a:buNone/>
-            </a:pPr>
-            <a:r>
-              <a:rPr lang="fr-FR" dirty="0">
-                <a:solidFill>
-                  <a:schemeClr val="accent2">
-                    <a:lumMod val="50000"/>
-                  </a:schemeClr>
-                </a:solidFill>
-              </a:rPr>
-              <a:t>}.</a:t>
-            </a:r>
-            <a:r>
-              <a:rPr lang="fr-FR" dirty="0" err="1">
-                <a:solidFill>
-                  <a:schemeClr val="accent2">
-                    <a:lumMod val="50000"/>
-                  </a:schemeClr>
-                </a:solidFill>
-              </a:rPr>
-              <a:t>GetNewClosure</a:t>
-            </a:r>
-            <a:r>
-              <a:rPr lang="fr-FR" dirty="0">
-                <a:solidFill>
-                  <a:schemeClr val="accent2">
-                    <a:lumMod val="50000"/>
-                  </a:schemeClr>
-                </a:solidFill>
-              </a:rPr>
-              <a:t>()</a:t>
-            </a:r>
-          </a:p>
-          <a:p>
-            <a:pPr lvl="1"/>
-            <a:r>
-              <a:rPr lang="fr-FR" i="1" dirty="0"/>
-              <a:t>But </a:t>
-            </a:r>
-            <a:r>
-              <a:rPr lang="fr-FR" i="1" dirty="0" err="1"/>
-              <a:t>unfortunately</a:t>
-            </a:r>
-            <a:r>
-              <a:rPr lang="fr-FR" i="1" dirty="0"/>
-              <a:t> </a:t>
-            </a:r>
-            <a:r>
-              <a:rPr lang="fr-FR" i="1" dirty="0" err="1"/>
-              <a:t>this</a:t>
-            </a:r>
-            <a:r>
-              <a:rPr lang="fr-FR" i="1" dirty="0"/>
-              <a:t> </a:t>
-            </a:r>
-            <a:r>
-              <a:rPr lang="fr-FR" i="1" dirty="0" err="1"/>
-              <a:t>doesn’t</a:t>
-            </a:r>
-            <a:r>
-              <a:rPr lang="fr-FR" i="1" dirty="0"/>
-              <a:t> </a:t>
-            </a:r>
-            <a:r>
-              <a:rPr lang="fr-FR" i="1" dirty="0" err="1"/>
-              <a:t>work</a:t>
-            </a:r>
-            <a:r>
-              <a:rPr lang="fr-FR" i="1" dirty="0"/>
-              <a:t>…</a:t>
+            <a:r>
+              <a:rPr lang="en-GB"/>
+              <a:t>We love Demos!</a:t>
             </a:r>
           </a:p>
         </p:txBody>
       </p:sp>
+      <p:pic>
+        <p:nvPicPr>
+          <p:cNvPr id="9" name="Picture 9">
+            <a:extLst>
+              <a:ext uri="{FF2B5EF4-FFF2-40B4-BE49-F238E27FC236}">
+                <a16:creationId xmlns:a16="http://schemas.microsoft.com/office/drawing/2014/main" id="{776AC288-703A-8014-23CA-E040CDD7E976}"/>
+              </a:ext>
+            </a:extLst>
+          </p:cNvPr>
+          <p:cNvPicPr>
+            <a:picLocks noChangeAspect="1"/>
+          </p:cNvPicPr>
+          <p:nvPr/>
+        </p:nvPicPr>
+        <p:blipFill>
+          <a:blip r:embed="rId2"/>
+          <a:stretch>
+            <a:fillRect/>
+          </a:stretch>
+        </p:blipFill>
+        <p:spPr>
+          <a:xfrm>
+            <a:off x="3404191" y="615392"/>
+            <a:ext cx="6127897" cy="5060147"/>
+          </a:xfrm>
+          <a:prstGeom prst="rect">
+            <a:avLst/>
+          </a:prstGeom>
+          <a:ln>
+            <a:noFill/>
+          </a:ln>
+          <a:effectLst>
+            <a:outerShdw blurRad="292100" dist="139700" dir="2700000" algn="tl" rotWithShape="0">
+              <a:srgbClr val="333333">
+                <a:alpha val="65000"/>
+              </a:srgbClr>
+            </a:outerShdw>
+          </a:effectLst>
+        </p:spPr>
+      </p:pic>
     </p:spTree>
     <p:extLst>
       <p:ext uri="{BB962C8B-B14F-4D97-AF65-F5344CB8AC3E}">
-        <p14:creationId xmlns:p14="http://schemas.microsoft.com/office/powerpoint/2010/main" val="207227458"/>
+        <p14:creationId xmlns:p14="http://schemas.microsoft.com/office/powerpoint/2010/main" val="2579524958"/>
       </p:ext>
     </p:extLst>
   </p:cSld>
@@ -8467,281 +8096,609 @@
       </p:grpSpPr>
       <p:sp>
         <p:nvSpPr>
-          <p:cNvPr id="9" name="Title 3">
+          <p:cNvPr id="2" name="Titre 1">
             <a:extLst>
               <a:ext uri="{FF2B5EF4-FFF2-40B4-BE49-F238E27FC236}">
-                <a16:creationId xmlns:a16="http://schemas.microsoft.com/office/drawing/2014/main" id="{063F7B61-5334-421F-9456-A905D333F4B3}"/>
+                <a16:creationId xmlns:a16="http://schemas.microsoft.com/office/drawing/2014/main" id="{5191E0F2-FE77-51ED-3F72-223B58926E74}"/>
               </a:ext>
             </a:extLst>
           </p:cNvPr>
-          <p:cNvSpPr txBox="1">
-            <a:spLocks/>
+          <p:cNvSpPr>
+            <a:spLocks noGrp="1"/>
           </p:cNvSpPr>
-          <p:nvPr/>
+          <p:nvPr>
+            <p:ph type="title"/>
+          </p:nvPr>
+        </p:nvSpPr>
+        <p:spPr/>
+        <p:txBody>
+          <a:bodyPr/>
+          <a:lstStyle/>
+          <a:p>
+            <a:r>
+              <a:rPr lang="fr-FR" dirty="0" err="1"/>
+              <a:t>What</a:t>
+            </a:r>
+            <a:r>
+              <a:rPr lang="fr-FR" dirty="0"/>
+              <a:t> are </a:t>
+            </a:r>
+            <a:r>
+              <a:rPr lang="fr-FR" dirty="0" err="1"/>
+              <a:t>closures</a:t>
+            </a:r>
+            <a:r>
+              <a:rPr lang="fr-FR" dirty="0"/>
+              <a:t> good for?</a:t>
+            </a:r>
+            <a:endParaRPr lang="en-GB" dirty="0"/>
+          </a:p>
+        </p:txBody>
+      </p:sp>
+      <p:sp>
+        <p:nvSpPr>
+          <p:cNvPr id="3" name="Espace réservé du contenu 2">
+            <a:extLst>
+              <a:ext uri="{FF2B5EF4-FFF2-40B4-BE49-F238E27FC236}">
+                <a16:creationId xmlns:a16="http://schemas.microsoft.com/office/drawing/2014/main" id="{07D5023A-BA6F-B725-CF78-FD889E577EA6}"/>
+              </a:ext>
+            </a:extLst>
+          </p:cNvPr>
+          <p:cNvSpPr>
+            <a:spLocks noGrp="1"/>
+          </p:cNvSpPr>
+          <p:nvPr>
+            <p:ph idx="1"/>
+          </p:nvPr>
+        </p:nvSpPr>
+        <p:spPr/>
+        <p:txBody>
+          <a:bodyPr>
+            <a:normAutofit fontScale="92500" lnSpcReduction="20000"/>
+          </a:bodyPr>
+          <a:lstStyle/>
+          <a:p>
+            <a:pPr>
+              <a:buFont typeface="Wingdings" panose="05000000000000000000" pitchFamily="2" charset="2"/>
+              <a:buChar char="§"/>
+            </a:pPr>
+            <a:r>
+              <a:rPr lang="fr-FR" dirty="0" err="1"/>
+              <a:t>Stateful</a:t>
+            </a:r>
+            <a:r>
+              <a:rPr lang="fr-FR" dirty="0"/>
+              <a:t> </a:t>
+            </a:r>
+            <a:r>
+              <a:rPr lang="fr-FR" dirty="0" err="1"/>
+              <a:t>functions</a:t>
+            </a:r>
+            <a:endParaRPr lang="fr-FR" dirty="0"/>
+          </a:p>
+          <a:p>
+            <a:pPr lvl="1"/>
+            <a:r>
+              <a:rPr lang="fr-FR" dirty="0" err="1"/>
+              <a:t>Encapsulate</a:t>
+            </a:r>
+            <a:r>
+              <a:rPr lang="fr-FR" dirty="0"/>
+              <a:t> </a:t>
+            </a:r>
+            <a:r>
+              <a:rPr lang="fr-FR" dirty="0" err="1"/>
+              <a:t>private</a:t>
+            </a:r>
+            <a:r>
+              <a:rPr lang="fr-FR" dirty="0"/>
+              <a:t> state in a </a:t>
+            </a:r>
+            <a:r>
+              <a:rPr lang="fr-FR" dirty="0" err="1"/>
+              <a:t>function</a:t>
+            </a:r>
+            <a:r>
+              <a:rPr lang="fr-FR" dirty="0"/>
+              <a:t>: </a:t>
+            </a:r>
+            <a:r>
+              <a:rPr lang="fr-FR" dirty="0" err="1"/>
+              <a:t>function</a:t>
+            </a:r>
+            <a:r>
+              <a:rPr lang="fr-FR" dirty="0"/>
+              <a:t> </a:t>
+            </a:r>
+            <a:r>
+              <a:rPr lang="fr-FR" dirty="0" err="1"/>
+              <a:t>generators</a:t>
+            </a:r>
+            <a:endParaRPr lang="fr-FR" dirty="0"/>
+          </a:p>
+          <a:p>
+            <a:pPr lvl="1">
+              <a:buFont typeface="Wingdings" panose="05000000000000000000" pitchFamily="2" charset="2"/>
+              <a:buChar char="§"/>
+            </a:pPr>
+            <a:r>
+              <a:rPr lang="fr-FR"/>
+              <a:t>New-Counter </a:t>
+            </a:r>
+            <a:r>
+              <a:rPr lang="fr-FR" dirty="0" err="1"/>
+              <a:t>example</a:t>
+            </a:r>
+            <a:r>
+              <a:rPr lang="fr-FR" dirty="0"/>
+              <a:t>.</a:t>
+            </a:r>
+          </a:p>
+          <a:p>
+            <a:r>
+              <a:rPr lang="fr-FR" dirty="0" err="1"/>
+              <a:t>Simplified</a:t>
+            </a:r>
+            <a:r>
+              <a:rPr lang="fr-FR" dirty="0"/>
+              <a:t> </a:t>
+            </a:r>
+            <a:r>
+              <a:rPr lang="fr-FR" dirty="0" err="1"/>
+              <a:t>concurrency</a:t>
+            </a:r>
+            <a:endParaRPr lang="fr-FR" dirty="0"/>
+          </a:p>
+          <a:p>
+            <a:pPr lvl="1"/>
+            <a:r>
+              <a:rPr lang="fr-FR" dirty="0" err="1"/>
+              <a:t>Instead</a:t>
+            </a:r>
+            <a:r>
+              <a:rPr lang="fr-FR" dirty="0"/>
+              <a:t> of </a:t>
+            </a:r>
+            <a:r>
+              <a:rPr lang="fr-FR" sz="2400" dirty="0">
+                <a:latin typeface="Cascadia Code" panose="020B0609020000020004" pitchFamily="49" charset="0"/>
+                <a:cs typeface="Cascadia Code" panose="020B0609020000020004" pitchFamily="49" charset="0"/>
+              </a:rPr>
+              <a:t>$</a:t>
+            </a:r>
+            <a:r>
+              <a:rPr lang="fr-FR" sz="2400" dirty="0" err="1">
+                <a:latin typeface="Cascadia Code" panose="020B0609020000020004" pitchFamily="49" charset="0"/>
+                <a:cs typeface="Cascadia Code" panose="020B0609020000020004" pitchFamily="49" charset="0"/>
+              </a:rPr>
+              <a:t>using:foo</a:t>
+            </a:r>
+            <a:r>
+              <a:rPr lang="fr-FR" sz="2400" dirty="0">
+                <a:latin typeface="Cascadia Code" panose="020B0609020000020004" pitchFamily="49" charset="0"/>
+                <a:cs typeface="Cascadia Code" panose="020B0609020000020004" pitchFamily="49" charset="0"/>
+              </a:rPr>
+              <a:t> </a:t>
+            </a:r>
+            <a:r>
+              <a:rPr lang="fr-FR" dirty="0" err="1"/>
+              <a:t>just</a:t>
+            </a:r>
+            <a:r>
+              <a:rPr lang="fr-FR" dirty="0"/>
+              <a:t> use a </a:t>
+            </a:r>
+            <a:r>
+              <a:rPr lang="fr-FR" dirty="0" err="1"/>
+              <a:t>closure</a:t>
+            </a:r>
+            <a:r>
+              <a:rPr lang="fr-FR" dirty="0"/>
+              <a:t>:</a:t>
+            </a:r>
+          </a:p>
+          <a:p>
+            <a:pPr marL="914400" lvl="2" indent="0">
+              <a:buNone/>
+            </a:pPr>
+            <a:r>
+              <a:rPr lang="fr-FR" sz="2400" dirty="0">
+                <a:solidFill>
+                  <a:schemeClr val="accent2">
+                    <a:lumMod val="50000"/>
+                  </a:schemeClr>
+                </a:solidFill>
+                <a:latin typeface="Cascadia Code" panose="020B0609020000020004" pitchFamily="49" charset="0"/>
+                <a:cs typeface="Cascadia Code" panose="020B0609020000020004" pitchFamily="49" charset="0"/>
+              </a:rPr>
+              <a:t>$</a:t>
+            </a:r>
+            <a:r>
+              <a:rPr lang="fr-FR" sz="2400" dirty="0" err="1">
+                <a:solidFill>
+                  <a:schemeClr val="accent2">
+                    <a:lumMod val="50000"/>
+                  </a:schemeClr>
+                </a:solidFill>
+                <a:latin typeface="Cascadia Code" panose="020B0609020000020004" pitchFamily="49" charset="0"/>
+                <a:cs typeface="Cascadia Code" panose="020B0609020000020004" pitchFamily="49" charset="0"/>
+              </a:rPr>
+              <a:t>foo</a:t>
+            </a:r>
+            <a:r>
+              <a:rPr lang="fr-FR" sz="2400" dirty="0">
+                <a:solidFill>
+                  <a:schemeClr val="accent2">
+                    <a:lumMod val="50000"/>
+                  </a:schemeClr>
+                </a:solidFill>
+                <a:latin typeface="Cascadia Code" panose="020B0609020000020004" pitchFamily="49" charset="0"/>
+                <a:cs typeface="Cascadia Code" panose="020B0609020000020004" pitchFamily="49" charset="0"/>
+              </a:rPr>
+              <a:t> = "Hi </a:t>
+            </a:r>
+            <a:r>
+              <a:rPr lang="fr-FR" sz="2400" dirty="0" err="1">
+                <a:solidFill>
+                  <a:schemeClr val="accent2">
+                    <a:lumMod val="50000"/>
+                  </a:schemeClr>
+                </a:solidFill>
+                <a:latin typeface="Cascadia Code" panose="020B0609020000020004" pitchFamily="49" charset="0"/>
+                <a:cs typeface="Cascadia Code" panose="020B0609020000020004" pitchFamily="49" charset="0"/>
+              </a:rPr>
+              <a:t>there</a:t>
+            </a:r>
+            <a:r>
+              <a:rPr lang="fr-FR" sz="2400" dirty="0">
+                <a:solidFill>
+                  <a:schemeClr val="accent2">
+                    <a:lumMod val="50000"/>
+                  </a:schemeClr>
+                </a:solidFill>
+                <a:latin typeface="Cascadia Code" panose="020B0609020000020004" pitchFamily="49" charset="0"/>
+                <a:cs typeface="Cascadia Code" panose="020B0609020000020004" pitchFamily="49" charset="0"/>
+              </a:rPr>
+              <a:t>"</a:t>
+            </a:r>
+          </a:p>
+          <a:p>
+            <a:pPr marL="914400" lvl="2" indent="0">
+              <a:buNone/>
+            </a:pPr>
+            <a:r>
+              <a:rPr lang="fr-FR" sz="2400" dirty="0">
+                <a:solidFill>
+                  <a:schemeClr val="accent2">
+                    <a:lumMod val="50000"/>
+                  </a:schemeClr>
+                </a:solidFill>
+                <a:latin typeface="Cascadia Code" panose="020B0609020000020004" pitchFamily="49" charset="0"/>
+                <a:cs typeface="Cascadia Code" panose="020B0609020000020004" pitchFamily="49" charset="0"/>
+              </a:rPr>
+              <a:t>Start-</a:t>
+            </a:r>
+            <a:r>
+              <a:rPr lang="fr-FR" sz="2400" dirty="0" err="1">
+                <a:solidFill>
+                  <a:schemeClr val="accent2">
+                    <a:lumMod val="50000"/>
+                  </a:schemeClr>
+                </a:solidFill>
+                <a:latin typeface="Cascadia Code" panose="020B0609020000020004" pitchFamily="49" charset="0"/>
+                <a:cs typeface="Cascadia Code" panose="020B0609020000020004" pitchFamily="49" charset="0"/>
+              </a:rPr>
+              <a:t>ThreadJob</a:t>
+            </a:r>
+            <a:r>
+              <a:rPr lang="fr-FR" sz="2400" dirty="0">
+                <a:solidFill>
+                  <a:schemeClr val="accent2">
+                    <a:lumMod val="50000"/>
+                  </a:schemeClr>
+                </a:solidFill>
+                <a:latin typeface="Cascadia Code" panose="020B0609020000020004" pitchFamily="49" charset="0"/>
+                <a:cs typeface="Cascadia Code" panose="020B0609020000020004" pitchFamily="49" charset="0"/>
+              </a:rPr>
+              <a:t> {</a:t>
+            </a:r>
+          </a:p>
+          <a:p>
+            <a:pPr marL="914400" lvl="2" indent="0">
+              <a:buNone/>
+            </a:pPr>
+            <a:r>
+              <a:rPr lang="fr-FR" sz="2400" dirty="0">
+                <a:solidFill>
+                  <a:schemeClr val="accent2">
+                    <a:lumMod val="50000"/>
+                  </a:schemeClr>
+                </a:solidFill>
+                <a:latin typeface="Cascadia Code" panose="020B0609020000020004" pitchFamily="49" charset="0"/>
+                <a:cs typeface="Cascadia Code" panose="020B0609020000020004" pitchFamily="49" charset="0"/>
+              </a:rPr>
+              <a:t>	start-</a:t>
+            </a:r>
+            <a:r>
+              <a:rPr lang="fr-FR" sz="2400" dirty="0" err="1">
+                <a:solidFill>
+                  <a:schemeClr val="accent2">
+                    <a:lumMod val="50000"/>
+                  </a:schemeClr>
+                </a:solidFill>
+                <a:latin typeface="Cascadia Code" panose="020B0609020000020004" pitchFamily="49" charset="0"/>
+                <a:cs typeface="Cascadia Code" panose="020B0609020000020004" pitchFamily="49" charset="0"/>
+              </a:rPr>
+              <a:t>sleep</a:t>
+            </a:r>
+            <a:r>
+              <a:rPr lang="fr-FR" sz="2400" dirty="0">
+                <a:solidFill>
+                  <a:schemeClr val="accent2">
+                    <a:lumMod val="50000"/>
+                  </a:schemeClr>
+                </a:solidFill>
+                <a:latin typeface="Cascadia Code" panose="020B0609020000020004" pitchFamily="49" charset="0"/>
+                <a:cs typeface="Cascadia Code" panose="020B0609020000020004" pitchFamily="49" charset="0"/>
+              </a:rPr>
+              <a:t> 1;</a:t>
+            </a:r>
+          </a:p>
+          <a:p>
+            <a:pPr marL="914400" lvl="2" indent="0">
+              <a:buNone/>
+            </a:pPr>
+            <a:r>
+              <a:rPr lang="fr-FR" sz="2400" dirty="0">
+                <a:solidFill>
+                  <a:schemeClr val="accent2">
+                    <a:lumMod val="50000"/>
+                  </a:schemeClr>
+                </a:solidFill>
+                <a:latin typeface="Cascadia Code" panose="020B0609020000020004" pitchFamily="49" charset="0"/>
+                <a:cs typeface="Cascadia Code" panose="020B0609020000020004" pitchFamily="49" charset="0"/>
+              </a:rPr>
+              <a:t>	[console]::</a:t>
+            </a:r>
+            <a:r>
+              <a:rPr lang="fr-FR" dirty="0" err="1">
+                <a:solidFill>
+                  <a:schemeClr val="accent2">
+                    <a:lumMod val="50000"/>
+                  </a:schemeClr>
+                </a:solidFill>
+              </a:rPr>
+              <a:t>writeline</a:t>
+            </a:r>
+            <a:r>
+              <a:rPr lang="fr-FR" dirty="0">
+                <a:solidFill>
+                  <a:schemeClr val="accent2">
+                    <a:lumMod val="50000"/>
+                  </a:schemeClr>
+                </a:solidFill>
+              </a:rPr>
+              <a:t>("</a:t>
+            </a:r>
+            <a:r>
+              <a:rPr lang="fr-FR" dirty="0" err="1">
+                <a:solidFill>
+                  <a:schemeClr val="accent2">
+                    <a:lumMod val="50000"/>
+                  </a:schemeClr>
+                </a:solidFill>
+              </a:rPr>
+              <a:t>foo</a:t>
+            </a:r>
+            <a:r>
+              <a:rPr lang="fr-FR" dirty="0">
+                <a:solidFill>
+                  <a:schemeClr val="accent2">
+                    <a:lumMod val="50000"/>
+                  </a:schemeClr>
+                </a:solidFill>
+              </a:rPr>
+              <a:t>: $</a:t>
+            </a:r>
+            <a:r>
+              <a:rPr lang="fr-FR" dirty="0" err="1">
+                <a:solidFill>
+                  <a:schemeClr val="accent2">
+                    <a:lumMod val="50000"/>
+                  </a:schemeClr>
+                </a:solidFill>
+              </a:rPr>
+              <a:t>foo</a:t>
+            </a:r>
+            <a:r>
+              <a:rPr lang="fr-FR" dirty="0">
+                <a:solidFill>
+                  <a:schemeClr val="accent2">
+                    <a:lumMod val="50000"/>
+                  </a:schemeClr>
+                </a:solidFill>
+              </a:rPr>
+              <a:t>")</a:t>
+            </a:r>
+          </a:p>
+          <a:p>
+            <a:pPr marL="914400" lvl="2" indent="0">
+              <a:buNone/>
+            </a:pPr>
+            <a:r>
+              <a:rPr lang="fr-FR" dirty="0">
+                <a:solidFill>
+                  <a:schemeClr val="accent2">
+                    <a:lumMod val="50000"/>
+                  </a:schemeClr>
+                </a:solidFill>
+              </a:rPr>
+              <a:t>}.</a:t>
+            </a:r>
+            <a:r>
+              <a:rPr lang="fr-FR" dirty="0" err="1">
+                <a:solidFill>
+                  <a:schemeClr val="accent2">
+                    <a:lumMod val="50000"/>
+                  </a:schemeClr>
+                </a:solidFill>
+              </a:rPr>
+              <a:t>GetNewClosure</a:t>
+            </a:r>
+            <a:r>
+              <a:rPr lang="fr-FR" dirty="0">
+                <a:solidFill>
+                  <a:schemeClr val="accent2">
+                    <a:lumMod val="50000"/>
+                  </a:schemeClr>
+                </a:solidFill>
+              </a:rPr>
+              <a:t>()</a:t>
+            </a:r>
+          </a:p>
+          <a:p>
+            <a:pPr lvl="1"/>
+            <a:r>
+              <a:rPr lang="fr-FR" i="1" dirty="0"/>
+              <a:t>But </a:t>
+            </a:r>
+            <a:r>
+              <a:rPr lang="fr-FR" i="1" dirty="0" err="1"/>
+              <a:t>unfortunately</a:t>
+            </a:r>
+            <a:r>
+              <a:rPr lang="fr-FR" i="1" dirty="0"/>
+              <a:t> </a:t>
+            </a:r>
+            <a:r>
+              <a:rPr lang="fr-FR" i="1" dirty="0" err="1"/>
+              <a:t>this</a:t>
+            </a:r>
+            <a:r>
+              <a:rPr lang="fr-FR" i="1" dirty="0"/>
+              <a:t> </a:t>
+            </a:r>
+            <a:r>
+              <a:rPr lang="fr-FR" i="1" dirty="0" err="1"/>
+              <a:t>doesn’t</a:t>
+            </a:r>
+            <a:r>
+              <a:rPr lang="fr-FR" i="1" dirty="0"/>
+              <a:t> </a:t>
+            </a:r>
+            <a:r>
+              <a:rPr lang="fr-FR" i="1" dirty="0" err="1"/>
+              <a:t>work</a:t>
+            </a:r>
+            <a:r>
+              <a:rPr lang="fr-FR" i="1" dirty="0"/>
+              <a:t>…</a:t>
+            </a:r>
+          </a:p>
+        </p:txBody>
+      </p:sp>
+    </p:spTree>
+    <p:extLst>
+      <p:ext uri="{BB962C8B-B14F-4D97-AF65-F5344CB8AC3E}">
+        <p14:creationId xmlns:p14="http://schemas.microsoft.com/office/powerpoint/2010/main" val="207227458"/>
+      </p:ext>
+    </p:extLst>
+  </p:cSld>
+  <p:clrMapOvr>
+    <a:masterClrMapping/>
+  </p:clrMapOvr>
+</p:sld>
+</file>
+
+<file path=ppt/slides/slide19.xml><?xml version="1.0" encoding="utf-8"?>
+<p:sld xmlns:a="http://schemas.openxmlformats.org/drawingml/2006/main" xmlns:r="http://schemas.openxmlformats.org/officeDocument/2006/relationships" xmlns:p="http://schemas.openxmlformats.org/presentationml/2006/main">
+  <p:cSld>
+    <p:spTree>
+      <p:nvGrpSpPr>
+        <p:cNvPr id="1" name=""/>
+        <p:cNvGrpSpPr/>
+        <p:nvPr/>
+      </p:nvGrpSpPr>
+      <p:grpSpPr>
+        <a:xfrm>
+          <a:off x="0" y="0"/>
+          <a:ext cx="0" cy="0"/>
+          <a:chOff x="0" y="0"/>
+          <a:chExt cx="0" cy="0"/>
+        </a:xfrm>
+      </p:grpSpPr>
+      <p:sp>
+        <p:nvSpPr>
+          <p:cNvPr id="4" name="Title 3">
+            <a:extLst>
+              <a:ext uri="{FF2B5EF4-FFF2-40B4-BE49-F238E27FC236}">
+                <a16:creationId xmlns:a16="http://schemas.microsoft.com/office/drawing/2014/main" id="{2B167248-C99C-E892-89E1-4CBB81F02F90}"/>
+              </a:ext>
+            </a:extLst>
+          </p:cNvPr>
+          <p:cNvSpPr>
+            <a:spLocks noGrp="1"/>
+          </p:cNvSpPr>
+          <p:nvPr>
+            <p:ph type="title"/>
+          </p:nvPr>
         </p:nvSpPr>
         <p:spPr>
           <a:xfrm>
             <a:off x="831850" y="529389"/>
             <a:ext cx="10515600" cy="1004637"/>
           </a:xfrm>
-          <a:prstGeom prst="rect">
-            <a:avLst/>
-          </a:prstGeom>
         </p:spPr>
         <p:txBody>
-          <a:bodyPr vert="horz" lIns="91440" tIns="45720" rIns="91440" bIns="45720" rtlCol="0" anchor="b">
-            <a:normAutofit/>
-          </a:bodyPr>
-          <a:lstStyle>
-            <a:lvl1pPr algn="l" defTabSz="914400" rtl="0" eaLnBrk="1" latinLnBrk="0" hangingPunct="1">
-              <a:lnSpc>
-                <a:spcPct val="90000"/>
-              </a:lnSpc>
-              <a:spcBef>
-                <a:spcPct val="0"/>
-              </a:spcBef>
-              <a:buNone/>
-              <a:defRPr sz="6000" b="1" kern="1200">
-                <a:solidFill>
-                  <a:srgbClr val="3B2B46"/>
-                </a:solidFill>
-                <a:latin typeface="+mj-lt"/>
-                <a:ea typeface="+mj-ea"/>
-                <a:cs typeface="+mj-cs"/>
-              </a:defRPr>
-            </a:lvl1pPr>
-          </a:lstStyle>
+          <a:bodyPr/>
+          <a:lstStyle/>
           <a:p>
             <a:r>
               <a:rPr lang="en-GB"/>
-              <a:t>Q&amp;A</a:t>
+              <a:t>Demos</a:t>
             </a:r>
           </a:p>
         </p:txBody>
       </p:sp>
       <p:sp>
         <p:nvSpPr>
-          <p:cNvPr id="10" name="Text Placeholder 4">
+          <p:cNvPr id="5" name="Text Placeholder 4">
             <a:extLst>
               <a:ext uri="{FF2B5EF4-FFF2-40B4-BE49-F238E27FC236}">
-                <a16:creationId xmlns:a16="http://schemas.microsoft.com/office/drawing/2014/main" id="{E7911686-C4FE-022C-2490-99F4F5BFDF39}"/>
+                <a16:creationId xmlns:a16="http://schemas.microsoft.com/office/drawing/2014/main" id="{2CACAFC7-78CB-98F9-FEF3-D3E8C9FF6E6F}"/>
               </a:ext>
             </a:extLst>
           </p:cNvPr>
-          <p:cNvSpPr txBox="1">
-            <a:spLocks/>
+          <p:cNvSpPr>
+            <a:spLocks noGrp="1"/>
           </p:cNvSpPr>
-          <p:nvPr/>
+          <p:nvPr>
+            <p:ph type="body" idx="1"/>
+          </p:nvPr>
         </p:nvSpPr>
         <p:spPr>
           <a:xfrm>
             <a:off x="831850" y="1653758"/>
             <a:ext cx="10515600" cy="1500187"/>
           </a:xfrm>
-          <a:prstGeom prst="rect">
-            <a:avLst/>
-          </a:prstGeom>
         </p:spPr>
         <p:txBody>
-          <a:bodyPr vert="horz" lIns="91440" tIns="45720" rIns="91440" bIns="45720" rtlCol="0">
-            <a:normAutofit/>
-          </a:bodyPr>
-          <a:lstStyle>
-            <a:lvl1pPr marL="0" indent="0" algn="l" defTabSz="914400" rtl="0" eaLnBrk="1" latinLnBrk="0" hangingPunct="1">
-              <a:lnSpc>
-                <a:spcPct val="90000"/>
-              </a:lnSpc>
-              <a:spcBef>
-                <a:spcPts val="1000"/>
-              </a:spcBef>
-              <a:buFont typeface="Arial" panose="020B0604020202020204" pitchFamily="34" charset="0"/>
-              <a:buNone/>
-              <a:defRPr sz="2400" kern="1200">
-                <a:solidFill>
-                  <a:schemeClr val="tx1">
-                    <a:tint val="75000"/>
-                  </a:schemeClr>
-                </a:solidFill>
-                <a:latin typeface="+mn-lt"/>
-                <a:ea typeface="+mn-ea"/>
-                <a:cs typeface="+mn-cs"/>
-              </a:defRPr>
-            </a:lvl1pPr>
-            <a:lvl2pPr marL="457200" indent="0" algn="l" defTabSz="914400" rtl="0" eaLnBrk="1" latinLnBrk="0" hangingPunct="1">
-              <a:lnSpc>
-                <a:spcPct val="90000"/>
-              </a:lnSpc>
-              <a:spcBef>
-                <a:spcPts val="500"/>
-              </a:spcBef>
-              <a:buFont typeface="Arial" panose="020B0604020202020204" pitchFamily="34" charset="0"/>
-              <a:buNone/>
-              <a:defRPr sz="2000" kern="1200">
-                <a:solidFill>
-                  <a:schemeClr val="tx1">
-                    <a:tint val="75000"/>
-                  </a:schemeClr>
-                </a:solidFill>
-                <a:latin typeface="+mn-lt"/>
-                <a:ea typeface="+mn-ea"/>
-                <a:cs typeface="+mn-cs"/>
-              </a:defRPr>
-            </a:lvl2pPr>
-            <a:lvl3pPr marL="914400" indent="0" algn="l" defTabSz="914400" rtl="0" eaLnBrk="1" latinLnBrk="0" hangingPunct="1">
-              <a:lnSpc>
-                <a:spcPct val="90000"/>
-              </a:lnSpc>
-              <a:spcBef>
-                <a:spcPts val="500"/>
-              </a:spcBef>
-              <a:buFont typeface="Arial" panose="020B0604020202020204" pitchFamily="34" charset="0"/>
-              <a:buNone/>
-              <a:defRPr sz="1800" kern="1200">
-                <a:solidFill>
-                  <a:schemeClr val="tx1">
-                    <a:tint val="75000"/>
-                  </a:schemeClr>
-                </a:solidFill>
-                <a:latin typeface="+mn-lt"/>
-                <a:ea typeface="+mn-ea"/>
-                <a:cs typeface="+mn-cs"/>
-              </a:defRPr>
-            </a:lvl3pPr>
-            <a:lvl4pPr marL="1371600" indent="0" algn="l" defTabSz="914400" rtl="0" eaLnBrk="1" latinLnBrk="0" hangingPunct="1">
-              <a:lnSpc>
-                <a:spcPct val="90000"/>
-              </a:lnSpc>
-              <a:spcBef>
-                <a:spcPts val="500"/>
-              </a:spcBef>
-              <a:buFont typeface="Arial" panose="020B0604020202020204" pitchFamily="34" charset="0"/>
-              <a:buNone/>
-              <a:defRPr sz="1600" kern="1200">
-                <a:solidFill>
-                  <a:schemeClr val="tx1">
-                    <a:tint val="75000"/>
-                  </a:schemeClr>
-                </a:solidFill>
-                <a:latin typeface="+mn-lt"/>
-                <a:ea typeface="+mn-ea"/>
-                <a:cs typeface="+mn-cs"/>
-              </a:defRPr>
-            </a:lvl4pPr>
-            <a:lvl5pPr marL="1828800" indent="0" algn="l" defTabSz="914400" rtl="0" eaLnBrk="1" latinLnBrk="0" hangingPunct="1">
-              <a:lnSpc>
-                <a:spcPct val="90000"/>
-              </a:lnSpc>
-              <a:spcBef>
-                <a:spcPts val="500"/>
-              </a:spcBef>
-              <a:buFont typeface="Arial" panose="020B0604020202020204" pitchFamily="34" charset="0"/>
-              <a:buNone/>
-              <a:defRPr sz="1600" kern="1200">
-                <a:solidFill>
-                  <a:schemeClr val="tx1">
-                    <a:tint val="75000"/>
-                  </a:schemeClr>
-                </a:solidFill>
-                <a:latin typeface="+mn-lt"/>
-                <a:ea typeface="+mn-ea"/>
-                <a:cs typeface="+mn-cs"/>
-              </a:defRPr>
-            </a:lvl5pPr>
-            <a:lvl6pPr marL="2286000" indent="0" algn="l" defTabSz="914400" rtl="0" eaLnBrk="1" latinLnBrk="0" hangingPunct="1">
-              <a:lnSpc>
-                <a:spcPct val="90000"/>
-              </a:lnSpc>
-              <a:spcBef>
-                <a:spcPts val="500"/>
-              </a:spcBef>
-              <a:buFont typeface="Arial" panose="020B0604020202020204" pitchFamily="34" charset="0"/>
-              <a:buNone/>
-              <a:defRPr sz="1600" kern="1200">
-                <a:solidFill>
-                  <a:schemeClr val="tx1">
-                    <a:tint val="75000"/>
-                  </a:schemeClr>
-                </a:solidFill>
-                <a:latin typeface="+mn-lt"/>
-                <a:ea typeface="+mn-ea"/>
-                <a:cs typeface="+mn-cs"/>
-              </a:defRPr>
-            </a:lvl6pPr>
-            <a:lvl7pPr marL="2743200" indent="0" algn="l" defTabSz="914400" rtl="0" eaLnBrk="1" latinLnBrk="0" hangingPunct="1">
-              <a:lnSpc>
-                <a:spcPct val="90000"/>
-              </a:lnSpc>
-              <a:spcBef>
-                <a:spcPts val="500"/>
-              </a:spcBef>
-              <a:buFont typeface="Arial" panose="020B0604020202020204" pitchFamily="34" charset="0"/>
-              <a:buNone/>
-              <a:defRPr sz="1600" kern="1200">
-                <a:solidFill>
-                  <a:schemeClr val="tx1">
-                    <a:tint val="75000"/>
-                  </a:schemeClr>
-                </a:solidFill>
-                <a:latin typeface="+mn-lt"/>
-                <a:ea typeface="+mn-ea"/>
-                <a:cs typeface="+mn-cs"/>
-              </a:defRPr>
-            </a:lvl7pPr>
-            <a:lvl8pPr marL="3200400" indent="0" algn="l" defTabSz="914400" rtl="0" eaLnBrk="1" latinLnBrk="0" hangingPunct="1">
-              <a:lnSpc>
-                <a:spcPct val="90000"/>
-              </a:lnSpc>
-              <a:spcBef>
-                <a:spcPts val="500"/>
-              </a:spcBef>
-              <a:buFont typeface="Arial" panose="020B0604020202020204" pitchFamily="34" charset="0"/>
-              <a:buNone/>
-              <a:defRPr sz="1600" kern="1200">
-                <a:solidFill>
-                  <a:schemeClr val="tx1">
-                    <a:tint val="75000"/>
-                  </a:schemeClr>
-                </a:solidFill>
-                <a:latin typeface="+mn-lt"/>
-                <a:ea typeface="+mn-ea"/>
-                <a:cs typeface="+mn-cs"/>
-              </a:defRPr>
-            </a:lvl8pPr>
-            <a:lvl9pPr marL="3657600" indent="0" algn="l" defTabSz="914400" rtl="0" eaLnBrk="1" latinLnBrk="0" hangingPunct="1">
-              <a:lnSpc>
-                <a:spcPct val="90000"/>
-              </a:lnSpc>
-              <a:spcBef>
-                <a:spcPts val="500"/>
-              </a:spcBef>
-              <a:buFont typeface="Arial" panose="020B0604020202020204" pitchFamily="34" charset="0"/>
-              <a:buNone/>
-              <a:defRPr sz="1600" kern="1200">
-                <a:solidFill>
-                  <a:schemeClr val="tx1">
-                    <a:tint val="75000"/>
-                  </a:schemeClr>
-                </a:solidFill>
-                <a:latin typeface="+mn-lt"/>
-                <a:ea typeface="+mn-ea"/>
-                <a:cs typeface="+mn-cs"/>
-              </a:defRPr>
-            </a:lvl9pPr>
-          </a:lstStyle>
+          <a:bodyPr/>
+          <a:lstStyle/>
           <a:p>
             <a:r>
               <a:rPr lang="en-GB"/>
-              <a:t>15 minutes</a:t>
+              <a:t>We love Demos!</a:t>
             </a:r>
           </a:p>
         </p:txBody>
       </p:sp>
       <p:pic>
         <p:nvPicPr>
-          <p:cNvPr id="2" name="Picture 2">
+          <p:cNvPr id="9" name="Picture 9">
             <a:extLst>
               <a:ext uri="{FF2B5EF4-FFF2-40B4-BE49-F238E27FC236}">
-                <a16:creationId xmlns:a16="http://schemas.microsoft.com/office/drawing/2014/main" id="{04697E65-3DA9-6EF3-472C-734FB98C3839}"/>
+                <a16:creationId xmlns:a16="http://schemas.microsoft.com/office/drawing/2014/main" id="{776AC288-703A-8014-23CA-E040CDD7E976}"/>
               </a:ext>
             </a:extLst>
           </p:cNvPr>
@@ -8758,8 +8715,8 @@
         </p:blipFill>
         <p:spPr>
           <a:xfrm>
-            <a:off x="2731477" y="1770873"/>
-            <a:ext cx="6729046" cy="3591746"/>
+            <a:off x="3404191" y="615392"/>
+            <a:ext cx="6127897" cy="5060147"/>
           </a:xfrm>
           <a:prstGeom prst="rect">
             <a:avLst/>
@@ -8779,7 +8736,7 @@
     </p:spTree>
     <p:extLst>
       <p:ext uri="{BB962C8B-B14F-4D97-AF65-F5344CB8AC3E}">
-        <p14:creationId xmlns:p14="http://schemas.microsoft.com/office/powerpoint/2010/main" val="3434842826"/>
+        <p14:creationId xmlns:p14="http://schemas.microsoft.com/office/powerpoint/2010/main" val="3317259441"/>
       </p:ext>
     </p:extLst>
   </p:cSld>
@@ -8920,6 +8877,667 @@
   <p:transition spd="slow" advTm="1000">
     <p:wipe/>
   </p:transition>
+</p:sld>
+</file>
+
+<file path=ppt/slides/slide20.xml><?xml version="1.0" encoding="utf-8"?>
+<p:sld xmlns:a="http://schemas.openxmlformats.org/drawingml/2006/main" xmlns:r="http://schemas.openxmlformats.org/officeDocument/2006/relationships" xmlns:p="http://schemas.openxmlformats.org/presentationml/2006/main">
+  <p:cSld>
+    <p:spTree>
+      <p:nvGrpSpPr>
+        <p:cNvPr id="1" name=""/>
+        <p:cNvGrpSpPr/>
+        <p:nvPr/>
+      </p:nvGrpSpPr>
+      <p:grpSpPr>
+        <a:xfrm>
+          <a:off x="0" y="0"/>
+          <a:ext cx="0" cy="0"/>
+          <a:chOff x="0" y="0"/>
+          <a:chExt cx="0" cy="0"/>
+        </a:xfrm>
+      </p:grpSpPr>
+      <p:sp>
+        <p:nvSpPr>
+          <p:cNvPr id="2" name="Titre 1">
+            <a:extLst>
+              <a:ext uri="{FF2B5EF4-FFF2-40B4-BE49-F238E27FC236}">
+                <a16:creationId xmlns:a16="http://schemas.microsoft.com/office/drawing/2014/main" id="{5191E0F2-FE77-51ED-3F72-223B58926E74}"/>
+              </a:ext>
+            </a:extLst>
+          </p:cNvPr>
+          <p:cNvSpPr>
+            <a:spLocks noGrp="1"/>
+          </p:cNvSpPr>
+          <p:nvPr>
+            <p:ph type="title"/>
+          </p:nvPr>
+        </p:nvSpPr>
+        <p:spPr/>
+        <p:txBody>
+          <a:bodyPr/>
+          <a:lstStyle/>
+          <a:p>
+            <a:r>
+              <a:rPr lang="fr-FR" dirty="0"/>
+              <a:t>In </a:t>
+            </a:r>
+            <a:r>
+              <a:rPr lang="fr-FR" dirty="0" err="1"/>
+              <a:t>Summary</a:t>
+            </a:r>
+            <a:r>
+              <a:rPr lang="fr-FR" dirty="0"/>
+              <a:t>...</a:t>
+            </a:r>
+            <a:endParaRPr lang="en-GB" dirty="0"/>
+          </a:p>
+        </p:txBody>
+      </p:sp>
+      <p:sp>
+        <p:nvSpPr>
+          <p:cNvPr id="3" name="Espace réservé du contenu 2">
+            <a:extLst>
+              <a:ext uri="{FF2B5EF4-FFF2-40B4-BE49-F238E27FC236}">
+                <a16:creationId xmlns:a16="http://schemas.microsoft.com/office/drawing/2014/main" id="{07D5023A-BA6F-B725-CF78-FD889E577EA6}"/>
+              </a:ext>
+            </a:extLst>
+          </p:cNvPr>
+          <p:cNvSpPr>
+            <a:spLocks noGrp="1"/>
+          </p:cNvSpPr>
+          <p:nvPr>
+            <p:ph idx="1"/>
+          </p:nvPr>
+        </p:nvSpPr>
+        <p:spPr/>
+        <p:txBody>
+          <a:bodyPr>
+            <a:normAutofit lnSpcReduction="10000"/>
+          </a:bodyPr>
+          <a:lstStyle/>
+          <a:p>
+            <a:pPr>
+              <a:buFont typeface="Wingdings" panose="05000000000000000000" pitchFamily="2" charset="2"/>
+              <a:buChar char="§"/>
+            </a:pPr>
+            <a:r>
+              <a:rPr lang="fr-FR" dirty="0" err="1"/>
+              <a:t>Closures</a:t>
+            </a:r>
+            <a:r>
+              <a:rPr lang="fr-FR" dirty="0"/>
+              <a:t> are </a:t>
+            </a:r>
+            <a:r>
+              <a:rPr lang="fr-FR" dirty="0" err="1"/>
+              <a:t>neat</a:t>
+            </a:r>
+            <a:r>
+              <a:rPr lang="fr-FR" dirty="0"/>
+              <a:t> but not </a:t>
+            </a:r>
+            <a:r>
+              <a:rPr lang="fr-FR" dirty="0" err="1"/>
+              <a:t>very</a:t>
+            </a:r>
+            <a:r>
+              <a:rPr lang="fr-FR" dirty="0"/>
+              <a:t> </a:t>
+            </a:r>
+            <a:r>
+              <a:rPr lang="fr-FR" dirty="0" err="1"/>
+              <a:t>useful</a:t>
+            </a:r>
+            <a:r>
+              <a:rPr lang="fr-FR" dirty="0"/>
+              <a:t> as </a:t>
+            </a:r>
+            <a:r>
+              <a:rPr lang="fr-FR" dirty="0" err="1"/>
+              <a:t>currently</a:t>
+            </a:r>
+            <a:r>
+              <a:rPr lang="fr-FR" dirty="0"/>
+              <a:t> </a:t>
+            </a:r>
+            <a:r>
+              <a:rPr lang="fr-FR" dirty="0" err="1"/>
+              <a:t>implemented</a:t>
+            </a:r>
+            <a:endParaRPr lang="fr-FR" dirty="0"/>
+          </a:p>
+          <a:p>
+            <a:pPr>
+              <a:buFont typeface="Wingdings" panose="05000000000000000000" pitchFamily="2" charset="2"/>
+              <a:buChar char="§"/>
+            </a:pPr>
+            <a:r>
+              <a:rPr lang="fr-FR" dirty="0"/>
+              <a:t>But </a:t>
+            </a:r>
+            <a:r>
+              <a:rPr lang="fr-FR" dirty="0" err="1"/>
+              <a:t>they</a:t>
+            </a:r>
+            <a:r>
+              <a:rPr lang="fr-FR" dirty="0"/>
+              <a:t> </a:t>
+            </a:r>
+            <a:r>
+              <a:rPr lang="fr-FR" dirty="0" err="1"/>
+              <a:t>could</a:t>
+            </a:r>
+            <a:r>
+              <a:rPr lang="fr-FR" dirty="0"/>
+              <a:t> </a:t>
+            </a:r>
+            <a:r>
+              <a:rPr lang="fr-FR" dirty="0" err="1"/>
+              <a:t>be</a:t>
+            </a:r>
+            <a:r>
+              <a:rPr lang="fr-FR" dirty="0"/>
+              <a:t> </a:t>
+            </a:r>
+            <a:r>
+              <a:rPr lang="fr-FR" dirty="0" err="1"/>
+              <a:t>fixed</a:t>
+            </a:r>
+            <a:r>
+              <a:rPr lang="fr-FR" dirty="0"/>
+              <a:t>…</a:t>
+            </a:r>
+          </a:p>
+          <a:p>
+            <a:pPr>
+              <a:buFont typeface="Wingdings" panose="05000000000000000000" pitchFamily="2" charset="2"/>
+              <a:buChar char="§"/>
+            </a:pPr>
+            <a:r>
+              <a:rPr lang="fr-FR" dirty="0" err="1"/>
+              <a:t>Everybody</a:t>
+            </a:r>
+            <a:r>
+              <a:rPr lang="fr-FR" dirty="0"/>
+              <a:t> (JS, Python, Java, C#, …) </a:t>
+            </a:r>
+            <a:r>
+              <a:rPr lang="fr-FR" dirty="0" err="1"/>
+              <a:t>else</a:t>
+            </a:r>
+            <a:r>
+              <a:rPr lang="fr-FR" dirty="0"/>
+              <a:t> has </a:t>
+            </a:r>
+            <a:r>
+              <a:rPr lang="fr-FR" dirty="0" err="1"/>
+              <a:t>them</a:t>
+            </a:r>
+            <a:r>
+              <a:rPr lang="fr-FR" dirty="0"/>
+              <a:t> </a:t>
+            </a:r>
+            <a:r>
+              <a:rPr lang="fr-FR" dirty="0" err="1"/>
+              <a:t>so</a:t>
+            </a:r>
+            <a:r>
+              <a:rPr lang="fr-FR" dirty="0"/>
+              <a:t> </a:t>
+            </a:r>
+            <a:r>
+              <a:rPr lang="fr-FR" dirty="0" err="1"/>
+              <a:t>maybe</a:t>
+            </a:r>
+            <a:r>
+              <a:rPr lang="fr-FR" dirty="0"/>
+              <a:t> </a:t>
+            </a:r>
+            <a:r>
+              <a:rPr lang="fr-FR" dirty="0" err="1"/>
+              <a:t>it</a:t>
+            </a:r>
+            <a:r>
+              <a:rPr lang="fr-FR" dirty="0"/>
+              <a:t> </a:t>
+            </a:r>
+            <a:r>
+              <a:rPr lang="fr-FR" dirty="0" err="1"/>
+              <a:t>would</a:t>
+            </a:r>
+            <a:r>
+              <a:rPr lang="fr-FR" dirty="0"/>
+              <a:t> </a:t>
+            </a:r>
+            <a:r>
+              <a:rPr lang="fr-FR" dirty="0" err="1"/>
+              <a:t>be</a:t>
+            </a:r>
+            <a:r>
+              <a:rPr lang="fr-FR" dirty="0"/>
+              <a:t> </a:t>
+            </a:r>
+            <a:r>
+              <a:rPr lang="fr-FR" dirty="0" err="1"/>
+              <a:t>worth</a:t>
+            </a:r>
+            <a:r>
+              <a:rPr lang="fr-FR" dirty="0"/>
+              <a:t> the effort.</a:t>
+            </a:r>
+          </a:p>
+          <a:p>
+            <a:pPr>
+              <a:buFont typeface="Wingdings" panose="05000000000000000000" pitchFamily="2" charset="2"/>
+              <a:buChar char="§"/>
+            </a:pPr>
+            <a:endParaRPr lang="fr-FR" dirty="0"/>
+          </a:p>
+          <a:p>
+            <a:pPr>
+              <a:buFont typeface="Wingdings" panose="05000000000000000000" pitchFamily="2" charset="2"/>
+              <a:buChar char="§"/>
+            </a:pPr>
+            <a:r>
+              <a:rPr lang="fr-FR" dirty="0" err="1"/>
+              <a:t>Talks</a:t>
+            </a:r>
+            <a:r>
+              <a:rPr lang="fr-FR" dirty="0"/>
+              <a:t> </a:t>
+            </a:r>
+            <a:r>
+              <a:rPr lang="fr-FR" dirty="0" err="1"/>
+              <a:t>etc</a:t>
+            </a:r>
+            <a:r>
+              <a:rPr lang="fr-FR" dirty="0"/>
+              <a:t>, </a:t>
+            </a:r>
+            <a:r>
+              <a:rPr lang="fr-FR" dirty="0" err="1"/>
+              <a:t>available</a:t>
+            </a:r>
+            <a:r>
+              <a:rPr lang="fr-FR" dirty="0"/>
+              <a:t> at:</a:t>
+            </a:r>
+            <a:endParaRPr lang="fr-FR" dirty="0">
+              <a:hlinkClick r:id="rId2"/>
+            </a:endParaRPr>
+          </a:p>
+          <a:p>
+            <a:pPr marL="457200" lvl="1" indent="0">
+              <a:buNone/>
+            </a:pPr>
+            <a:r>
+              <a:rPr lang="fr-FR" dirty="0">
+                <a:hlinkClick r:id="rId2"/>
+              </a:rPr>
+              <a:t>https://github.com/BrucePay/PSConfEU2024</a:t>
+            </a:r>
+            <a:endParaRPr lang="fr-FR" dirty="0"/>
+          </a:p>
+          <a:p>
+            <a:pPr marL="457200" lvl="1" indent="0">
+              <a:buNone/>
+            </a:pPr>
+            <a:endParaRPr lang="fr-FR" dirty="0"/>
+          </a:p>
+        </p:txBody>
+      </p:sp>
+    </p:spTree>
+    <p:extLst>
+      <p:ext uri="{BB962C8B-B14F-4D97-AF65-F5344CB8AC3E}">
+        <p14:creationId xmlns:p14="http://schemas.microsoft.com/office/powerpoint/2010/main" val="1658679481"/>
+      </p:ext>
+    </p:extLst>
+  </p:cSld>
+  <p:clrMapOvr>
+    <a:masterClrMapping/>
+  </p:clrMapOvr>
+</p:sld>
+</file>
+
+<file path=ppt/slides/slide21.xml><?xml version="1.0" encoding="utf-8"?>
+<p:sld xmlns:a="http://schemas.openxmlformats.org/drawingml/2006/main" xmlns:r="http://schemas.openxmlformats.org/officeDocument/2006/relationships" xmlns:p="http://schemas.openxmlformats.org/presentationml/2006/main">
+  <p:cSld>
+    <p:spTree>
+      <p:nvGrpSpPr>
+        <p:cNvPr id="1" name=""/>
+        <p:cNvGrpSpPr/>
+        <p:nvPr/>
+      </p:nvGrpSpPr>
+      <p:grpSpPr>
+        <a:xfrm>
+          <a:off x="0" y="0"/>
+          <a:ext cx="0" cy="0"/>
+          <a:chOff x="0" y="0"/>
+          <a:chExt cx="0" cy="0"/>
+        </a:xfrm>
+      </p:grpSpPr>
+      <p:sp>
+        <p:nvSpPr>
+          <p:cNvPr id="9" name="Title 3">
+            <a:extLst>
+              <a:ext uri="{FF2B5EF4-FFF2-40B4-BE49-F238E27FC236}">
+                <a16:creationId xmlns:a16="http://schemas.microsoft.com/office/drawing/2014/main" id="{063F7B61-5334-421F-9456-A905D333F4B3}"/>
+              </a:ext>
+            </a:extLst>
+          </p:cNvPr>
+          <p:cNvSpPr txBox="1">
+            <a:spLocks/>
+          </p:cNvSpPr>
+          <p:nvPr/>
+        </p:nvSpPr>
+        <p:spPr>
+          <a:xfrm>
+            <a:off x="831850" y="529389"/>
+            <a:ext cx="10515600" cy="1004637"/>
+          </a:xfrm>
+          <a:prstGeom prst="rect">
+            <a:avLst/>
+          </a:prstGeom>
+        </p:spPr>
+        <p:txBody>
+          <a:bodyPr vert="horz" lIns="91440" tIns="45720" rIns="91440" bIns="45720" rtlCol="0" anchor="b">
+            <a:normAutofit/>
+          </a:bodyPr>
+          <a:lstStyle>
+            <a:lvl1pPr algn="l" defTabSz="914400" rtl="0" eaLnBrk="1" latinLnBrk="0" hangingPunct="1">
+              <a:lnSpc>
+                <a:spcPct val="90000"/>
+              </a:lnSpc>
+              <a:spcBef>
+                <a:spcPct val="0"/>
+              </a:spcBef>
+              <a:buNone/>
+              <a:defRPr sz="6000" b="1" kern="1200">
+                <a:solidFill>
+                  <a:srgbClr val="3B2B46"/>
+                </a:solidFill>
+                <a:latin typeface="+mj-lt"/>
+                <a:ea typeface="+mj-ea"/>
+                <a:cs typeface="+mj-cs"/>
+              </a:defRPr>
+            </a:lvl1pPr>
+          </a:lstStyle>
+          <a:p>
+            <a:r>
+              <a:rPr lang="en-GB"/>
+              <a:t>Q&amp;A</a:t>
+            </a:r>
+          </a:p>
+        </p:txBody>
+      </p:sp>
+      <p:sp>
+        <p:nvSpPr>
+          <p:cNvPr id="10" name="Text Placeholder 4">
+            <a:extLst>
+              <a:ext uri="{FF2B5EF4-FFF2-40B4-BE49-F238E27FC236}">
+                <a16:creationId xmlns:a16="http://schemas.microsoft.com/office/drawing/2014/main" id="{E7911686-C4FE-022C-2490-99F4F5BFDF39}"/>
+              </a:ext>
+            </a:extLst>
+          </p:cNvPr>
+          <p:cNvSpPr txBox="1">
+            <a:spLocks/>
+          </p:cNvSpPr>
+          <p:nvPr/>
+        </p:nvSpPr>
+        <p:spPr>
+          <a:xfrm>
+            <a:off x="831850" y="1653758"/>
+            <a:ext cx="10515600" cy="1500187"/>
+          </a:xfrm>
+          <a:prstGeom prst="rect">
+            <a:avLst/>
+          </a:prstGeom>
+        </p:spPr>
+        <p:txBody>
+          <a:bodyPr vert="horz" lIns="91440" tIns="45720" rIns="91440" bIns="45720" rtlCol="0">
+            <a:normAutofit/>
+          </a:bodyPr>
+          <a:lstStyle>
+            <a:lvl1pPr marL="0" indent="0" algn="l" defTabSz="914400" rtl="0" eaLnBrk="1" latinLnBrk="0" hangingPunct="1">
+              <a:lnSpc>
+                <a:spcPct val="90000"/>
+              </a:lnSpc>
+              <a:spcBef>
+                <a:spcPts val="1000"/>
+              </a:spcBef>
+              <a:buFont typeface="Arial" panose="020B0604020202020204" pitchFamily="34" charset="0"/>
+              <a:buNone/>
+              <a:defRPr sz="2400" kern="1200">
+                <a:solidFill>
+                  <a:schemeClr val="tx1">
+                    <a:tint val="75000"/>
+                  </a:schemeClr>
+                </a:solidFill>
+                <a:latin typeface="+mn-lt"/>
+                <a:ea typeface="+mn-ea"/>
+                <a:cs typeface="+mn-cs"/>
+              </a:defRPr>
+            </a:lvl1pPr>
+            <a:lvl2pPr marL="457200" indent="0" algn="l" defTabSz="914400" rtl="0" eaLnBrk="1" latinLnBrk="0" hangingPunct="1">
+              <a:lnSpc>
+                <a:spcPct val="90000"/>
+              </a:lnSpc>
+              <a:spcBef>
+                <a:spcPts val="500"/>
+              </a:spcBef>
+              <a:buFont typeface="Arial" panose="020B0604020202020204" pitchFamily="34" charset="0"/>
+              <a:buNone/>
+              <a:defRPr sz="2000" kern="1200">
+                <a:solidFill>
+                  <a:schemeClr val="tx1">
+                    <a:tint val="75000"/>
+                  </a:schemeClr>
+                </a:solidFill>
+                <a:latin typeface="+mn-lt"/>
+                <a:ea typeface="+mn-ea"/>
+                <a:cs typeface="+mn-cs"/>
+              </a:defRPr>
+            </a:lvl2pPr>
+            <a:lvl3pPr marL="914400" indent="0" algn="l" defTabSz="914400" rtl="0" eaLnBrk="1" latinLnBrk="0" hangingPunct="1">
+              <a:lnSpc>
+                <a:spcPct val="90000"/>
+              </a:lnSpc>
+              <a:spcBef>
+                <a:spcPts val="500"/>
+              </a:spcBef>
+              <a:buFont typeface="Arial" panose="020B0604020202020204" pitchFamily="34" charset="0"/>
+              <a:buNone/>
+              <a:defRPr sz="1800" kern="1200">
+                <a:solidFill>
+                  <a:schemeClr val="tx1">
+                    <a:tint val="75000"/>
+                  </a:schemeClr>
+                </a:solidFill>
+                <a:latin typeface="+mn-lt"/>
+                <a:ea typeface="+mn-ea"/>
+                <a:cs typeface="+mn-cs"/>
+              </a:defRPr>
+            </a:lvl3pPr>
+            <a:lvl4pPr marL="1371600" indent="0" algn="l" defTabSz="914400" rtl="0" eaLnBrk="1" latinLnBrk="0" hangingPunct="1">
+              <a:lnSpc>
+                <a:spcPct val="90000"/>
+              </a:lnSpc>
+              <a:spcBef>
+                <a:spcPts val="500"/>
+              </a:spcBef>
+              <a:buFont typeface="Arial" panose="020B0604020202020204" pitchFamily="34" charset="0"/>
+              <a:buNone/>
+              <a:defRPr sz="1600" kern="1200">
+                <a:solidFill>
+                  <a:schemeClr val="tx1">
+                    <a:tint val="75000"/>
+                  </a:schemeClr>
+                </a:solidFill>
+                <a:latin typeface="+mn-lt"/>
+                <a:ea typeface="+mn-ea"/>
+                <a:cs typeface="+mn-cs"/>
+              </a:defRPr>
+            </a:lvl4pPr>
+            <a:lvl5pPr marL="1828800" indent="0" algn="l" defTabSz="914400" rtl="0" eaLnBrk="1" latinLnBrk="0" hangingPunct="1">
+              <a:lnSpc>
+                <a:spcPct val="90000"/>
+              </a:lnSpc>
+              <a:spcBef>
+                <a:spcPts val="500"/>
+              </a:spcBef>
+              <a:buFont typeface="Arial" panose="020B0604020202020204" pitchFamily="34" charset="0"/>
+              <a:buNone/>
+              <a:defRPr sz="1600" kern="1200">
+                <a:solidFill>
+                  <a:schemeClr val="tx1">
+                    <a:tint val="75000"/>
+                  </a:schemeClr>
+                </a:solidFill>
+                <a:latin typeface="+mn-lt"/>
+                <a:ea typeface="+mn-ea"/>
+                <a:cs typeface="+mn-cs"/>
+              </a:defRPr>
+            </a:lvl5pPr>
+            <a:lvl6pPr marL="2286000" indent="0" algn="l" defTabSz="914400" rtl="0" eaLnBrk="1" latinLnBrk="0" hangingPunct="1">
+              <a:lnSpc>
+                <a:spcPct val="90000"/>
+              </a:lnSpc>
+              <a:spcBef>
+                <a:spcPts val="500"/>
+              </a:spcBef>
+              <a:buFont typeface="Arial" panose="020B0604020202020204" pitchFamily="34" charset="0"/>
+              <a:buNone/>
+              <a:defRPr sz="1600" kern="1200">
+                <a:solidFill>
+                  <a:schemeClr val="tx1">
+                    <a:tint val="75000"/>
+                  </a:schemeClr>
+                </a:solidFill>
+                <a:latin typeface="+mn-lt"/>
+                <a:ea typeface="+mn-ea"/>
+                <a:cs typeface="+mn-cs"/>
+              </a:defRPr>
+            </a:lvl6pPr>
+            <a:lvl7pPr marL="2743200" indent="0" algn="l" defTabSz="914400" rtl="0" eaLnBrk="1" latinLnBrk="0" hangingPunct="1">
+              <a:lnSpc>
+                <a:spcPct val="90000"/>
+              </a:lnSpc>
+              <a:spcBef>
+                <a:spcPts val="500"/>
+              </a:spcBef>
+              <a:buFont typeface="Arial" panose="020B0604020202020204" pitchFamily="34" charset="0"/>
+              <a:buNone/>
+              <a:defRPr sz="1600" kern="1200">
+                <a:solidFill>
+                  <a:schemeClr val="tx1">
+                    <a:tint val="75000"/>
+                  </a:schemeClr>
+                </a:solidFill>
+                <a:latin typeface="+mn-lt"/>
+                <a:ea typeface="+mn-ea"/>
+                <a:cs typeface="+mn-cs"/>
+              </a:defRPr>
+            </a:lvl7pPr>
+            <a:lvl8pPr marL="3200400" indent="0" algn="l" defTabSz="914400" rtl="0" eaLnBrk="1" latinLnBrk="0" hangingPunct="1">
+              <a:lnSpc>
+                <a:spcPct val="90000"/>
+              </a:lnSpc>
+              <a:spcBef>
+                <a:spcPts val="500"/>
+              </a:spcBef>
+              <a:buFont typeface="Arial" panose="020B0604020202020204" pitchFamily="34" charset="0"/>
+              <a:buNone/>
+              <a:defRPr sz="1600" kern="1200">
+                <a:solidFill>
+                  <a:schemeClr val="tx1">
+                    <a:tint val="75000"/>
+                  </a:schemeClr>
+                </a:solidFill>
+                <a:latin typeface="+mn-lt"/>
+                <a:ea typeface="+mn-ea"/>
+                <a:cs typeface="+mn-cs"/>
+              </a:defRPr>
+            </a:lvl8pPr>
+            <a:lvl9pPr marL="3657600" indent="0" algn="l" defTabSz="914400" rtl="0" eaLnBrk="1" latinLnBrk="0" hangingPunct="1">
+              <a:lnSpc>
+                <a:spcPct val="90000"/>
+              </a:lnSpc>
+              <a:spcBef>
+                <a:spcPts val="500"/>
+              </a:spcBef>
+              <a:buFont typeface="Arial" panose="020B0604020202020204" pitchFamily="34" charset="0"/>
+              <a:buNone/>
+              <a:defRPr sz="1600" kern="1200">
+                <a:solidFill>
+                  <a:schemeClr val="tx1">
+                    <a:tint val="75000"/>
+                  </a:schemeClr>
+                </a:solidFill>
+                <a:latin typeface="+mn-lt"/>
+                <a:ea typeface="+mn-ea"/>
+                <a:cs typeface="+mn-cs"/>
+              </a:defRPr>
+            </a:lvl9pPr>
+          </a:lstStyle>
+          <a:p>
+            <a:r>
+              <a:rPr lang="en-GB"/>
+              <a:t>15 minutes</a:t>
+            </a:r>
+          </a:p>
+        </p:txBody>
+      </p:sp>
+      <p:pic>
+        <p:nvPicPr>
+          <p:cNvPr id="2" name="Picture 2">
+            <a:extLst>
+              <a:ext uri="{FF2B5EF4-FFF2-40B4-BE49-F238E27FC236}">
+                <a16:creationId xmlns:a16="http://schemas.microsoft.com/office/drawing/2014/main" id="{04697E65-3DA9-6EF3-472C-734FB98C3839}"/>
+              </a:ext>
+            </a:extLst>
+          </p:cNvPr>
+          <p:cNvPicPr>
+            <a:picLocks noChangeAspect="1"/>
+          </p:cNvPicPr>
+          <p:nvPr/>
+        </p:nvPicPr>
+        <p:blipFill>
+          <a:blip r:embed="rId2"/>
+          <a:stretch>
+            <a:fillRect/>
+          </a:stretch>
+        </p:blipFill>
+        <p:spPr>
+          <a:xfrm>
+            <a:off x="2731477" y="1770873"/>
+            <a:ext cx="6729046" cy="3591746"/>
+          </a:xfrm>
+          <a:prstGeom prst="rect">
+            <a:avLst/>
+          </a:prstGeom>
+          <a:ln>
+            <a:noFill/>
+          </a:ln>
+          <a:effectLst>
+            <a:outerShdw blurRad="292100" dist="139700" dir="2700000" algn="tl" rotWithShape="0">
+              <a:srgbClr val="333333">
+                <a:alpha val="65000"/>
+              </a:srgbClr>
+            </a:outerShdw>
+          </a:effectLst>
+        </p:spPr>
+      </p:pic>
+    </p:spTree>
+    <p:extLst>
+      <p:ext uri="{BB962C8B-B14F-4D97-AF65-F5344CB8AC3E}">
+        <p14:creationId xmlns:p14="http://schemas.microsoft.com/office/powerpoint/2010/main" val="3434842826"/>
+      </p:ext>
+    </p:extLst>
+  </p:cSld>
+  <p:clrMapOvr>
+    <a:masterClrMapping/>
+  </p:clrMapOvr>
 </p:sld>
 </file>
 
@@ -10001,7 +10619,7 @@
         <p:spPr/>
         <p:txBody>
           <a:bodyPr>
-            <a:normAutofit/>
+            <a:normAutofit lnSpcReduction="10000"/>
           </a:bodyPr>
           <a:lstStyle/>
           <a:p>
@@ -10011,7 +10629,7 @@
             </a:pPr>
             <a:r>
               <a:rPr lang="en-US" dirty="0"/>
-              <a:t>Definitions : what are we talking about anyway?</a:t>
+              <a:t>Definitions : what the heck is a closure?</a:t>
             </a:r>
           </a:p>
           <a:p>
@@ -10021,7 +10639,7 @@
             </a:pPr>
             <a:r>
               <a:rPr lang="en-US" dirty="0"/>
-              <a:t>Examine how script state is managed/implemented/exposed in PowerShell</a:t>
+              <a:t>Where/How is  script state managed/implemented/exposed in PowerShell</a:t>
             </a:r>
           </a:p>
           <a:p>
@@ -10054,7 +10672,25 @@
               <a:rPr lang="en-US" dirty="0"/>
               <a:t>What can you do with closures…</a:t>
             </a:r>
-            <a:endParaRPr lang="en-GB" dirty="0"/>
+          </a:p>
+          <a:p>
+            <a:pPr>
+              <a:buFont typeface="Wingdings" panose="05000000000000000000" pitchFamily="2" charset="2"/>
+              <a:buChar char="§"/>
+            </a:pPr>
+            <a:r>
+              <a:rPr lang="en-US" i="1" dirty="0"/>
+              <a:t>Warning – this is a </a:t>
+            </a:r>
+            <a:r>
+              <a:rPr lang="en-US" i="1" dirty="0" err="1"/>
+              <a:t>NerdFactor</a:t>
+            </a:r>
+            <a:r>
+              <a:rPr lang="en-US" i="1" dirty="0"/>
+              <a:t>(10) talk…</a:t>
+            </a:r>
+            <a:endParaRPr lang="en-GB" i="1" dirty="0"/>
           </a:p>
         </p:txBody>
       </p:sp>
@@ -10157,6 +10793,13 @@
           <a:p>
             <a:pPr lvl="1"/>
             <a:r>
+              <a:rPr lang="fr-FR" sz="2600" dirty="0">
+                <a:latin typeface="Cascadia Code" panose="020B0609020000020004" pitchFamily="49" charset="0"/>
+                <a:cs typeface="Cascadia Code" panose="020B0609020000020004" pitchFamily="49" charset="0"/>
+              </a:rPr>
+              <a:t>[</a:t>
+            </a:r>
+            <a:r>
               <a:rPr lang="fr-FR" sz="2600" dirty="0" err="1">
                 <a:latin typeface="Cascadia Code" panose="020B0609020000020004" pitchFamily="49" charset="0"/>
                 <a:cs typeface="Cascadia Code" panose="020B0609020000020004" pitchFamily="49" charset="0"/>
@@ -10164,6 +10807,13 @@
               <a:t>System.Management.Automation.Runspaces.Runspace</a:t>
             </a:r>
             <a:r>
+              <a:rPr lang="fr-FR" sz="2600" dirty="0">
+                <a:latin typeface="Cascadia Code" panose="020B0609020000020004" pitchFamily="49" charset="0"/>
+                <a:cs typeface="Cascadia Code" panose="020B0609020000020004" pitchFamily="49" charset="0"/>
+              </a:rPr>
+              <a:t>]</a:t>
+            </a:r>
+            <a:r>
               <a:rPr lang="fr-FR" dirty="0"/>
               <a:t>	</a:t>
             </a:r>
@@ -10209,7 +10859,7 @@
                 <a:latin typeface="Cascadia Code" panose="020B0609020000020004" pitchFamily="49" charset="0"/>
                 <a:cs typeface="Cascadia Code" panose="020B0609020000020004" pitchFamily="49" charset="0"/>
               </a:rPr>
-              <a:t>[</a:t>
+              <a:t>[…</a:t>
             </a:r>
             <a:r>
               <a:rPr lang="fr-FR" sz="2600" dirty="0" err="1">
@@ -10256,6 +10906,23 @@
               <a:defRPr/>
             </a:pPr>
             <a:r>
+              <a:rPr kumimoji="0" lang="fr-FR" sz="2600" b="0" i="0" u="none" strike="noStrike" kern="1200" cap="none" spc="0" normalizeH="0" baseline="0" noProof="0" dirty="0">
+                <a:ln>
+                  <a:noFill/>
+                </a:ln>
+                <a:solidFill>
+                  <a:srgbClr val="346297"/>
+                </a:solidFill>
+                <a:effectLst/>
+                <a:uLnTx/>
+                <a:uFillTx/>
+                <a:latin typeface="Cascadia Code" panose="020B0609020000020004" pitchFamily="49" charset="0"/>
+                <a:ea typeface="+mn-ea"/>
+                <a:cs typeface="Cascadia Code" panose="020B0609020000020004" pitchFamily="49" charset="0"/>
+              </a:rPr>
+              <a:t>[</a:t>
+            </a:r>
+            <a:r>
               <a:rPr kumimoji="0" lang="fr-FR" sz="2600" b="0" i="0" u="none" strike="noStrike" kern="1200" cap="none" spc="0" normalizeH="0" baseline="0" noProof="0" dirty="0" err="1">
                 <a:ln>
                   <a:noFill/>
@@ -10271,6 +10938,23 @@
                 <a:cs typeface="Cascadia Code" panose="020B0609020000020004" pitchFamily="49" charset="0"/>
               </a:rPr>
               <a:t>System.Management.Automation.ICommandRuntime</a:t>
+            </a:r>
+            <a:r>
+              <a:rPr kumimoji="0" lang="fr-FR" sz="2600" b="0" i="0" u="none" strike="noStrike" kern="1200" cap="none" spc="0" normalizeH="0" baseline="0" noProof="0" dirty="0">
+                <a:ln>
+                  <a:noFill/>
+                </a:ln>
+                <a:solidFill>
+                  <a:srgbClr val="346297"/>
+                </a:solidFill>
+                <a:effectLst/>
+                <a:uLnTx/>
+                <a:uFillTx/>
+                <a:latin typeface="Cascadia Code" panose="020B0609020000020004" pitchFamily="49" charset="0"/>
+                <a:ea typeface="+mn-ea"/>
+                <a:cs typeface="Cascadia Code" panose="020B0609020000020004" pitchFamily="49" charset="0"/>
+              </a:rPr>
+              <a:t>]</a:t>
             </a:r>
             <a:endParaRPr lang="fr-FR" dirty="0"/>
           </a:p>
@@ -12125,6 +12809,15 @@
 </file>
 
 <file path=customXml/item1.xml><?xml version="1.0" encoding="utf-8"?>
+<?mso-contentType ?>
+<FormTemplates xmlns="http://schemas.microsoft.com/sharepoint/v3/contenttype/forms">
+  <Display>DocumentLibraryForm</Display>
+  <Edit>DocumentLibraryForm</Edit>
+  <New>DocumentLibraryForm</New>
+</FormTemplates>
+</file>
+
+<file path=customXml/item2.xml><?xml version="1.0" encoding="utf-8"?>
 <ct:contentTypeSchema xmlns:ct="http://schemas.microsoft.com/office/2006/metadata/contentType" xmlns:ma="http://schemas.microsoft.com/office/2006/metadata/properties/metaAttributes" ct:_="" ma:_="" ma:contentTypeName="Document" ma:contentTypeID="0x010100465209AEF8DBB7418260C2A216A09DE4" ma:contentTypeVersion="13" ma:contentTypeDescription="Crée un document." ma:contentTypeScope="" ma:versionID="aacbea182e442c081ba3c266ed8afaf1">
   <xsd:schema xmlns:xsd="http://www.w3.org/2001/XMLSchema" xmlns:xs="http://www.w3.org/2001/XMLSchema" xmlns:p="http://schemas.microsoft.com/office/2006/metadata/properties" xmlns:ns2="2347cc20-e10c-452d-848a-c18e83138525" xmlns:ns3="85c0ce47-fe9c-4809-bf88-519c39a738e6" targetNamespace="http://schemas.microsoft.com/office/2006/metadata/properties" ma:root="true" ma:fieldsID="fe2d8c2794f7059c45f035c586269f9a" ns2:_="" ns3:_="">
     <xsd:import namespace="2347cc20-e10c-452d-848a-c18e83138525"/>
@@ -12331,15 +13024,6 @@
 </ct:contentTypeSchema>
 </file>
 
-<file path=customXml/item2.xml><?xml version="1.0" encoding="utf-8"?>
-<?mso-contentType ?>
-<FormTemplates xmlns="http://schemas.microsoft.com/sharepoint/v3/contenttype/forms">
-  <Display>DocumentLibraryForm</Display>
-  <Edit>DocumentLibraryForm</Edit>
-  <New>DocumentLibraryForm</New>
-</FormTemplates>
-</file>
-
 <file path=customXml/item3.xml><?xml version="1.0" encoding="utf-8"?>
 <p:properties xmlns:p="http://schemas.microsoft.com/office/2006/metadata/properties" xmlns:xsi="http://www.w3.org/2001/XMLSchema-instance" xmlns:pc="http://schemas.microsoft.com/office/infopath/2007/PartnerControls">
   <documentManagement>
@@ -12352,6 +13036,14 @@
 </file>
 
 <file path=customXml/itemProps1.xml><?xml version="1.0" encoding="utf-8"?>
+<ds:datastoreItem xmlns:ds="http://schemas.openxmlformats.org/officeDocument/2006/customXml" ds:itemID="{57D9B22B-F436-4FE5-B6C0-65AB2260F593}">
+  <ds:schemaRefs>
+    <ds:schemaRef ds:uri="http://schemas.microsoft.com/sharepoint/v3/contenttype/forms"/>
+  </ds:schemaRefs>
+</ds:datastoreItem>
+</file>
+
+<file path=customXml/itemProps2.xml><?xml version="1.0" encoding="utf-8"?>
 <ds:datastoreItem xmlns:ds="http://schemas.openxmlformats.org/officeDocument/2006/customXml" ds:itemID="{2D49AF2C-D145-4497-874A-78CB33723463}">
   <ds:schemaRefs>
     <ds:schemaRef ds:uri="http://schemas.microsoft.com/office/2006/metadata/contentType"/>
@@ -12370,14 +13062,6 @@
 </ds:datastoreItem>
 </file>
 
-<file path=customXml/itemProps2.xml><?xml version="1.0" encoding="utf-8"?>
-<ds:datastoreItem xmlns:ds="http://schemas.openxmlformats.org/officeDocument/2006/customXml" ds:itemID="{57D9B22B-F436-4FE5-B6C0-65AB2260F593}">
-  <ds:schemaRefs>
-    <ds:schemaRef ds:uri="http://schemas.microsoft.com/sharepoint/v3/contenttype/forms"/>
-  </ds:schemaRefs>
-</ds:datastoreItem>
-</file>
-
 <file path=customXml/itemProps3.xml><?xml version="1.0" encoding="utf-8"?>
 <ds:datastoreItem xmlns:ds="http://schemas.openxmlformats.org/officeDocument/2006/customXml" ds:itemID="{AA9C06E3-346E-408E-B352-32E922A070CE}">
   <ds:schemaRefs>

</xml_diff>